<commit_message>
Prototipo de modificar cuenta
Se incluye el prototipo del CU 03 - Modificar cuenta y se agrega la
opción "Perfil" en la ventana principal. Para los casos de uso de subir
y exportar documentos no se concidera necesario prototipar.
</commit_message>
<xml_diff>
--- a/Diseño/Prototipos CU 1,3,5,6,8.pptx
+++ b/Diseño/Prototipos CU 1,3,5,6,8.pptx
@@ -2,15 +2,16 @@
 <file path=ppt/presentation.xml><?xml version="1.0" encoding="utf-8"?>
 <p:presentation xmlns:a="http://schemas.openxmlformats.org/drawingml/2006/main" xmlns:r="http://schemas.openxmlformats.org/officeDocument/2006/relationships" xmlns:p="http://schemas.openxmlformats.org/presentationml/2006/main" saveSubsetFonts="1">
   <p:sldMasterIdLst>
-    <p:sldMasterId id="2147483648" r:id="rId45"/>
+    <p:sldMasterId id="2147483648" r:id="rId74"/>
   </p:sldMasterIdLst>
   <p:notesMasterIdLst>
-    <p:notesMasterId r:id="rId49"/>
+    <p:notesMasterId r:id="rId79"/>
   </p:notesMasterIdLst>
   <p:sldIdLst>
-    <p:sldId id="257" r:id="rId46"/>
-    <p:sldId id="258" r:id="rId47"/>
-    <p:sldId id="256" r:id="rId48"/>
+    <p:sldId id="257" r:id="rId75"/>
+    <p:sldId id="259" r:id="rId76"/>
+    <p:sldId id="258" r:id="rId77"/>
+    <p:sldId id="256" r:id="rId78"/>
   </p:sldIdLst>
   <p:sldSz cx="12192000" cy="6858000"/>
   <p:notesSz cx="6858000" cy="9144000"/>
@@ -199,7 +200,7 @@
           <a:p>
             <a:fld id="{AD3FADB2-C7DC-4050-8BA1-4C34E8419D20}" type="datetimeFigureOut">
               <a:rPr lang="es-MX" smtClean="0"/>
-              <a:t>13/10/2018</a:t>
+              <a:t>19/10/2018</a:t>
             </a:fld>
             <a:endParaRPr lang="es-MX"/>
           </a:p>
@@ -600,7 +601,7 @@
           <a:p>
             <a:r>
               <a:rPr lang="es-MX" dirty="0"/>
-              <a:t>Ventana principal</a:t>
+              <a:t>CU 03 – Modificar cuenta</a:t>
             </a:r>
           </a:p>
         </p:txBody>
@@ -631,7 +632,7 @@
     </p:spTree>
     <p:extLst>
       <p:ext uri="{BB962C8B-B14F-4D97-AF65-F5344CB8AC3E}">
-        <p14:creationId xmlns:p14="http://schemas.microsoft.com/office/powerpoint/2010/main" val="573588090"/>
+        <p14:creationId xmlns:p14="http://schemas.microsoft.com/office/powerpoint/2010/main" val="2076394207"/>
       </p:ext>
     </p:extLst>
   </p:cSld>
@@ -687,7 +688,7 @@
           <a:p>
             <a:r>
               <a:rPr lang="es-MX" dirty="0"/>
-              <a:t>CU 06 – Confirmar registro</a:t>
+              <a:t>Ventana principal</a:t>
             </a:r>
           </a:p>
         </p:txBody>
@@ -710,6 +711,93 @@
             <a:fld id="{C5A5BB97-0FFD-413E-808D-11F81E7FC98A}" type="slidenum">
               <a:rPr lang="es-MX" smtClean="0"/>
               <a:t>3</a:t>
+            </a:fld>
+            <a:endParaRPr lang="es-MX"/>
+          </a:p>
+        </p:txBody>
+      </p:sp>
+    </p:spTree>
+    <p:extLst>
+      <p:ext uri="{BB962C8B-B14F-4D97-AF65-F5344CB8AC3E}">
+        <p14:creationId xmlns:p14="http://schemas.microsoft.com/office/powerpoint/2010/main" val="573588090"/>
+      </p:ext>
+    </p:extLst>
+  </p:cSld>
+  <p:clrMapOvr>
+    <a:masterClrMapping/>
+  </p:clrMapOvr>
+</p:notes>
+</file>
+
+<file path=ppt/notesSlides/notesSlide4.xml><?xml version="1.0" encoding="utf-8"?>
+<p:notes xmlns:a="http://schemas.openxmlformats.org/drawingml/2006/main" xmlns:r="http://schemas.openxmlformats.org/officeDocument/2006/relationships" xmlns:p="http://schemas.openxmlformats.org/presentationml/2006/main">
+  <p:cSld>
+    <p:spTree>
+      <p:nvGrpSpPr>
+        <p:cNvPr id="1" name=""/>
+        <p:cNvGrpSpPr/>
+        <p:nvPr/>
+      </p:nvGrpSpPr>
+      <p:grpSpPr>
+        <a:xfrm>
+          <a:off x="0" y="0"/>
+          <a:ext cx="0" cy="0"/>
+          <a:chOff x="0" y="0"/>
+          <a:chExt cx="0" cy="0"/>
+        </a:xfrm>
+      </p:grpSpPr>
+      <p:sp>
+        <p:nvSpPr>
+          <p:cNvPr id="2" name="Marcador de imagen de diapositiva 1"/>
+          <p:cNvSpPr>
+            <a:spLocks noGrp="1" noRot="1" noChangeAspect="1"/>
+          </p:cNvSpPr>
+          <p:nvPr>
+            <p:ph type="sldImg"/>
+          </p:nvPr>
+        </p:nvSpPr>
+        <p:spPr/>
+      </p:sp>
+      <p:sp>
+        <p:nvSpPr>
+          <p:cNvPr id="3" name="Marcador de notas 2"/>
+          <p:cNvSpPr>
+            <a:spLocks noGrp="1"/>
+          </p:cNvSpPr>
+          <p:nvPr>
+            <p:ph type="body" idx="1"/>
+          </p:nvPr>
+        </p:nvSpPr>
+        <p:spPr/>
+        <p:txBody>
+          <a:bodyPr/>
+          <a:lstStyle/>
+          <a:p>
+            <a:r>
+              <a:rPr lang="es-MX" dirty="0"/>
+              <a:t>CU 06 – Confirmar registro</a:t>
+            </a:r>
+          </a:p>
+        </p:txBody>
+      </p:sp>
+      <p:sp>
+        <p:nvSpPr>
+          <p:cNvPr id="4" name="Marcador de número de diapositiva 3"/>
+          <p:cNvSpPr>
+            <a:spLocks noGrp="1"/>
+          </p:cNvSpPr>
+          <p:nvPr>
+            <p:ph type="sldNum" sz="quarter" idx="5"/>
+          </p:nvPr>
+        </p:nvSpPr>
+        <p:spPr/>
+        <p:txBody>
+          <a:bodyPr/>
+          <a:lstStyle/>
+          <a:p>
+            <a:fld id="{C5A5BB97-0FFD-413E-808D-11F81E7FC98A}" type="slidenum">
+              <a:rPr lang="es-MX" smtClean="0"/>
+              <a:t>4</a:t>
             </a:fld>
             <a:endParaRPr lang="es-MX"/>
           </a:p>
@@ -877,7 +965,7 @@
           <a:p>
             <a:fld id="{A222E297-CD48-4C8E-87AF-8E927C19541E}" type="datetimeFigureOut">
               <a:rPr lang="es-MX" smtClean="0"/>
-              <a:t>13/10/2018</a:t>
+              <a:t>19/10/2018</a:t>
             </a:fld>
             <a:endParaRPr lang="es-MX"/>
           </a:p>
@@ -1077,7 +1165,7 @@
           <a:p>
             <a:fld id="{A222E297-CD48-4C8E-87AF-8E927C19541E}" type="datetimeFigureOut">
               <a:rPr lang="es-MX" smtClean="0"/>
-              <a:t>13/10/2018</a:t>
+              <a:t>19/10/2018</a:t>
             </a:fld>
             <a:endParaRPr lang="es-MX"/>
           </a:p>
@@ -1287,7 +1375,7 @@
           <a:p>
             <a:fld id="{A222E297-CD48-4C8E-87AF-8E927C19541E}" type="datetimeFigureOut">
               <a:rPr lang="es-MX" smtClean="0"/>
-              <a:t>13/10/2018</a:t>
+              <a:t>19/10/2018</a:t>
             </a:fld>
             <a:endParaRPr lang="es-MX"/>
           </a:p>
@@ -1487,7 +1575,7 @@
           <a:p>
             <a:fld id="{A222E297-CD48-4C8E-87AF-8E927C19541E}" type="datetimeFigureOut">
               <a:rPr lang="es-MX" smtClean="0"/>
-              <a:t>13/10/2018</a:t>
+              <a:t>19/10/2018</a:t>
             </a:fld>
             <a:endParaRPr lang="es-MX"/>
           </a:p>
@@ -1763,7 +1851,7 @@
           <a:p>
             <a:fld id="{A222E297-CD48-4C8E-87AF-8E927C19541E}" type="datetimeFigureOut">
               <a:rPr lang="es-MX" smtClean="0"/>
-              <a:t>13/10/2018</a:t>
+              <a:t>19/10/2018</a:t>
             </a:fld>
             <a:endParaRPr lang="es-MX"/>
           </a:p>
@@ -2031,7 +2119,7 @@
           <a:p>
             <a:fld id="{A222E297-CD48-4C8E-87AF-8E927C19541E}" type="datetimeFigureOut">
               <a:rPr lang="es-MX" smtClean="0"/>
-              <a:t>13/10/2018</a:t>
+              <a:t>19/10/2018</a:t>
             </a:fld>
             <a:endParaRPr lang="es-MX"/>
           </a:p>
@@ -2446,7 +2534,7 @@
           <a:p>
             <a:fld id="{A222E297-CD48-4C8E-87AF-8E927C19541E}" type="datetimeFigureOut">
               <a:rPr lang="es-MX" smtClean="0"/>
-              <a:t>13/10/2018</a:t>
+              <a:t>19/10/2018</a:t>
             </a:fld>
             <a:endParaRPr lang="es-MX"/>
           </a:p>
@@ -2588,7 +2676,7 @@
           <a:p>
             <a:fld id="{A222E297-CD48-4C8E-87AF-8E927C19541E}" type="datetimeFigureOut">
               <a:rPr lang="es-MX" smtClean="0"/>
-              <a:t>13/10/2018</a:t>
+              <a:t>19/10/2018</a:t>
             </a:fld>
             <a:endParaRPr lang="es-MX"/>
           </a:p>
@@ -2701,7 +2789,7 @@
           <a:p>
             <a:fld id="{A222E297-CD48-4C8E-87AF-8E927C19541E}" type="datetimeFigureOut">
               <a:rPr lang="es-MX" smtClean="0"/>
-              <a:t>13/10/2018</a:t>
+              <a:t>19/10/2018</a:t>
             </a:fld>
             <a:endParaRPr lang="es-MX"/>
           </a:p>
@@ -3014,7 +3102,7 @@
           <a:p>
             <a:fld id="{A222E297-CD48-4C8E-87AF-8E927C19541E}" type="datetimeFigureOut">
               <a:rPr lang="es-MX" smtClean="0"/>
-              <a:t>13/10/2018</a:t>
+              <a:t>19/10/2018</a:t>
             </a:fld>
             <a:endParaRPr lang="es-MX"/>
           </a:p>
@@ -3303,7 +3391,7 @@
           <a:p>
             <a:fld id="{A222E297-CD48-4C8E-87AF-8E927C19541E}" type="datetimeFigureOut">
               <a:rPr lang="es-MX" smtClean="0"/>
-              <a:t>13/10/2018</a:t>
+              <a:t>19/10/2018</a:t>
             </a:fld>
             <a:endParaRPr lang="es-MX"/>
           </a:p>
@@ -3546,7 +3634,7 @@
           <a:p>
             <a:fld id="{A222E297-CD48-4C8E-87AF-8E927C19541E}" type="datetimeFigureOut">
               <a:rPr lang="es-MX" smtClean="0"/>
-              <a:t>13/10/2018</a:t>
+              <a:t>19/10/2018</a:t>
             </a:fld>
             <a:endParaRPr lang="es-MX"/>
           </a:p>
@@ -7078,8 +7166,8 @@
         </p:nvSpPr>
         <p:spPr>
           <a:xfrm>
-            <a:off x="9927920" y="889990"/>
-            <a:ext cx="2092239" cy="784830"/>
+            <a:off x="2890343" y="2899348"/>
+            <a:ext cx="1105839" cy="323165"/>
           </a:xfrm>
           <a:prstGeom prst="rect">
             <a:avLst/>
@@ -7087,13 +7175,13 @@
           <a:noFill/>
         </p:spPr>
         <p:txBody>
-          <a:bodyPr wrap="none" lIns="91440" tIns="18288" rIns="91440" bIns="27432" rtlCol="0" anchor="ctr" anchorCtr="0">
+          <a:bodyPr wrap="square" lIns="91440" tIns="18288" rIns="91440" bIns="27432" rtlCol="0" anchor="ctr" anchorCtr="0">
             <a:spAutoFit/>
           </a:bodyPr>
           <a:lstStyle/>
           <a:p>
             <a:r>
-              <a:rPr lang="en-US" sz="2400" dirty="0">
+              <a:rPr lang="en-US" dirty="0" err="1">
                 <a:solidFill>
                   <a:srgbClr val="000000"/>
                 </a:solidFill>
@@ -7101,12 +7189,10 @@
                 <a:ea typeface="Segoe UI" pitchFamily="34" charset="0"/>
                 <a:cs typeface="Segoe UI" pitchFamily="34" charset="0"/>
               </a:rPr>
-              <a:t>Juan Carlos </a:t>
+              <a:t>Nombre</a:t>
             </a:r>
-          </a:p>
-          <a:p>
             <a:r>
-              <a:rPr lang="en-US" sz="2400" dirty="0">
+              <a:rPr lang="en-US" dirty="0">
                 <a:solidFill>
                   <a:srgbClr val="000000"/>
                 </a:solidFill>
@@ -7114,7 +7200,7 @@
                 <a:ea typeface="Segoe UI" pitchFamily="34" charset="0"/>
                 <a:cs typeface="Segoe UI" pitchFamily="34" charset="0"/>
               </a:rPr>
-              <a:t>Pérez Arriaga</a:t>
+              <a:t>:</a:t>
             </a:r>
           </a:p>
         </p:txBody>
@@ -7288,8 +7374,2897 @@
       </p:pic>
       <p:pic>
         <p:nvPicPr>
+          <p:cNvPr id="45" name="Imagen 44" descr="Imagen que contiene señal, objeto, reloj&#10;&#10;Descripción generada con confianza muy alta">
+            <a:extLst>
+              <a:ext uri="{FF2B5EF4-FFF2-40B4-BE49-F238E27FC236}">
+                <a16:creationId xmlns:a16="http://schemas.microsoft.com/office/drawing/2014/main" id="{BA522396-1E44-444F-A71F-EA4DCC8DD271}"/>
+              </a:ext>
+            </a:extLst>
+          </p:cNvPr>
+          <p:cNvPicPr>
+            <a:picLocks noChangeAspect="1"/>
+          </p:cNvPicPr>
+          <p:nvPr/>
+        </p:nvPicPr>
+        <p:blipFill>
+          <a:blip r:embed="rId28">
+            <a:extLst>
+              <a:ext uri="{28A0092B-C50C-407E-A947-70E740481C1C}">
+                <a14:useLocalDpi xmlns:a14="http://schemas.microsoft.com/office/drawing/2010/main" val="0"/>
+              </a:ext>
+            </a:extLst>
+          </a:blip>
+          <a:stretch>
+            <a:fillRect/>
+          </a:stretch>
+        </p:blipFill>
+        <p:spPr>
+          <a:xfrm>
+            <a:off x="322157" y="2257522"/>
+            <a:ext cx="377249" cy="356972"/>
+          </a:xfrm>
+          <a:prstGeom prst="rect">
+            <a:avLst/>
+          </a:prstGeom>
+        </p:spPr>
+      </p:pic>
+      <p:sp>
+        <p:nvSpPr>
+          <p:cNvPr id="47" name="Content">
+            <a:extLst>
+              <a:ext uri="{FF2B5EF4-FFF2-40B4-BE49-F238E27FC236}">
+                <a16:creationId xmlns:a16="http://schemas.microsoft.com/office/drawing/2014/main" id="{959C53B5-E430-4D9F-876F-E7485EDAF825}"/>
+              </a:ext>
+            </a:extLst>
+          </p:cNvPr>
+          <p:cNvSpPr txBox="1"/>
+          <p:nvPr>
+            <p:custDataLst>
+              <p:custData r:id="rId5"/>
+            </p:custDataLst>
+          </p:nvPr>
+        </p:nvSpPr>
+        <p:spPr>
+          <a:xfrm>
+            <a:off x="818255" y="2308850"/>
+            <a:ext cx="1800493" cy="353943"/>
+          </a:xfrm>
+          <a:prstGeom prst="rect">
+            <a:avLst/>
+          </a:prstGeom>
+          <a:noFill/>
+        </p:spPr>
+        <p:txBody>
+          <a:bodyPr wrap="none" lIns="91440" tIns="18288" rIns="91440" bIns="27432" rtlCol="0" anchor="ctr" anchorCtr="0">
+            <a:spAutoFit/>
+          </a:bodyPr>
+          <a:lstStyle/>
+          <a:p>
+            <a:r>
+              <a:rPr lang="en-US" sz="2000" dirty="0">
+                <a:solidFill>
+                  <a:srgbClr val="000000"/>
+                </a:solidFill>
+                <a:latin typeface="Raleway" panose="020B0503030101060003" pitchFamily="34" charset="0"/>
+                <a:ea typeface="Segoe UI" pitchFamily="34" charset="0"/>
+                <a:cs typeface="Segoe UI" pitchFamily="34" charset="0"/>
+              </a:rPr>
+              <a:t>Mi </a:t>
+            </a:r>
+            <a:r>
+              <a:rPr lang="en-US" sz="2000" dirty="0" err="1">
+                <a:solidFill>
+                  <a:srgbClr val="000000"/>
+                </a:solidFill>
+                <a:latin typeface="Raleway" panose="020B0503030101060003" pitchFamily="34" charset="0"/>
+                <a:ea typeface="Segoe UI" pitchFamily="34" charset="0"/>
+                <a:cs typeface="Segoe UI" pitchFamily="34" charset="0"/>
+              </a:rPr>
+              <a:t>repositorio</a:t>
+            </a:r>
+            <a:endParaRPr lang="en-US" sz="2000" dirty="0">
+              <a:solidFill>
+                <a:srgbClr val="000000"/>
+              </a:solidFill>
+              <a:latin typeface="Raleway" panose="020B0503030101060003" pitchFamily="34" charset="0"/>
+              <a:ea typeface="Segoe UI" pitchFamily="34" charset="0"/>
+              <a:cs typeface="Segoe UI" pitchFamily="34" charset="0"/>
+            </a:endParaRPr>
+          </a:p>
+        </p:txBody>
+      </p:sp>
+      <p:pic>
+        <p:nvPicPr>
+          <p:cNvPr id="48" name="Imagen 47">
+            <a:extLst>
+              <a:ext uri="{FF2B5EF4-FFF2-40B4-BE49-F238E27FC236}">
+                <a16:creationId xmlns:a16="http://schemas.microsoft.com/office/drawing/2014/main" id="{019E1120-5DEF-4168-A30F-835E8096A98E}"/>
+              </a:ext>
+            </a:extLst>
+          </p:cNvPr>
+          <p:cNvPicPr>
+            <a:picLocks noChangeAspect="1"/>
+          </p:cNvPicPr>
+          <p:nvPr/>
+        </p:nvPicPr>
+        <p:blipFill>
+          <a:blip r:embed="rId29">
+            <a:extLst>
+              <a:ext uri="{28A0092B-C50C-407E-A947-70E740481C1C}">
+                <a14:useLocalDpi xmlns:a14="http://schemas.microsoft.com/office/drawing/2010/main" val="0"/>
+              </a:ext>
+            </a:extLst>
+          </a:blip>
+          <a:stretch>
+            <a:fillRect/>
+          </a:stretch>
+        </p:blipFill>
+        <p:spPr>
+          <a:xfrm>
+            <a:off x="327725" y="2832632"/>
+            <a:ext cx="356972" cy="356972"/>
+          </a:xfrm>
+          <a:prstGeom prst="rect">
+            <a:avLst/>
+          </a:prstGeom>
+        </p:spPr>
+      </p:pic>
+      <p:sp>
+        <p:nvSpPr>
+          <p:cNvPr id="49" name="Content">
+            <a:extLst>
+              <a:ext uri="{FF2B5EF4-FFF2-40B4-BE49-F238E27FC236}">
+                <a16:creationId xmlns:a16="http://schemas.microsoft.com/office/drawing/2014/main" id="{AEA655B2-1AE9-4EED-8632-A44311B7C401}"/>
+              </a:ext>
+            </a:extLst>
+          </p:cNvPr>
+          <p:cNvSpPr txBox="1"/>
+          <p:nvPr>
+            <p:custDataLst>
+              <p:custData r:id="rId6"/>
+            </p:custDataLst>
+          </p:nvPr>
+        </p:nvSpPr>
+        <p:spPr>
+          <a:xfrm>
+            <a:off x="813685" y="2883960"/>
+            <a:ext cx="1717137" cy="353943"/>
+          </a:xfrm>
+          <a:prstGeom prst="rect">
+            <a:avLst/>
+          </a:prstGeom>
+          <a:noFill/>
+        </p:spPr>
+        <p:txBody>
+          <a:bodyPr wrap="none" lIns="91440" tIns="18288" rIns="91440" bIns="27432" rtlCol="0" anchor="ctr" anchorCtr="0">
+            <a:spAutoFit/>
+          </a:bodyPr>
+          <a:lstStyle/>
+          <a:p>
+            <a:r>
+              <a:rPr lang="en-US" sz="2000" dirty="0" err="1">
+                <a:solidFill>
+                  <a:srgbClr val="000000"/>
+                </a:solidFill>
+                <a:latin typeface="Raleway" panose="020B0503030101060003" pitchFamily="34" charset="0"/>
+                <a:ea typeface="Segoe UI" pitchFamily="34" charset="0"/>
+                <a:cs typeface="Segoe UI" pitchFamily="34" charset="0"/>
+              </a:rPr>
+              <a:t>Compartidos</a:t>
+            </a:r>
+            <a:endParaRPr lang="en-US" sz="2000" dirty="0">
+              <a:solidFill>
+                <a:srgbClr val="000000"/>
+              </a:solidFill>
+              <a:latin typeface="Raleway" panose="020B0503030101060003" pitchFamily="34" charset="0"/>
+              <a:ea typeface="Segoe UI" pitchFamily="34" charset="0"/>
+              <a:cs typeface="Segoe UI" pitchFamily="34" charset="0"/>
+            </a:endParaRPr>
+          </a:p>
+        </p:txBody>
+      </p:sp>
+      <p:sp>
+        <p:nvSpPr>
+          <p:cNvPr id="100" name="Rectángulo: esquinas redondeadas 99">
+            <a:extLst>
+              <a:ext uri="{FF2B5EF4-FFF2-40B4-BE49-F238E27FC236}">
+                <a16:creationId xmlns:a16="http://schemas.microsoft.com/office/drawing/2014/main" id="{A1BF544A-9A78-4781-8CBE-655B391EDFED}"/>
+              </a:ext>
+            </a:extLst>
+          </p:cNvPr>
+          <p:cNvSpPr/>
+          <p:nvPr/>
+        </p:nvSpPr>
+        <p:spPr>
+          <a:xfrm>
+            <a:off x="3112336" y="6555124"/>
+            <a:ext cx="1800000" cy="196836"/>
+          </a:xfrm>
+          <a:prstGeom prst="roundRect">
+            <a:avLst>
+              <a:gd name="adj" fmla="val 0"/>
+            </a:avLst>
+          </a:prstGeom>
+          <a:solidFill>
+            <a:schemeClr val="bg1">
+              <a:lumMod val="95000"/>
+            </a:schemeClr>
+          </a:solidFill>
+          <a:ln>
+            <a:noFill/>
+          </a:ln>
+        </p:spPr>
+        <p:style>
+          <a:lnRef idx="2">
+            <a:schemeClr val="accent1">
+              <a:shade val="50000"/>
+            </a:schemeClr>
+          </a:lnRef>
+          <a:fillRef idx="1">
+            <a:schemeClr val="accent1"/>
+          </a:fillRef>
+          <a:effectRef idx="0">
+            <a:schemeClr val="accent1"/>
+          </a:effectRef>
+          <a:fontRef idx="minor">
+            <a:schemeClr val="lt1"/>
+          </a:fontRef>
+        </p:style>
+        <p:txBody>
+          <a:bodyPr rtlCol="0" anchor="ctr"/>
+          <a:lstStyle/>
+          <a:p>
+            <a:pPr algn="ctr"/>
+            <a:endParaRPr lang="es-MX"/>
+          </a:p>
+        </p:txBody>
+      </p:sp>
+      <p:sp>
+        <p:nvSpPr>
+          <p:cNvPr id="101" name="Rectángulo: esquinas redondeadas 100">
+            <a:extLst>
+              <a:ext uri="{FF2B5EF4-FFF2-40B4-BE49-F238E27FC236}">
+                <a16:creationId xmlns:a16="http://schemas.microsoft.com/office/drawing/2014/main" id="{E58F19F7-6331-4D75-A4E1-48CCB689F25C}"/>
+              </a:ext>
+            </a:extLst>
+          </p:cNvPr>
+          <p:cNvSpPr/>
+          <p:nvPr/>
+        </p:nvSpPr>
+        <p:spPr>
+          <a:xfrm rot="5400000">
+            <a:off x="2739030" y="6173560"/>
+            <a:ext cx="943447" cy="196836"/>
+          </a:xfrm>
+          <a:prstGeom prst="roundRect">
+            <a:avLst>
+              <a:gd name="adj" fmla="val 0"/>
+            </a:avLst>
+          </a:prstGeom>
+          <a:solidFill>
+            <a:schemeClr val="bg1">
+              <a:lumMod val="95000"/>
+            </a:schemeClr>
+          </a:solidFill>
+          <a:ln>
+            <a:noFill/>
+          </a:ln>
+        </p:spPr>
+        <p:style>
+          <a:lnRef idx="2">
+            <a:schemeClr val="accent1">
+              <a:shade val="50000"/>
+            </a:schemeClr>
+          </a:lnRef>
+          <a:fillRef idx="1">
+            <a:schemeClr val="accent1"/>
+          </a:fillRef>
+          <a:effectRef idx="0">
+            <a:schemeClr val="accent1"/>
+          </a:effectRef>
+          <a:fontRef idx="minor">
+            <a:schemeClr val="lt1"/>
+          </a:fontRef>
+        </p:style>
+        <p:txBody>
+          <a:bodyPr rtlCol="0" anchor="ctr"/>
+          <a:lstStyle/>
+          <a:p>
+            <a:pPr algn="ctr"/>
+            <a:endParaRPr lang="es-MX"/>
+          </a:p>
+        </p:txBody>
+      </p:sp>
+      <p:sp>
+        <p:nvSpPr>
+          <p:cNvPr id="102" name="Rectángulo: esquinas redondeadas 101">
+            <a:extLst>
+              <a:ext uri="{FF2B5EF4-FFF2-40B4-BE49-F238E27FC236}">
+                <a16:creationId xmlns:a16="http://schemas.microsoft.com/office/drawing/2014/main" id="{95D7FA7C-F8FC-4ED9-A6A8-DADE687854AC}"/>
+              </a:ext>
+            </a:extLst>
+          </p:cNvPr>
+          <p:cNvSpPr/>
+          <p:nvPr/>
+        </p:nvSpPr>
+        <p:spPr>
+          <a:xfrm rot="5400000">
+            <a:off x="4343889" y="6154705"/>
+            <a:ext cx="943447" cy="196836"/>
+          </a:xfrm>
+          <a:prstGeom prst="roundRect">
+            <a:avLst>
+              <a:gd name="adj" fmla="val 0"/>
+            </a:avLst>
+          </a:prstGeom>
+          <a:solidFill>
+            <a:schemeClr val="bg1">
+              <a:lumMod val="95000"/>
+            </a:schemeClr>
+          </a:solidFill>
+          <a:ln>
+            <a:noFill/>
+          </a:ln>
+        </p:spPr>
+        <p:style>
+          <a:lnRef idx="2">
+            <a:schemeClr val="accent1">
+              <a:shade val="50000"/>
+            </a:schemeClr>
+          </a:lnRef>
+          <a:fillRef idx="1">
+            <a:schemeClr val="accent1"/>
+          </a:fillRef>
+          <a:effectRef idx="0">
+            <a:schemeClr val="accent1"/>
+          </a:effectRef>
+          <a:fontRef idx="minor">
+            <a:schemeClr val="lt1"/>
+          </a:fontRef>
+        </p:style>
+        <p:txBody>
+          <a:bodyPr rtlCol="0" anchor="ctr"/>
+          <a:lstStyle/>
+          <a:p>
+            <a:pPr algn="ctr"/>
+            <a:endParaRPr lang="es-MX"/>
+          </a:p>
+        </p:txBody>
+      </p:sp>
+      <p:pic>
+        <p:nvPicPr>
+          <p:cNvPr id="109" name="Imagen 108">
+            <a:extLst>
+              <a:ext uri="{FF2B5EF4-FFF2-40B4-BE49-F238E27FC236}">
+                <a16:creationId xmlns:a16="http://schemas.microsoft.com/office/drawing/2014/main" id="{8EAF6471-4E54-4A80-8A7E-CC376F7D036F}"/>
+              </a:ext>
+            </a:extLst>
+          </p:cNvPr>
+          <p:cNvPicPr>
+            <a:picLocks noChangeAspect="1"/>
+          </p:cNvPicPr>
+          <p:nvPr/>
+        </p:nvPicPr>
+        <p:blipFill>
+          <a:blip r:embed="rId30">
+            <a:extLst>
+              <a:ext uri="{28A0092B-C50C-407E-A947-70E740481C1C}">
+                <a14:useLocalDpi xmlns:a14="http://schemas.microsoft.com/office/drawing/2010/main" val="0"/>
+              </a:ext>
+            </a:extLst>
+          </a:blip>
+          <a:stretch>
+            <a:fillRect/>
+          </a:stretch>
+        </p:blipFill>
+        <p:spPr>
+          <a:xfrm>
+            <a:off x="338867" y="3988886"/>
+            <a:ext cx="356972" cy="356972"/>
+          </a:xfrm>
+          <a:prstGeom prst="rect">
+            <a:avLst/>
+          </a:prstGeom>
+        </p:spPr>
+      </p:pic>
+      <p:sp>
+        <p:nvSpPr>
+          <p:cNvPr id="110" name="Content">
+            <a:extLst>
+              <a:ext uri="{FF2B5EF4-FFF2-40B4-BE49-F238E27FC236}">
+                <a16:creationId xmlns:a16="http://schemas.microsoft.com/office/drawing/2014/main" id="{8872DF6A-9587-4E91-B416-943E3D922E67}"/>
+              </a:ext>
+            </a:extLst>
+          </p:cNvPr>
+          <p:cNvSpPr txBox="1"/>
+          <p:nvPr>
+            <p:custDataLst>
+              <p:custData r:id="rId7"/>
+            </p:custDataLst>
+          </p:nvPr>
+        </p:nvSpPr>
+        <p:spPr>
+          <a:xfrm>
+            <a:off x="824827" y="4040214"/>
+            <a:ext cx="797013" cy="353943"/>
+          </a:xfrm>
+          <a:prstGeom prst="rect">
+            <a:avLst/>
+          </a:prstGeom>
+          <a:noFill/>
+        </p:spPr>
+        <p:txBody>
+          <a:bodyPr wrap="none" lIns="91440" tIns="18288" rIns="91440" bIns="27432" rtlCol="0" anchor="ctr" anchorCtr="0">
+            <a:spAutoFit/>
+          </a:bodyPr>
+          <a:lstStyle/>
+          <a:p>
+            <a:r>
+              <a:rPr lang="en-US" sz="2000" dirty="0" err="1">
+                <a:solidFill>
+                  <a:srgbClr val="000000"/>
+                </a:solidFill>
+                <a:latin typeface="Raleway" panose="020B0503030101060003" pitchFamily="34" charset="0"/>
+                <a:ea typeface="Segoe UI" pitchFamily="34" charset="0"/>
+                <a:cs typeface="Segoe UI" pitchFamily="34" charset="0"/>
+              </a:rPr>
+              <a:t>Perfíl</a:t>
+            </a:r>
+            <a:endParaRPr lang="en-US" sz="2000" dirty="0">
+              <a:solidFill>
+                <a:srgbClr val="000000"/>
+              </a:solidFill>
+              <a:latin typeface="Raleway" panose="020B0503030101060003" pitchFamily="34" charset="0"/>
+              <a:ea typeface="Segoe UI" pitchFamily="34" charset="0"/>
+              <a:cs typeface="Segoe UI" pitchFamily="34" charset="0"/>
+            </a:endParaRPr>
+          </a:p>
+        </p:txBody>
+      </p:sp>
+      <p:pic>
+        <p:nvPicPr>
+          <p:cNvPr id="98" name="Imagen 97">
+            <a:extLst>
+              <a:ext uri="{FF2B5EF4-FFF2-40B4-BE49-F238E27FC236}">
+                <a16:creationId xmlns:a16="http://schemas.microsoft.com/office/drawing/2014/main" id="{7882B9C7-858E-4C40-B167-358E978B3A47}"/>
+              </a:ext>
+            </a:extLst>
+          </p:cNvPr>
+          <p:cNvPicPr>
+            <a:picLocks noChangeAspect="1"/>
+          </p:cNvPicPr>
+          <p:nvPr/>
+        </p:nvPicPr>
+        <p:blipFill>
+          <a:blip r:embed="rId31">
+            <a:extLst>
+              <a:ext uri="{28A0092B-C50C-407E-A947-70E740481C1C}">
+                <a14:useLocalDpi xmlns:a14="http://schemas.microsoft.com/office/drawing/2010/main" val="0"/>
+              </a:ext>
+            </a:extLst>
+          </a:blip>
+          <a:stretch>
+            <a:fillRect/>
+          </a:stretch>
+        </p:blipFill>
+        <p:spPr>
+          <a:xfrm>
+            <a:off x="338867" y="3408861"/>
+            <a:ext cx="356972" cy="356972"/>
+          </a:xfrm>
+          <a:prstGeom prst="rect">
+            <a:avLst/>
+          </a:prstGeom>
+        </p:spPr>
+      </p:pic>
+      <p:sp>
+        <p:nvSpPr>
+          <p:cNvPr id="99" name="Content">
+            <a:extLst>
+              <a:ext uri="{FF2B5EF4-FFF2-40B4-BE49-F238E27FC236}">
+                <a16:creationId xmlns:a16="http://schemas.microsoft.com/office/drawing/2014/main" id="{4C59270A-40AF-454A-8F4F-853745605ABB}"/>
+              </a:ext>
+            </a:extLst>
+          </p:cNvPr>
+          <p:cNvSpPr txBox="1"/>
+          <p:nvPr>
+            <p:custDataLst>
+              <p:custData r:id="rId8"/>
+            </p:custDataLst>
+          </p:nvPr>
+        </p:nvSpPr>
+        <p:spPr>
+          <a:xfrm>
+            <a:off x="824827" y="3460189"/>
+            <a:ext cx="974947" cy="353943"/>
+          </a:xfrm>
+          <a:prstGeom prst="rect">
+            <a:avLst/>
+          </a:prstGeom>
+          <a:noFill/>
+        </p:spPr>
+        <p:txBody>
+          <a:bodyPr wrap="none" lIns="91440" tIns="18288" rIns="91440" bIns="27432" rtlCol="0" anchor="ctr" anchorCtr="0">
+            <a:spAutoFit/>
+          </a:bodyPr>
+          <a:lstStyle/>
+          <a:p>
+            <a:r>
+              <a:rPr lang="en-US" sz="2000" dirty="0">
+                <a:solidFill>
+                  <a:srgbClr val="000000"/>
+                </a:solidFill>
+                <a:latin typeface="Raleway" panose="020B0503030101060003" pitchFamily="34" charset="0"/>
+                <a:ea typeface="Segoe UI" pitchFamily="34" charset="0"/>
+                <a:cs typeface="Segoe UI" pitchFamily="34" charset="0"/>
+              </a:rPr>
+              <a:t>Nuevo</a:t>
+            </a:r>
+          </a:p>
+        </p:txBody>
+      </p:sp>
+      <p:pic>
+        <p:nvPicPr>
+          <p:cNvPr id="107" name="Picture 2" descr="Image result for usuario png">
+            <a:hlinkClick r:id="rId32"/>
+            <a:extLst>
+              <a:ext uri="{FF2B5EF4-FFF2-40B4-BE49-F238E27FC236}">
+                <a16:creationId xmlns:a16="http://schemas.microsoft.com/office/drawing/2014/main" id="{6505EDAC-7454-40EB-A4E0-AA5CC8CD0BE2}"/>
+              </a:ext>
+            </a:extLst>
+          </p:cNvPr>
+          <p:cNvPicPr>
+            <a:picLocks noChangeAspect="1" noChangeArrowheads="1"/>
+          </p:cNvPicPr>
+          <p:nvPr/>
+        </p:nvPicPr>
+        <p:blipFill>
+          <a:blip r:embed="rId33">
+            <a:extLst>
+              <a:ext uri="{28A0092B-C50C-407E-A947-70E740481C1C}">
+                <a14:useLocalDpi xmlns:a14="http://schemas.microsoft.com/office/drawing/2010/main" val="0"/>
+              </a:ext>
+            </a:extLst>
+          </a:blip>
+          <a:srcRect/>
+          <a:stretch>
+            <a:fillRect/>
+          </a:stretch>
+        </p:blipFill>
+        <p:spPr bwMode="auto">
+          <a:xfrm>
+            <a:off x="2996584" y="831644"/>
+            <a:ext cx="1831149" cy="1831149"/>
+          </a:xfrm>
+          <a:prstGeom prst="rect">
+            <a:avLst/>
+          </a:prstGeom>
+          <a:noFill/>
+          <a:extLst>
+            <a:ext uri="{909E8E84-426E-40DD-AFC4-6F175D3DCCD1}">
+              <a14:hiddenFill xmlns:a14="http://schemas.microsoft.com/office/drawing/2010/main">
+                <a:solidFill>
+                  <a:srgbClr val="FFFFFF"/>
+                </a:solidFill>
+              </a14:hiddenFill>
+            </a:ext>
+          </a:extLst>
+        </p:spPr>
+      </p:pic>
+      <p:pic>
+        <p:nvPicPr>
+          <p:cNvPr id="108" name="Imagen 107">
+            <a:extLst>
+              <a:ext uri="{FF2B5EF4-FFF2-40B4-BE49-F238E27FC236}">
+                <a16:creationId xmlns:a16="http://schemas.microsoft.com/office/drawing/2014/main" id="{D42F9FFF-15F7-46F3-B645-B7477CE3FF8A}"/>
+              </a:ext>
+            </a:extLst>
+          </p:cNvPr>
+          <p:cNvPicPr>
+            <a:picLocks noChangeAspect="1"/>
+          </p:cNvPicPr>
+          <p:nvPr/>
+        </p:nvPicPr>
+        <p:blipFill>
+          <a:blip r:embed="rId34">
+            <a:extLst>
+              <a:ext uri="{28A0092B-C50C-407E-A947-70E740481C1C}">
+                <a14:useLocalDpi xmlns:a14="http://schemas.microsoft.com/office/drawing/2010/main" val="0"/>
+              </a:ext>
+            </a:extLst>
+          </a:blip>
+          <a:stretch>
+            <a:fillRect/>
+          </a:stretch>
+        </p:blipFill>
+        <p:spPr>
+          <a:xfrm>
+            <a:off x="4912336" y="2209423"/>
+            <a:ext cx="453370" cy="453370"/>
+          </a:xfrm>
+          <a:prstGeom prst="rect">
+            <a:avLst/>
+          </a:prstGeom>
+        </p:spPr>
+      </p:pic>
+      <p:sp>
+        <p:nvSpPr>
+          <p:cNvPr id="111" name="Content">
+            <a:extLst>
+              <a:ext uri="{FF2B5EF4-FFF2-40B4-BE49-F238E27FC236}">
+                <a16:creationId xmlns:a16="http://schemas.microsoft.com/office/drawing/2014/main" id="{889742A5-7E55-4C43-8D72-729A75A8B02F}"/>
+              </a:ext>
+            </a:extLst>
+          </p:cNvPr>
+          <p:cNvSpPr txBox="1"/>
+          <p:nvPr>
+            <p:custDataLst>
+              <p:custData r:id="rId9"/>
+            </p:custDataLst>
+          </p:nvPr>
+        </p:nvSpPr>
+        <p:spPr>
+          <a:xfrm>
+            <a:off x="2887195" y="3265297"/>
+            <a:ext cx="1105839" cy="323165"/>
+          </a:xfrm>
+          <a:prstGeom prst="rect">
+            <a:avLst/>
+          </a:prstGeom>
+          <a:noFill/>
+        </p:spPr>
+        <p:txBody>
+          <a:bodyPr wrap="square" lIns="91440" tIns="18288" rIns="91440" bIns="27432" rtlCol="0" anchor="ctr" anchorCtr="0">
+            <a:spAutoFit/>
+          </a:bodyPr>
+          <a:lstStyle/>
+          <a:p>
+            <a:r>
+              <a:rPr lang="en-US" dirty="0" err="1">
+                <a:solidFill>
+                  <a:srgbClr val="000000"/>
+                </a:solidFill>
+                <a:latin typeface="Raleway" panose="020B0503030101060003" pitchFamily="34" charset="0"/>
+                <a:ea typeface="Segoe UI" pitchFamily="34" charset="0"/>
+                <a:cs typeface="Segoe UI" pitchFamily="34" charset="0"/>
+              </a:rPr>
+              <a:t>Correo</a:t>
+            </a:r>
+            <a:r>
+              <a:rPr lang="en-US" dirty="0">
+                <a:solidFill>
+                  <a:srgbClr val="000000"/>
+                </a:solidFill>
+                <a:latin typeface="Raleway" panose="020B0503030101060003" pitchFamily="34" charset="0"/>
+                <a:ea typeface="Segoe UI" pitchFamily="34" charset="0"/>
+                <a:cs typeface="Segoe UI" pitchFamily="34" charset="0"/>
+              </a:rPr>
+              <a:t>:</a:t>
+            </a:r>
+          </a:p>
+        </p:txBody>
+      </p:sp>
+      <p:sp>
+        <p:nvSpPr>
+          <p:cNvPr id="112" name="Content">
+            <a:extLst>
+              <a:ext uri="{FF2B5EF4-FFF2-40B4-BE49-F238E27FC236}">
+                <a16:creationId xmlns:a16="http://schemas.microsoft.com/office/drawing/2014/main" id="{687B015D-6683-4234-817F-C8B467AD4643}"/>
+              </a:ext>
+            </a:extLst>
+          </p:cNvPr>
+          <p:cNvSpPr txBox="1"/>
+          <p:nvPr>
+            <p:custDataLst>
+              <p:custData r:id="rId10"/>
+            </p:custDataLst>
+          </p:nvPr>
+        </p:nvSpPr>
+        <p:spPr>
+          <a:xfrm>
+            <a:off x="2887195" y="3628389"/>
+            <a:ext cx="1105839" cy="323165"/>
+          </a:xfrm>
+          <a:prstGeom prst="rect">
+            <a:avLst/>
+          </a:prstGeom>
+          <a:noFill/>
+        </p:spPr>
+        <p:txBody>
+          <a:bodyPr wrap="square" lIns="91440" tIns="18288" rIns="91440" bIns="27432" rtlCol="0" anchor="ctr" anchorCtr="0">
+            <a:spAutoFit/>
+          </a:bodyPr>
+          <a:lstStyle/>
+          <a:p>
+            <a:r>
+              <a:rPr lang="en-US" dirty="0" err="1">
+                <a:solidFill>
+                  <a:srgbClr val="000000"/>
+                </a:solidFill>
+                <a:latin typeface="Raleway" panose="020B0503030101060003" pitchFamily="34" charset="0"/>
+                <a:ea typeface="Segoe UI" pitchFamily="34" charset="0"/>
+                <a:cs typeface="Segoe UI" pitchFamily="34" charset="0"/>
+              </a:rPr>
+              <a:t>Usuario</a:t>
+            </a:r>
+            <a:r>
+              <a:rPr lang="en-US" dirty="0">
+                <a:solidFill>
+                  <a:srgbClr val="000000"/>
+                </a:solidFill>
+                <a:latin typeface="Raleway" panose="020B0503030101060003" pitchFamily="34" charset="0"/>
+                <a:ea typeface="Segoe UI" pitchFamily="34" charset="0"/>
+                <a:cs typeface="Segoe UI" pitchFamily="34" charset="0"/>
+              </a:rPr>
+              <a:t>:</a:t>
+            </a:r>
+          </a:p>
+        </p:txBody>
+      </p:sp>
+      <p:sp>
+        <p:nvSpPr>
+          <p:cNvPr id="113" name="Content">
+            <a:extLst>
+              <a:ext uri="{FF2B5EF4-FFF2-40B4-BE49-F238E27FC236}">
+                <a16:creationId xmlns:a16="http://schemas.microsoft.com/office/drawing/2014/main" id="{C25DA4C5-4A5C-44FC-911A-41945F693184}"/>
+              </a:ext>
+            </a:extLst>
+          </p:cNvPr>
+          <p:cNvSpPr txBox="1"/>
+          <p:nvPr>
+            <p:custDataLst>
+              <p:custData r:id="rId11"/>
+            </p:custDataLst>
+          </p:nvPr>
+        </p:nvSpPr>
+        <p:spPr>
+          <a:xfrm>
+            <a:off x="2887195" y="3993758"/>
+            <a:ext cx="1492986" cy="323165"/>
+          </a:xfrm>
+          <a:prstGeom prst="rect">
+            <a:avLst/>
+          </a:prstGeom>
+          <a:noFill/>
+        </p:spPr>
+        <p:txBody>
+          <a:bodyPr wrap="square" lIns="91440" tIns="18288" rIns="91440" bIns="27432" rtlCol="0" anchor="ctr" anchorCtr="0">
+            <a:spAutoFit/>
+          </a:bodyPr>
+          <a:lstStyle/>
+          <a:p>
+            <a:r>
+              <a:rPr lang="en-US" dirty="0" err="1">
+                <a:solidFill>
+                  <a:srgbClr val="000000"/>
+                </a:solidFill>
+                <a:latin typeface="Raleway" panose="020B0503030101060003" pitchFamily="34" charset="0"/>
+                <a:ea typeface="Segoe UI" pitchFamily="34" charset="0"/>
+                <a:cs typeface="Segoe UI" pitchFamily="34" charset="0"/>
+              </a:rPr>
+              <a:t>Contraseña</a:t>
+            </a:r>
+            <a:r>
+              <a:rPr lang="en-US" dirty="0">
+                <a:solidFill>
+                  <a:srgbClr val="000000"/>
+                </a:solidFill>
+                <a:latin typeface="Raleway" panose="020B0503030101060003" pitchFamily="34" charset="0"/>
+                <a:ea typeface="Segoe UI" pitchFamily="34" charset="0"/>
+                <a:cs typeface="Segoe UI" pitchFamily="34" charset="0"/>
+              </a:rPr>
+              <a:t>:</a:t>
+            </a:r>
+          </a:p>
+        </p:txBody>
+      </p:sp>
+      <p:sp>
+        <p:nvSpPr>
+          <p:cNvPr id="114" name="Content">
+            <a:extLst>
+              <a:ext uri="{FF2B5EF4-FFF2-40B4-BE49-F238E27FC236}">
+                <a16:creationId xmlns:a16="http://schemas.microsoft.com/office/drawing/2014/main" id="{95DB28CE-5E11-483C-96F0-7F42025329EA}"/>
+              </a:ext>
+            </a:extLst>
+          </p:cNvPr>
+          <p:cNvSpPr/>
+          <p:nvPr>
+            <p:custDataLst>
+              <p:custData r:id="rId12"/>
+            </p:custDataLst>
+          </p:nvPr>
+        </p:nvSpPr>
+        <p:spPr>
+          <a:xfrm>
+            <a:off x="4394722" y="2948259"/>
+            <a:ext cx="7533363" cy="264337"/>
+          </a:xfrm>
+          <a:prstGeom prst="rect">
+            <a:avLst/>
+          </a:prstGeom>
+          <a:solidFill>
+            <a:sysClr val="window" lastClr="FFFFFF"/>
+          </a:solidFill>
+          <a:ln w="3175">
+            <a:solidFill>
+              <a:srgbClr val="000000">
+                <a:lumMod val="50000"/>
+                <a:lumOff val="50000"/>
+              </a:srgbClr>
+            </a:solidFill>
+          </a:ln>
+          <a:effectLst/>
+        </p:spPr>
+        <p:style>
+          <a:lnRef idx="2">
+            <a:srgbClr val="4F81BD">
+              <a:shade val="50000"/>
+            </a:srgbClr>
+          </a:lnRef>
+          <a:fillRef idx="1">
+            <a:srgbClr val="4F81BD"/>
+          </a:fillRef>
+          <a:effectRef idx="0">
+            <a:srgbClr val="4F81BD"/>
+          </a:effectRef>
+          <a:fontRef idx="minor">
+            <a:srgbClr val="000000"/>
+          </a:fontRef>
+        </p:style>
+        <p:txBody>
+          <a:bodyPr wrap="none" lIns="45720" tIns="18288" rIns="45720" bIns="18288" rtlCol="0" anchor="ctr">
+            <a:noAutofit/>
+          </a:bodyPr>
+          <a:lstStyle/>
+          <a:p>
+            <a:r>
+              <a:rPr lang="en-US" dirty="0">
+                <a:solidFill>
+                  <a:schemeClr val="tx1">
+                    <a:lumMod val="75000"/>
+                    <a:lumOff val="25000"/>
+                  </a:schemeClr>
+                </a:solidFill>
+                <a:latin typeface="Raleway" panose="020B0503030101060003" pitchFamily="34" charset="0"/>
+                <a:cs typeface="Segoe UI" pitchFamily="34" charset="0"/>
+              </a:rPr>
+              <a:t>Juan Carlos Pérez Arriaga</a:t>
+            </a:r>
+          </a:p>
+        </p:txBody>
+      </p:sp>
+      <p:sp>
+        <p:nvSpPr>
+          <p:cNvPr id="115" name="Content">
+            <a:extLst>
+              <a:ext uri="{FF2B5EF4-FFF2-40B4-BE49-F238E27FC236}">
+                <a16:creationId xmlns:a16="http://schemas.microsoft.com/office/drawing/2014/main" id="{FDCD3A48-84C9-46F8-878F-201647CE7BBE}"/>
+              </a:ext>
+            </a:extLst>
+          </p:cNvPr>
+          <p:cNvSpPr/>
+          <p:nvPr>
+            <p:custDataLst>
+              <p:custData r:id="rId13"/>
+            </p:custDataLst>
+          </p:nvPr>
+        </p:nvSpPr>
+        <p:spPr>
+          <a:xfrm>
+            <a:off x="4394723" y="3294710"/>
+            <a:ext cx="7533363" cy="264337"/>
+          </a:xfrm>
+          <a:prstGeom prst="rect">
+            <a:avLst/>
+          </a:prstGeom>
+          <a:solidFill>
+            <a:sysClr val="window" lastClr="FFFFFF"/>
+          </a:solidFill>
+          <a:ln w="3175">
+            <a:solidFill>
+              <a:srgbClr val="000000">
+                <a:lumMod val="50000"/>
+                <a:lumOff val="50000"/>
+              </a:srgbClr>
+            </a:solidFill>
+          </a:ln>
+          <a:effectLst/>
+        </p:spPr>
+        <p:style>
+          <a:lnRef idx="2">
+            <a:srgbClr val="4F81BD">
+              <a:shade val="50000"/>
+            </a:srgbClr>
+          </a:lnRef>
+          <a:fillRef idx="1">
+            <a:srgbClr val="4F81BD"/>
+          </a:fillRef>
+          <a:effectRef idx="0">
+            <a:srgbClr val="4F81BD"/>
+          </a:effectRef>
+          <a:fontRef idx="minor">
+            <a:srgbClr val="000000"/>
+          </a:fontRef>
+        </p:style>
+        <p:txBody>
+          <a:bodyPr wrap="none" lIns="45720" tIns="18288" rIns="45720" bIns="18288" rtlCol="0" anchor="ctr">
+            <a:noAutofit/>
+          </a:bodyPr>
+          <a:lstStyle/>
+          <a:p>
+            <a:r>
+              <a:rPr lang="en-US" dirty="0">
+                <a:solidFill>
+                  <a:schemeClr val="tx1">
+                    <a:lumMod val="75000"/>
+                    <a:lumOff val="25000"/>
+                  </a:schemeClr>
+                </a:solidFill>
+                <a:latin typeface="Raleway" panose="020B0503030101060003" pitchFamily="34" charset="0"/>
+                <a:cs typeface="Segoe UI" pitchFamily="34" charset="0"/>
+              </a:rPr>
+              <a:t>elrevo@gmail.com</a:t>
+            </a:r>
+          </a:p>
+        </p:txBody>
+      </p:sp>
+      <p:sp>
+        <p:nvSpPr>
+          <p:cNvPr id="116" name="Content">
+            <a:extLst>
+              <a:ext uri="{FF2B5EF4-FFF2-40B4-BE49-F238E27FC236}">
+                <a16:creationId xmlns:a16="http://schemas.microsoft.com/office/drawing/2014/main" id="{A1CD3376-76EE-47B4-8659-D9DD256E420A}"/>
+              </a:ext>
+            </a:extLst>
+          </p:cNvPr>
+          <p:cNvSpPr/>
+          <p:nvPr>
+            <p:custDataLst>
+              <p:custData r:id="rId14"/>
+            </p:custDataLst>
+          </p:nvPr>
+        </p:nvSpPr>
+        <p:spPr>
+          <a:xfrm>
+            <a:off x="4396882" y="3657802"/>
+            <a:ext cx="7531204" cy="264337"/>
+          </a:xfrm>
+          <a:prstGeom prst="rect">
+            <a:avLst/>
+          </a:prstGeom>
+          <a:solidFill>
+            <a:sysClr val="window" lastClr="FFFFFF"/>
+          </a:solidFill>
+          <a:ln w="3175">
+            <a:solidFill>
+              <a:srgbClr val="000000">
+                <a:lumMod val="50000"/>
+                <a:lumOff val="50000"/>
+              </a:srgbClr>
+            </a:solidFill>
+          </a:ln>
+          <a:effectLst/>
+        </p:spPr>
+        <p:style>
+          <a:lnRef idx="2">
+            <a:srgbClr val="4F81BD">
+              <a:shade val="50000"/>
+            </a:srgbClr>
+          </a:lnRef>
+          <a:fillRef idx="1">
+            <a:srgbClr val="4F81BD"/>
+          </a:fillRef>
+          <a:effectRef idx="0">
+            <a:srgbClr val="4F81BD"/>
+          </a:effectRef>
+          <a:fontRef idx="minor">
+            <a:srgbClr val="000000"/>
+          </a:fontRef>
+        </p:style>
+        <p:txBody>
+          <a:bodyPr wrap="none" lIns="45720" tIns="18288" rIns="45720" bIns="18288" rtlCol="0" anchor="ctr">
+            <a:noAutofit/>
+          </a:bodyPr>
+          <a:lstStyle/>
+          <a:p>
+            <a:r>
+              <a:rPr lang="en-US" dirty="0" err="1">
+                <a:solidFill>
+                  <a:schemeClr val="tx1">
+                    <a:lumMod val="75000"/>
+                    <a:lumOff val="25000"/>
+                  </a:schemeClr>
+                </a:solidFill>
+                <a:latin typeface="Raleway" panose="020B0503030101060003" pitchFamily="34" charset="0"/>
+                <a:cs typeface="Segoe UI" pitchFamily="34" charset="0"/>
+              </a:rPr>
+              <a:t>elrevo</a:t>
+            </a:r>
+            <a:endParaRPr lang="en-US" dirty="0">
+              <a:solidFill>
+                <a:schemeClr val="tx1">
+                  <a:lumMod val="75000"/>
+                  <a:lumOff val="25000"/>
+                </a:schemeClr>
+              </a:solidFill>
+              <a:latin typeface="Raleway" panose="020B0503030101060003" pitchFamily="34" charset="0"/>
+              <a:cs typeface="Segoe UI" pitchFamily="34" charset="0"/>
+            </a:endParaRPr>
+          </a:p>
+        </p:txBody>
+      </p:sp>
+      <p:sp>
+        <p:nvSpPr>
+          <p:cNvPr id="117" name="Content">
+            <a:extLst>
+              <a:ext uri="{FF2B5EF4-FFF2-40B4-BE49-F238E27FC236}">
+                <a16:creationId xmlns:a16="http://schemas.microsoft.com/office/drawing/2014/main" id="{1BB8E393-739E-4D53-8693-1145D5A007DF}"/>
+              </a:ext>
+            </a:extLst>
+          </p:cNvPr>
+          <p:cNvSpPr/>
+          <p:nvPr>
+            <p:custDataLst>
+              <p:custData r:id="rId15"/>
+            </p:custDataLst>
+          </p:nvPr>
+        </p:nvSpPr>
+        <p:spPr>
+          <a:xfrm>
+            <a:off x="4396881" y="4020894"/>
+            <a:ext cx="7531203" cy="264337"/>
+          </a:xfrm>
+          <a:prstGeom prst="rect">
+            <a:avLst/>
+          </a:prstGeom>
+          <a:solidFill>
+            <a:sysClr val="window" lastClr="FFFFFF"/>
+          </a:solidFill>
+          <a:ln w="3175">
+            <a:solidFill>
+              <a:srgbClr val="000000">
+                <a:lumMod val="50000"/>
+                <a:lumOff val="50000"/>
+              </a:srgbClr>
+            </a:solidFill>
+          </a:ln>
+          <a:effectLst/>
+        </p:spPr>
+        <p:style>
+          <a:lnRef idx="2">
+            <a:srgbClr val="4F81BD">
+              <a:shade val="50000"/>
+            </a:srgbClr>
+          </a:lnRef>
+          <a:fillRef idx="1">
+            <a:srgbClr val="4F81BD"/>
+          </a:fillRef>
+          <a:effectRef idx="0">
+            <a:srgbClr val="4F81BD"/>
+          </a:effectRef>
+          <a:fontRef idx="minor">
+            <a:srgbClr val="000000"/>
+          </a:fontRef>
+        </p:style>
+        <p:txBody>
+          <a:bodyPr wrap="none" lIns="45720" tIns="18288" rIns="45720" bIns="18288" rtlCol="0" anchor="ctr">
+            <a:noAutofit/>
+          </a:bodyPr>
+          <a:lstStyle/>
+          <a:p>
+            <a:endParaRPr lang="en-US" dirty="0">
+              <a:solidFill>
+                <a:schemeClr val="tx1">
+                  <a:lumMod val="75000"/>
+                  <a:lumOff val="25000"/>
+                </a:schemeClr>
+              </a:solidFill>
+              <a:latin typeface="Raleway" panose="020B0503030101060003" pitchFamily="34" charset="0"/>
+              <a:cs typeface="Segoe UI" pitchFamily="34" charset="0"/>
+            </a:endParaRPr>
+          </a:p>
+        </p:txBody>
+      </p:sp>
+      <p:pic>
+        <p:nvPicPr>
+          <p:cNvPr id="118" name="Imagen 117">
+            <a:hlinkClick r:id="rId35" action="ppaction://hlinksldjump"/>
+            <a:extLst>
+              <a:ext uri="{FF2B5EF4-FFF2-40B4-BE49-F238E27FC236}">
+                <a16:creationId xmlns:a16="http://schemas.microsoft.com/office/drawing/2014/main" id="{F42CD9A9-E302-4988-93C4-F25D83A45803}"/>
+              </a:ext>
+            </a:extLst>
+          </p:cNvPr>
+          <p:cNvPicPr>
+            <a:picLocks noChangeAspect="1"/>
+          </p:cNvPicPr>
+          <p:nvPr/>
+        </p:nvPicPr>
+        <p:blipFill>
+          <a:blip r:embed="rId36">
+            <a:duotone>
+              <a:schemeClr val="accent2">
+                <a:shade val="45000"/>
+                <a:satMod val="135000"/>
+              </a:schemeClr>
+              <a:prstClr val="white"/>
+            </a:duotone>
+            <a:extLst>
+              <a:ext uri="{BEBA8EAE-BF5A-486C-A8C5-ECC9F3942E4B}">
+                <a14:imgProps xmlns:a14="http://schemas.microsoft.com/office/drawing/2010/main">
+                  <a14:imgLayer r:embed="rId37">
+                    <a14:imgEffect>
+                      <a14:colorTemperature colorTemp="11500"/>
+                    </a14:imgEffect>
+                  </a14:imgLayer>
+                </a14:imgProps>
+              </a:ext>
+              <a:ext uri="{28A0092B-C50C-407E-A947-70E740481C1C}">
+                <a14:useLocalDpi xmlns:a14="http://schemas.microsoft.com/office/drawing/2010/main" val="0"/>
+              </a:ext>
+            </a:extLst>
+          </a:blip>
+          <a:stretch>
+            <a:fillRect/>
+          </a:stretch>
+        </p:blipFill>
+        <p:spPr>
+          <a:xfrm>
+            <a:off x="327725" y="6253123"/>
+            <a:ext cx="356972" cy="356972"/>
+          </a:xfrm>
+          <a:prstGeom prst="rect">
+            <a:avLst/>
+          </a:prstGeom>
+        </p:spPr>
+      </p:pic>
+      <p:sp>
+        <p:nvSpPr>
+          <p:cNvPr id="119" name="Content">
+            <a:hlinkClick r:id="rId35" action="ppaction://hlinksldjump"/>
+            <a:extLst>
+              <a:ext uri="{FF2B5EF4-FFF2-40B4-BE49-F238E27FC236}">
+                <a16:creationId xmlns:a16="http://schemas.microsoft.com/office/drawing/2014/main" id="{33DC7073-9C2F-48CD-87FA-1228F25A7227}"/>
+              </a:ext>
+            </a:extLst>
+          </p:cNvPr>
+          <p:cNvSpPr txBox="1"/>
+          <p:nvPr>
+            <p:custDataLst>
+              <p:custData r:id="rId16"/>
+            </p:custDataLst>
+          </p:nvPr>
+        </p:nvSpPr>
+        <p:spPr>
+          <a:xfrm>
+            <a:off x="813685" y="6304451"/>
+            <a:ext cx="696024" cy="353943"/>
+          </a:xfrm>
+          <a:prstGeom prst="rect">
+            <a:avLst/>
+          </a:prstGeom>
+          <a:noFill/>
+        </p:spPr>
+        <p:txBody>
+          <a:bodyPr wrap="none" lIns="91440" tIns="18288" rIns="91440" bIns="27432" rtlCol="0" anchor="ctr" anchorCtr="0">
+            <a:spAutoFit/>
+          </a:bodyPr>
+          <a:lstStyle/>
+          <a:p>
+            <a:r>
+              <a:rPr lang="en-US" sz="2000" dirty="0" err="1">
+                <a:solidFill>
+                  <a:srgbClr val="000000"/>
+                </a:solidFill>
+                <a:latin typeface="Raleway" panose="020B0503030101060003" pitchFamily="34" charset="0"/>
+                <a:ea typeface="Segoe UI" pitchFamily="34" charset="0"/>
+                <a:cs typeface="Segoe UI" pitchFamily="34" charset="0"/>
+              </a:rPr>
+              <a:t>Salir</a:t>
+            </a:r>
+            <a:endParaRPr lang="en-US" sz="2000" dirty="0">
+              <a:solidFill>
+                <a:srgbClr val="000000"/>
+              </a:solidFill>
+              <a:latin typeface="Raleway" panose="020B0503030101060003" pitchFamily="34" charset="0"/>
+              <a:ea typeface="Segoe UI" pitchFamily="34" charset="0"/>
+              <a:cs typeface="Segoe UI" pitchFamily="34" charset="0"/>
+            </a:endParaRPr>
+          </a:p>
+        </p:txBody>
+      </p:sp>
+      <p:sp>
+        <p:nvSpPr>
+          <p:cNvPr id="120" name="Content">
+            <a:hlinkClick r:id="rId38" action="ppaction://hlinksldjump"/>
+            <a:extLst>
+              <a:ext uri="{FF2B5EF4-FFF2-40B4-BE49-F238E27FC236}">
+                <a16:creationId xmlns:a16="http://schemas.microsoft.com/office/drawing/2014/main" id="{84B7AF37-DA67-495E-A89B-0DCD9D2DC409}"/>
+              </a:ext>
+            </a:extLst>
+          </p:cNvPr>
+          <p:cNvSpPr/>
+          <p:nvPr>
+            <p:custDataLst>
+              <p:custData r:id="rId17"/>
+            </p:custDataLst>
+          </p:nvPr>
+        </p:nvSpPr>
+        <p:spPr>
+          <a:xfrm>
+            <a:off x="8958692" y="6245683"/>
+            <a:ext cx="1389507" cy="364411"/>
+          </a:xfrm>
+          <a:prstGeom prst="roundRect">
+            <a:avLst/>
+          </a:prstGeom>
+          <a:solidFill>
+            <a:schemeClr val="accent1">
+              <a:lumMod val="40000"/>
+              <a:lumOff val="60000"/>
+            </a:schemeClr>
+          </a:solidFill>
+          <a:ln w="3175">
+            <a:noFill/>
+          </a:ln>
+          <a:effectLst/>
+        </p:spPr>
+        <p:style>
+          <a:lnRef idx="2">
+            <a:srgbClr val="4F81BD">
+              <a:shade val="50000"/>
+            </a:srgbClr>
+          </a:lnRef>
+          <a:fillRef idx="1">
+            <a:srgbClr val="4F81BD"/>
+          </a:fillRef>
+          <a:effectRef idx="0">
+            <a:srgbClr val="4F81BD"/>
+          </a:effectRef>
+          <a:fontRef idx="minor">
+            <a:srgbClr val="000000"/>
+          </a:fontRef>
+        </p:style>
+        <p:txBody>
+          <a:bodyPr wrap="square" lIns="91440" tIns="0" rIns="91440" bIns="9144" rtlCol="0" anchor="ctr">
+            <a:noAutofit/>
+          </a:bodyPr>
+          <a:lstStyle/>
+          <a:p>
+            <a:pPr algn="ctr"/>
+            <a:r>
+              <a:rPr lang="en-US" sz="2000" dirty="0" err="1">
+                <a:solidFill>
+                  <a:srgbClr val="000000"/>
+                </a:solidFill>
+                <a:latin typeface="Raleway" panose="020B0503030101060003" pitchFamily="34" charset="0"/>
+                <a:cs typeface="Segoe UI" pitchFamily="34" charset="0"/>
+              </a:rPr>
+              <a:t>Guardar</a:t>
+            </a:r>
+            <a:endParaRPr lang="en-US" sz="2000" dirty="0">
+              <a:solidFill>
+                <a:srgbClr val="000000"/>
+              </a:solidFill>
+              <a:latin typeface="Raleway" panose="020B0503030101060003" pitchFamily="34" charset="0"/>
+              <a:cs typeface="Segoe UI" pitchFamily="34" charset="0"/>
+            </a:endParaRPr>
+          </a:p>
+        </p:txBody>
+      </p:sp>
+      <p:sp>
+        <p:nvSpPr>
+          <p:cNvPr id="121" name="Content">
+            <a:hlinkClick r:id="rId38" action="ppaction://hlinksldjump"/>
+            <a:extLst>
+              <a:ext uri="{FF2B5EF4-FFF2-40B4-BE49-F238E27FC236}">
+                <a16:creationId xmlns:a16="http://schemas.microsoft.com/office/drawing/2014/main" id="{26A813F6-1875-4506-9F9B-F3911D786501}"/>
+              </a:ext>
+            </a:extLst>
+          </p:cNvPr>
+          <p:cNvSpPr/>
+          <p:nvPr>
+            <p:custDataLst>
+              <p:custData r:id="rId18"/>
+            </p:custDataLst>
+          </p:nvPr>
+        </p:nvSpPr>
+        <p:spPr>
+          <a:xfrm>
+            <a:off x="10524546" y="6245683"/>
+            <a:ext cx="1389507" cy="364411"/>
+          </a:xfrm>
+          <a:prstGeom prst="roundRect">
+            <a:avLst/>
+          </a:prstGeom>
+          <a:solidFill>
+            <a:schemeClr val="accent2">
+              <a:lumMod val="60000"/>
+              <a:lumOff val="40000"/>
+            </a:schemeClr>
+          </a:solidFill>
+          <a:ln w="3175">
+            <a:noFill/>
+          </a:ln>
+          <a:effectLst/>
+        </p:spPr>
+        <p:style>
+          <a:lnRef idx="2">
+            <a:srgbClr val="4F81BD">
+              <a:shade val="50000"/>
+            </a:srgbClr>
+          </a:lnRef>
+          <a:fillRef idx="1">
+            <a:srgbClr val="4F81BD"/>
+          </a:fillRef>
+          <a:effectRef idx="0">
+            <a:srgbClr val="4F81BD"/>
+          </a:effectRef>
+          <a:fontRef idx="minor">
+            <a:srgbClr val="000000"/>
+          </a:fontRef>
+        </p:style>
+        <p:txBody>
+          <a:bodyPr wrap="square" lIns="91440" tIns="0" rIns="91440" bIns="9144" rtlCol="0" anchor="ctr">
+            <a:noAutofit/>
+          </a:bodyPr>
+          <a:lstStyle/>
+          <a:p>
+            <a:pPr algn="ctr"/>
+            <a:r>
+              <a:rPr lang="en-US" sz="2000" dirty="0" err="1">
+                <a:solidFill>
+                  <a:srgbClr val="000000"/>
+                </a:solidFill>
+                <a:latin typeface="Raleway" panose="020B0503030101060003" pitchFamily="34" charset="0"/>
+                <a:cs typeface="Segoe UI" pitchFamily="34" charset="0"/>
+              </a:rPr>
+              <a:t>Cancelar</a:t>
+            </a:r>
+            <a:endParaRPr lang="en-US" sz="2000" dirty="0">
+              <a:solidFill>
+                <a:srgbClr val="000000"/>
+              </a:solidFill>
+              <a:latin typeface="Raleway" panose="020B0503030101060003" pitchFamily="34" charset="0"/>
+              <a:cs typeface="Segoe UI" pitchFamily="34" charset="0"/>
+            </a:endParaRPr>
+          </a:p>
+        </p:txBody>
+      </p:sp>
+    </p:spTree>
+    <p:extLst>
+      <p:ext uri="{BB962C8B-B14F-4D97-AF65-F5344CB8AC3E}">
+        <p14:creationId xmlns:p14="http://schemas.microsoft.com/office/powerpoint/2010/main" val="4051827943"/>
+      </p:ext>
+    </p:extLst>
+  </p:cSld>
+  <p:clrMapOvr>
+    <a:masterClrMapping/>
+  </p:clrMapOvr>
+</p:sld>
+</file>
+
+<file path=ppt/slides/slide3.xml><?xml version="1.0" encoding="utf-8"?>
+<p:sld xmlns:a="http://schemas.openxmlformats.org/drawingml/2006/main" xmlns:r="http://schemas.openxmlformats.org/officeDocument/2006/relationships" xmlns:p="http://schemas.openxmlformats.org/presentationml/2006/main">
+  <p:cSld>
+    <p:spTree>
+      <p:nvGrpSpPr>
+        <p:cNvPr id="1" name=""/>
+        <p:cNvGrpSpPr/>
+        <p:nvPr/>
+      </p:nvGrpSpPr>
+      <p:grpSpPr>
+        <a:xfrm>
+          <a:off x="0" y="0"/>
+          <a:ext cx="0" cy="0"/>
+          <a:chOff x="0" y="0"/>
+          <a:chExt cx="0" cy="0"/>
+        </a:xfrm>
+      </p:grpSpPr>
+      <p:grpSp>
+        <p:nvGrpSpPr>
+          <p:cNvPr id="4" name="WebBrowser">
+            <a:extLst>
+              <a:ext uri="{FF2B5EF4-FFF2-40B4-BE49-F238E27FC236}">
+                <a16:creationId xmlns:a16="http://schemas.microsoft.com/office/drawing/2014/main" id="{939ECCBA-94D9-4CBE-9B2C-85073B00238A}"/>
+              </a:ext>
+            </a:extLst>
+          </p:cNvPr>
+          <p:cNvGrpSpPr/>
+          <p:nvPr>
+            <p:custDataLst>
+              <p:custData r:id="rId1"/>
+            </p:custDataLst>
+          </p:nvPr>
+        </p:nvGrpSpPr>
+        <p:grpSpPr>
+          <a:xfrm>
+            <a:off x="0" y="0"/>
+            <a:ext cx="12192000" cy="6858000"/>
+            <a:chOff x="0" y="0"/>
+            <a:chExt cx="9144000" cy="6858000"/>
+          </a:xfrm>
+        </p:grpSpPr>
+        <p:sp>
+          <p:nvSpPr>
+            <p:cNvPr id="5" name="Background">
+              <a:extLst>
+                <a:ext uri="{FF2B5EF4-FFF2-40B4-BE49-F238E27FC236}">
+                  <a16:creationId xmlns:a16="http://schemas.microsoft.com/office/drawing/2014/main" id="{21B141B3-F0A8-4B59-AB9F-E5FBFEE8220C}"/>
+                </a:ext>
+              </a:extLst>
+            </p:cNvPr>
+            <p:cNvSpPr/>
+            <p:nvPr/>
+          </p:nvSpPr>
+          <p:spPr>
+            <a:xfrm>
+              <a:off x="0" y="0"/>
+              <a:ext cx="9144000" cy="6858000"/>
+            </a:xfrm>
+            <a:prstGeom prst="rect">
+              <a:avLst/>
+            </a:prstGeom>
+            <a:solidFill>
+              <a:srgbClr val="FFFFFF">
+                <a:lumMod val="65000"/>
+              </a:srgbClr>
+            </a:solidFill>
+            <a:ln w="3175" cap="flat" cmpd="sng" algn="ctr">
+              <a:solidFill>
+                <a:srgbClr val="000000">
+                  <a:lumMod val="50000"/>
+                  <a:lumOff val="50000"/>
+                </a:srgbClr>
+              </a:solidFill>
+              <a:prstDash val="solid"/>
+            </a:ln>
+            <a:effectLst/>
+          </p:spPr>
+          <p:txBody>
+            <a:bodyPr rtlCol="0" anchor="ctr"/>
+            <a:lstStyle/>
+            <a:p>
+              <a:pPr algn="ctr"/>
+              <a:endParaRPr lang="en-US" sz="1050" kern="0" dirty="0">
+                <a:solidFill>
+                  <a:prstClr val="white"/>
+                </a:solidFill>
+                <a:latin typeface="Segoe UI"/>
+              </a:endParaRPr>
+            </a:p>
+          </p:txBody>
+        </p:sp>
+        <p:sp>
+          <p:nvSpPr>
+            <p:cNvPr id="6" name="WindowTitle">
+              <a:extLst>
+                <a:ext uri="{FF2B5EF4-FFF2-40B4-BE49-F238E27FC236}">
+                  <a16:creationId xmlns:a16="http://schemas.microsoft.com/office/drawing/2014/main" id="{80EB6A00-6C6D-49B0-A75C-5D759666FA53}"/>
+                </a:ext>
+              </a:extLst>
+            </p:cNvPr>
+            <p:cNvSpPr txBox="1"/>
+            <p:nvPr/>
+          </p:nvSpPr>
+          <p:spPr>
+            <a:xfrm>
+              <a:off x="22515" y="22341"/>
+              <a:ext cx="1724030" cy="230832"/>
+            </a:xfrm>
+            <a:prstGeom prst="rect">
+              <a:avLst/>
+            </a:prstGeom>
+            <a:noFill/>
+          </p:spPr>
+          <p:txBody>
+            <a:bodyPr wrap="none" lIns="91440" tIns="18288" rIns="91440" bIns="27432" rtlCol="0" anchor="ctr" anchorCtr="0">
+              <a:spAutoFit/>
+            </a:bodyPr>
+            <a:lstStyle/>
+            <a:p>
+              <a:r>
+                <a:rPr lang="en-US" sz="1200" dirty="0" err="1">
+                  <a:solidFill>
+                    <a:prstClr val="white"/>
+                  </a:solidFill>
+                  <a:latin typeface="Segoe UI" pitchFamily="34" charset="0"/>
+                  <a:ea typeface="Segoe UI" pitchFamily="34" charset="0"/>
+                  <a:cs typeface="Segoe UI" pitchFamily="34" charset="0"/>
+                </a:rPr>
+                <a:t>Repositorio</a:t>
+              </a:r>
+              <a:r>
+                <a:rPr lang="en-US" sz="1200" dirty="0">
+                  <a:solidFill>
+                    <a:prstClr val="white"/>
+                  </a:solidFill>
+                  <a:latin typeface="Segoe UI" pitchFamily="34" charset="0"/>
+                  <a:ea typeface="Segoe UI" pitchFamily="34" charset="0"/>
+                  <a:cs typeface="Segoe UI" pitchFamily="34" charset="0"/>
+                </a:rPr>
+                <a:t> de </a:t>
+              </a:r>
+              <a:r>
+                <a:rPr lang="en-US" sz="1200" dirty="0" err="1">
+                  <a:solidFill>
+                    <a:prstClr val="white"/>
+                  </a:solidFill>
+                  <a:latin typeface="Segoe UI" pitchFamily="34" charset="0"/>
+                  <a:ea typeface="Segoe UI" pitchFamily="34" charset="0"/>
+                  <a:cs typeface="Segoe UI" pitchFamily="34" charset="0"/>
+                </a:rPr>
+                <a:t>documentos</a:t>
+              </a:r>
+              <a:r>
+                <a:rPr lang="en-US" sz="1200" dirty="0">
+                  <a:solidFill>
+                    <a:prstClr val="white"/>
+                  </a:solidFill>
+                  <a:latin typeface="Segoe UI" pitchFamily="34" charset="0"/>
+                  <a:ea typeface="Segoe UI" pitchFamily="34" charset="0"/>
+                  <a:cs typeface="Segoe UI" pitchFamily="34" charset="0"/>
+                </a:rPr>
+                <a:t> UV</a:t>
+              </a:r>
+            </a:p>
+          </p:txBody>
+        </p:sp>
+        <p:grpSp>
+          <p:nvGrpSpPr>
+            <p:cNvPr id="7" name="Group 4">
+              <a:extLst>
+                <a:ext uri="{FF2B5EF4-FFF2-40B4-BE49-F238E27FC236}">
+                  <a16:creationId xmlns:a16="http://schemas.microsoft.com/office/drawing/2014/main" id="{A88DDE5D-CA7B-4F23-9663-DEC059383F67}"/>
+                </a:ext>
+              </a:extLst>
+            </p:cNvPr>
+            <p:cNvGrpSpPr/>
+            <p:nvPr/>
+          </p:nvGrpSpPr>
+          <p:grpSpPr>
+            <a:xfrm>
+              <a:off x="81598" y="286385"/>
+              <a:ext cx="320040" cy="316520"/>
+              <a:chOff x="72073" y="221749"/>
+              <a:chExt cx="320040" cy="316520"/>
+            </a:xfrm>
+          </p:grpSpPr>
+          <p:sp>
+            <p:nvSpPr>
+              <p:cNvPr id="31" name="Oval 28">
+                <a:extLst>
+                  <a:ext uri="{FF2B5EF4-FFF2-40B4-BE49-F238E27FC236}">
+                    <a16:creationId xmlns:a16="http://schemas.microsoft.com/office/drawing/2014/main" id="{8C90DF0B-22F2-4EF5-808E-91B0E8E76823}"/>
+                  </a:ext>
+                </a:extLst>
+              </p:cNvPr>
+              <p:cNvSpPr/>
+              <p:nvPr/>
+            </p:nvSpPr>
+            <p:spPr>
+              <a:xfrm>
+                <a:off x="72073" y="221749"/>
+                <a:ext cx="320040" cy="316520"/>
+              </a:xfrm>
+              <a:prstGeom prst="ellipse">
+                <a:avLst/>
+              </a:prstGeom>
+              <a:gradFill flip="none" rotWithShape="1">
+                <a:gsLst>
+                  <a:gs pos="91000">
+                    <a:srgbClr val="FFFFFF">
+                      <a:lumMod val="85000"/>
+                    </a:srgbClr>
+                  </a:gs>
+                  <a:gs pos="36000">
+                    <a:srgbClr val="FFFFFF">
+                      <a:lumMod val="95000"/>
+                    </a:srgbClr>
+                  </a:gs>
+                  <a:gs pos="100000">
+                    <a:srgbClr val="FFFFFF">
+                      <a:lumMod val="95000"/>
+                    </a:srgbClr>
+                  </a:gs>
+                </a:gsLst>
+                <a:lin ang="5400000" scaled="0"/>
+                <a:tileRect/>
+              </a:gradFill>
+              <a:ln w="3175">
+                <a:solidFill>
+                  <a:srgbClr val="000000">
+                    <a:lumMod val="50000"/>
+                    <a:lumOff val="50000"/>
+                  </a:srgbClr>
+                </a:solidFill>
+              </a:ln>
+              <a:effectLst/>
+            </p:spPr>
+            <p:style>
+              <a:lnRef idx="2">
+                <a:srgbClr val="4F81BD">
+                  <a:shade val="50000"/>
+                </a:srgbClr>
+              </a:lnRef>
+              <a:fillRef idx="1">
+                <a:srgbClr val="4F81BD"/>
+              </a:fillRef>
+              <a:effectRef idx="0">
+                <a:srgbClr val="4F81BD"/>
+              </a:effectRef>
+              <a:fontRef idx="minor">
+                <a:srgbClr val="000000"/>
+              </a:fontRef>
+            </p:style>
+            <p:txBody>
+              <a:bodyPr rtlCol="0" anchor="ctr"/>
+              <a:lstStyle/>
+              <a:p>
+                <a:pPr algn="ctr"/>
+                <a:endParaRPr lang="en-US" sz="1050" u="sng">
+                  <a:solidFill>
+                    <a:prstClr val="white"/>
+                  </a:solidFill>
+                </a:endParaRPr>
+              </a:p>
+            </p:txBody>
+          </p:sp>
+          <p:sp>
+            <p:nvSpPr>
+              <p:cNvPr id="32" name="Left Arrow 29">
+                <a:extLst>
+                  <a:ext uri="{FF2B5EF4-FFF2-40B4-BE49-F238E27FC236}">
+                    <a16:creationId xmlns:a16="http://schemas.microsoft.com/office/drawing/2014/main" id="{850D3FCB-A036-42EE-8C8D-22F137BB7DF6}"/>
+                  </a:ext>
+                </a:extLst>
+              </p:cNvPr>
+              <p:cNvSpPr/>
+              <p:nvPr/>
+            </p:nvSpPr>
+            <p:spPr>
+              <a:xfrm>
+                <a:off x="109358" y="275511"/>
+                <a:ext cx="223134" cy="208997"/>
+              </a:xfrm>
+              <a:prstGeom prst="leftArrow">
+                <a:avLst/>
+              </a:prstGeom>
+              <a:solidFill>
+                <a:sysClr val="window" lastClr="FFFFFF"/>
+              </a:solidFill>
+              <a:ln w="3175" cap="flat" cmpd="sng" algn="ctr">
+                <a:solidFill>
+                  <a:sysClr val="windowText" lastClr="000000">
+                    <a:lumMod val="75000"/>
+                    <a:lumOff val="25000"/>
+                  </a:sysClr>
+                </a:solidFill>
+                <a:prstDash val="solid"/>
+              </a:ln>
+              <a:effectLst/>
+            </p:spPr>
+            <p:txBody>
+              <a:bodyPr rtlCol="0" anchor="ctr"/>
+              <a:lstStyle/>
+              <a:p>
+                <a:pPr algn="ctr"/>
+                <a:endParaRPr lang="en-US" sz="1050" kern="0">
+                  <a:solidFill>
+                    <a:prstClr val="white"/>
+                  </a:solidFill>
+                  <a:latin typeface="Segoe UI"/>
+                </a:endParaRPr>
+              </a:p>
+            </p:txBody>
+          </p:sp>
+        </p:grpSp>
+        <p:grpSp>
+          <p:nvGrpSpPr>
+            <p:cNvPr id="8" name="Group 5">
+              <a:extLst>
+                <a:ext uri="{FF2B5EF4-FFF2-40B4-BE49-F238E27FC236}">
+                  <a16:creationId xmlns:a16="http://schemas.microsoft.com/office/drawing/2014/main" id="{F8E078E3-A955-4F2B-99F0-E5AB8676640C}"/>
+                </a:ext>
+              </a:extLst>
+            </p:cNvPr>
+            <p:cNvGrpSpPr/>
+            <p:nvPr/>
+          </p:nvGrpSpPr>
+          <p:grpSpPr>
+            <a:xfrm>
+              <a:off x="453671" y="286384"/>
+              <a:ext cx="320040" cy="316520"/>
+              <a:chOff x="444146" y="221748"/>
+              <a:chExt cx="320040" cy="316520"/>
+            </a:xfrm>
+          </p:grpSpPr>
+          <p:sp>
+            <p:nvSpPr>
+              <p:cNvPr id="29" name="Oval 26">
+                <a:extLst>
+                  <a:ext uri="{FF2B5EF4-FFF2-40B4-BE49-F238E27FC236}">
+                    <a16:creationId xmlns:a16="http://schemas.microsoft.com/office/drawing/2014/main" id="{AD94EDDB-5D7D-423B-ABBF-27709982DFDB}"/>
+                  </a:ext>
+                </a:extLst>
+              </p:cNvPr>
+              <p:cNvSpPr/>
+              <p:nvPr/>
+            </p:nvSpPr>
+            <p:spPr>
+              <a:xfrm>
+                <a:off x="444146" y="221748"/>
+                <a:ext cx="320040" cy="316520"/>
+              </a:xfrm>
+              <a:prstGeom prst="ellipse">
+                <a:avLst/>
+              </a:prstGeom>
+              <a:gradFill flip="none" rotWithShape="1">
+                <a:gsLst>
+                  <a:gs pos="91000">
+                    <a:srgbClr val="FFFFFF">
+                      <a:lumMod val="85000"/>
+                    </a:srgbClr>
+                  </a:gs>
+                  <a:gs pos="36000">
+                    <a:srgbClr val="FFFFFF">
+                      <a:lumMod val="95000"/>
+                    </a:srgbClr>
+                  </a:gs>
+                  <a:gs pos="100000">
+                    <a:srgbClr val="FFFFFF">
+                      <a:lumMod val="95000"/>
+                    </a:srgbClr>
+                  </a:gs>
+                </a:gsLst>
+                <a:lin ang="5400000" scaled="0"/>
+                <a:tileRect/>
+              </a:gradFill>
+              <a:ln w="3175">
+                <a:solidFill>
+                  <a:srgbClr val="000000">
+                    <a:lumMod val="50000"/>
+                    <a:lumOff val="50000"/>
+                  </a:srgbClr>
+                </a:solidFill>
+              </a:ln>
+              <a:effectLst/>
+            </p:spPr>
+            <p:style>
+              <a:lnRef idx="2">
+                <a:srgbClr val="4F81BD">
+                  <a:shade val="50000"/>
+                </a:srgbClr>
+              </a:lnRef>
+              <a:fillRef idx="1">
+                <a:srgbClr val="4F81BD"/>
+              </a:fillRef>
+              <a:effectRef idx="0">
+                <a:srgbClr val="4F81BD"/>
+              </a:effectRef>
+              <a:fontRef idx="minor">
+                <a:srgbClr val="000000"/>
+              </a:fontRef>
+            </p:style>
+            <p:txBody>
+              <a:bodyPr rtlCol="0" anchor="ctr"/>
+              <a:lstStyle/>
+              <a:p>
+                <a:pPr algn="ctr"/>
+                <a:endParaRPr lang="en-US" sz="1050" u="sng">
+                  <a:solidFill>
+                    <a:prstClr val="white"/>
+                  </a:solidFill>
+                </a:endParaRPr>
+              </a:p>
+            </p:txBody>
+          </p:sp>
+          <p:sp>
+            <p:nvSpPr>
+              <p:cNvPr id="30" name="Right Arrow 27">
+                <a:extLst>
+                  <a:ext uri="{FF2B5EF4-FFF2-40B4-BE49-F238E27FC236}">
+                    <a16:creationId xmlns:a16="http://schemas.microsoft.com/office/drawing/2014/main" id="{A942A2E1-7657-44DA-AA8C-0516439851A8}"/>
+                  </a:ext>
+                </a:extLst>
+              </p:cNvPr>
+              <p:cNvSpPr/>
+              <p:nvPr/>
+            </p:nvSpPr>
+            <p:spPr>
+              <a:xfrm>
+                <a:off x="481249" y="275509"/>
+                <a:ext cx="257146" cy="208999"/>
+              </a:xfrm>
+              <a:prstGeom prst="rightArrow">
+                <a:avLst/>
+              </a:prstGeom>
+              <a:solidFill>
+                <a:sysClr val="window" lastClr="FFFFFF"/>
+              </a:solidFill>
+              <a:ln w="3175" cap="flat" cmpd="sng" algn="ctr">
+                <a:solidFill>
+                  <a:sysClr val="windowText" lastClr="000000">
+                    <a:lumMod val="75000"/>
+                    <a:lumOff val="25000"/>
+                  </a:sysClr>
+                </a:solidFill>
+                <a:prstDash val="solid"/>
+              </a:ln>
+              <a:effectLst/>
+            </p:spPr>
+            <p:txBody>
+              <a:bodyPr rtlCol="0" anchor="ctr"/>
+              <a:lstStyle/>
+              <a:p>
+                <a:pPr algn="ctr"/>
+                <a:endParaRPr lang="en-US" sz="1050" kern="0">
+                  <a:solidFill>
+                    <a:prstClr val="white"/>
+                  </a:solidFill>
+                  <a:latin typeface="Segoe UI"/>
+                </a:endParaRPr>
+              </a:p>
+            </p:txBody>
+          </p:sp>
+        </p:grpSp>
+        <p:grpSp>
+          <p:nvGrpSpPr>
+            <p:cNvPr id="9" name="Minimize - Maximize - Close">
+              <a:extLst>
+                <a:ext uri="{FF2B5EF4-FFF2-40B4-BE49-F238E27FC236}">
+                  <a16:creationId xmlns:a16="http://schemas.microsoft.com/office/drawing/2014/main" id="{A48EB436-AD18-418A-A3A2-C668586D7FF9}"/>
+                </a:ext>
+              </a:extLst>
+            </p:cNvPr>
+            <p:cNvGrpSpPr/>
+            <p:nvPr/>
+          </p:nvGrpSpPr>
+          <p:grpSpPr>
+            <a:xfrm>
+              <a:off x="8632311" y="92599"/>
+              <a:ext cx="384527" cy="78032"/>
+              <a:chOff x="9347642" y="131588"/>
+              <a:chExt cx="384527" cy="78032"/>
+            </a:xfrm>
+          </p:grpSpPr>
+          <p:cxnSp>
+            <p:nvCxnSpPr>
+              <p:cNvPr id="24" name="Line">
+                <a:extLst>
+                  <a:ext uri="{FF2B5EF4-FFF2-40B4-BE49-F238E27FC236}">
+                    <a16:creationId xmlns:a16="http://schemas.microsoft.com/office/drawing/2014/main" id="{CAD62900-77CA-430E-BEEC-40DADA69B796}"/>
+                  </a:ext>
+                </a:extLst>
+              </p:cNvPr>
+              <p:cNvCxnSpPr/>
+              <p:nvPr/>
+            </p:nvCxnSpPr>
+            <p:spPr>
+              <a:xfrm>
+                <a:off x="9661396" y="131588"/>
+                <a:ext cx="70773" cy="76200"/>
+              </a:xfrm>
+              <a:prstGeom prst="line">
+                <a:avLst/>
+              </a:prstGeom>
+              <a:ln w="12700">
+                <a:solidFill>
+                  <a:srgbClr val="FFFFFF"/>
+                </a:solidFill>
+              </a:ln>
+            </p:spPr>
+            <p:style>
+              <a:lnRef idx="1">
+                <a:srgbClr val="4F81BD"/>
+              </a:lnRef>
+              <a:fillRef idx="0">
+                <a:srgbClr val="4F81BD"/>
+              </a:fillRef>
+              <a:effectRef idx="0">
+                <a:srgbClr val="4F81BD"/>
+              </a:effectRef>
+              <a:fontRef idx="minor">
+                <a:srgbClr val="000000"/>
+              </a:fontRef>
+            </p:style>
+          </p:cxnSp>
+          <p:cxnSp>
+            <p:nvCxnSpPr>
+              <p:cNvPr id="25" name="Line">
+                <a:extLst>
+                  <a:ext uri="{FF2B5EF4-FFF2-40B4-BE49-F238E27FC236}">
+                    <a16:creationId xmlns:a16="http://schemas.microsoft.com/office/drawing/2014/main" id="{A88544A0-E575-40EC-9499-4C3714C42824}"/>
+                  </a:ext>
+                </a:extLst>
+              </p:cNvPr>
+              <p:cNvCxnSpPr/>
+              <p:nvPr/>
+            </p:nvCxnSpPr>
+            <p:spPr>
+              <a:xfrm flipH="1">
+                <a:off x="9661395" y="131588"/>
+                <a:ext cx="70773" cy="76200"/>
+              </a:xfrm>
+              <a:prstGeom prst="line">
+                <a:avLst/>
+              </a:prstGeom>
+              <a:ln w="12700">
+                <a:solidFill>
+                  <a:srgbClr val="FFFFFF"/>
+                </a:solidFill>
+              </a:ln>
+            </p:spPr>
+            <p:style>
+              <a:lnRef idx="1">
+                <a:srgbClr val="4F81BD"/>
+              </a:lnRef>
+              <a:fillRef idx="0">
+                <a:srgbClr val="4F81BD"/>
+              </a:fillRef>
+              <a:effectRef idx="0">
+                <a:srgbClr val="4F81BD"/>
+              </a:effectRef>
+              <a:fontRef idx="minor">
+                <a:srgbClr val="000000"/>
+              </a:fontRef>
+            </p:style>
+          </p:cxnSp>
+          <p:sp>
+            <p:nvSpPr>
+              <p:cNvPr id="26" name="Line">
+                <a:extLst>
+                  <a:ext uri="{FF2B5EF4-FFF2-40B4-BE49-F238E27FC236}">
+                    <a16:creationId xmlns:a16="http://schemas.microsoft.com/office/drawing/2014/main" id="{FD95A1D0-FD4E-41DE-9A79-0A42998AA983}"/>
+                  </a:ext>
+                </a:extLst>
+              </p:cNvPr>
+              <p:cNvSpPr/>
+              <p:nvPr/>
+            </p:nvSpPr>
+            <p:spPr>
+              <a:xfrm rot="10800000" flipV="1">
+                <a:off x="9499472" y="143255"/>
+                <a:ext cx="91440" cy="9144"/>
+              </a:xfrm>
+              <a:prstGeom prst="rect">
+                <a:avLst/>
+              </a:prstGeom>
+              <a:solidFill>
+                <a:srgbClr val="919191"/>
+              </a:solidFill>
+              <a:ln w="3175">
+                <a:solidFill>
+                  <a:srgbClr val="FFFFFF"/>
+                </a:solidFill>
+              </a:ln>
+            </p:spPr>
+            <p:style>
+              <a:lnRef idx="2">
+                <a:srgbClr val="4F81BD">
+                  <a:shade val="50000"/>
+                </a:srgbClr>
+              </a:lnRef>
+              <a:fillRef idx="1001">
+                <a:srgbClr val="000000"/>
+              </a:fillRef>
+              <a:effectRef idx="0">
+                <a:srgbClr val="4F81BD"/>
+              </a:effectRef>
+              <a:fontRef idx="minor">
+                <a:srgbClr val="000000"/>
+              </a:fontRef>
+            </p:style>
+            <p:txBody>
+              <a:bodyPr rtlCol="0" anchor="ctr"/>
+              <a:lstStyle/>
+              <a:p>
+                <a:pPr algn="ctr"/>
+                <a:endParaRPr lang="en-US" sz="1050" dirty="0">
+                  <a:solidFill>
+                    <a:prstClr val="white"/>
+                  </a:solidFill>
+                </a:endParaRPr>
+              </a:p>
+            </p:txBody>
+          </p:sp>
+          <p:sp>
+            <p:nvSpPr>
+              <p:cNvPr id="27" name="Line">
+                <a:extLst>
+                  <a:ext uri="{FF2B5EF4-FFF2-40B4-BE49-F238E27FC236}">
+                    <a16:creationId xmlns:a16="http://schemas.microsoft.com/office/drawing/2014/main" id="{448A67CF-F47C-4391-8E97-63CD566D5A5A}"/>
+                  </a:ext>
+                </a:extLst>
+              </p:cNvPr>
+              <p:cNvSpPr/>
+              <p:nvPr/>
+            </p:nvSpPr>
+            <p:spPr>
+              <a:xfrm rot="10800000" flipV="1">
+                <a:off x="9498658" y="135261"/>
+                <a:ext cx="91440" cy="72527"/>
+              </a:xfrm>
+              <a:prstGeom prst="rect">
+                <a:avLst/>
+              </a:prstGeom>
+              <a:noFill/>
+              <a:ln w="12700">
+                <a:solidFill>
+                  <a:srgbClr val="FFFFFF"/>
+                </a:solidFill>
+              </a:ln>
+            </p:spPr>
+            <p:style>
+              <a:lnRef idx="2">
+                <a:srgbClr val="4F81BD">
+                  <a:shade val="50000"/>
+                </a:srgbClr>
+              </a:lnRef>
+              <a:fillRef idx="1001">
+                <a:srgbClr val="000000"/>
+              </a:fillRef>
+              <a:effectRef idx="0">
+                <a:srgbClr val="4F81BD"/>
+              </a:effectRef>
+              <a:fontRef idx="minor">
+                <a:srgbClr val="000000"/>
+              </a:fontRef>
+            </p:style>
+            <p:txBody>
+              <a:bodyPr rtlCol="0" anchor="ctr"/>
+              <a:lstStyle/>
+              <a:p>
+                <a:pPr algn="ctr"/>
+                <a:endParaRPr lang="en-US" sz="1050" dirty="0">
+                  <a:solidFill>
+                    <a:prstClr val="white"/>
+                  </a:solidFill>
+                </a:endParaRPr>
+              </a:p>
+            </p:txBody>
+          </p:sp>
+          <p:sp>
+            <p:nvSpPr>
+              <p:cNvPr id="28" name="Line">
+                <a:extLst>
+                  <a:ext uri="{FF2B5EF4-FFF2-40B4-BE49-F238E27FC236}">
+                    <a16:creationId xmlns:a16="http://schemas.microsoft.com/office/drawing/2014/main" id="{6E95B930-6DC7-46B3-A96A-E0470137DABC}"/>
+                  </a:ext>
+                </a:extLst>
+              </p:cNvPr>
+              <p:cNvSpPr/>
+              <p:nvPr/>
+            </p:nvSpPr>
+            <p:spPr>
+              <a:xfrm rot="10800000" flipV="1">
+                <a:off x="9347642" y="200476"/>
+                <a:ext cx="91440" cy="9144"/>
+              </a:xfrm>
+              <a:prstGeom prst="rect">
+                <a:avLst/>
+              </a:prstGeom>
+              <a:solidFill>
+                <a:srgbClr val="919191"/>
+              </a:solidFill>
+              <a:ln w="3175">
+                <a:solidFill>
+                  <a:srgbClr val="FFFFFF"/>
+                </a:solidFill>
+              </a:ln>
+            </p:spPr>
+            <p:style>
+              <a:lnRef idx="2">
+                <a:srgbClr val="4F81BD">
+                  <a:shade val="50000"/>
+                </a:srgbClr>
+              </a:lnRef>
+              <a:fillRef idx="1001">
+                <a:srgbClr val="000000"/>
+              </a:fillRef>
+              <a:effectRef idx="0">
+                <a:srgbClr val="4F81BD"/>
+              </a:effectRef>
+              <a:fontRef idx="minor">
+                <a:srgbClr val="000000"/>
+              </a:fontRef>
+            </p:style>
+            <p:txBody>
+              <a:bodyPr rtlCol="0" anchor="ctr"/>
+              <a:lstStyle/>
+              <a:p>
+                <a:pPr algn="ctr"/>
+                <a:endParaRPr lang="en-US" sz="1050" dirty="0">
+                  <a:solidFill>
+                    <a:prstClr val="white"/>
+                  </a:solidFill>
+                </a:endParaRPr>
+              </a:p>
+            </p:txBody>
+          </p:sp>
+        </p:grpSp>
+        <p:sp>
+          <p:nvSpPr>
+            <p:cNvPr id="10" name="WebPageBody">
+              <a:extLst>
+                <a:ext uri="{FF2B5EF4-FFF2-40B4-BE49-F238E27FC236}">
+                  <a16:creationId xmlns:a16="http://schemas.microsoft.com/office/drawing/2014/main" id="{B73FE404-167A-4A45-A0E2-F0BBC74EC1F0}"/>
+                </a:ext>
+              </a:extLst>
+            </p:cNvPr>
+            <p:cNvSpPr/>
+            <p:nvPr/>
+          </p:nvSpPr>
+          <p:spPr>
+            <a:xfrm>
+              <a:off x="76200" y="685159"/>
+              <a:ext cx="8991600" cy="6066801"/>
+            </a:xfrm>
+            <a:prstGeom prst="rect">
+              <a:avLst/>
+            </a:prstGeom>
+            <a:solidFill>
+              <a:sysClr val="window" lastClr="FFFFFF"/>
+            </a:solidFill>
+            <a:ln w="3175" cap="flat" cmpd="sng" algn="ctr">
+              <a:solidFill>
+                <a:srgbClr val="000000">
+                  <a:lumMod val="50000"/>
+                  <a:lumOff val="50000"/>
+                </a:srgbClr>
+              </a:solidFill>
+              <a:prstDash val="solid"/>
+            </a:ln>
+            <a:effectLst/>
+          </p:spPr>
+          <p:txBody>
+            <a:bodyPr rtlCol="0" anchor="ctr"/>
+            <a:lstStyle/>
+            <a:p>
+              <a:pPr algn="ctr"/>
+              <a:endParaRPr lang="en-US" sz="1050" kern="0">
+                <a:solidFill>
+                  <a:prstClr val="white"/>
+                </a:solidFill>
+                <a:latin typeface="Segoe UI"/>
+              </a:endParaRPr>
+            </a:p>
+          </p:txBody>
+        </p:sp>
+        <p:grpSp>
+          <p:nvGrpSpPr>
+            <p:cNvPr id="11" name="Group 8">
+              <a:extLst>
+                <a:ext uri="{FF2B5EF4-FFF2-40B4-BE49-F238E27FC236}">
+                  <a16:creationId xmlns:a16="http://schemas.microsoft.com/office/drawing/2014/main" id="{4134BBAF-2757-4D9C-8D0F-C45F631514E5}"/>
+                </a:ext>
+              </a:extLst>
+            </p:cNvPr>
+            <p:cNvGrpSpPr/>
+            <p:nvPr/>
+          </p:nvGrpSpPr>
+          <p:grpSpPr>
+            <a:xfrm>
+              <a:off x="8386335" y="360579"/>
+              <a:ext cx="640645" cy="183940"/>
+              <a:chOff x="8303527" y="360579"/>
+              <a:chExt cx="640645" cy="183940"/>
+            </a:xfrm>
+          </p:grpSpPr>
+          <p:pic>
+            <p:nvPicPr>
+              <p:cNvPr id="21" name="Picture 2" descr="C:\Users\t-dantay\Documents\Placeholders\home.png">
+                <a:extLst>
+                  <a:ext uri="{FF2B5EF4-FFF2-40B4-BE49-F238E27FC236}">
+                    <a16:creationId xmlns:a16="http://schemas.microsoft.com/office/drawing/2014/main" id="{D43FC607-E75A-417B-8F27-76FBD380F572}"/>
+                  </a:ext>
+                </a:extLst>
+              </p:cNvPr>
+              <p:cNvPicPr>
+                <a:picLocks noChangeAspect="1" noChangeArrowheads="1"/>
+              </p:cNvPicPr>
+              <p:nvPr/>
+            </p:nvPicPr>
+            <p:blipFill>
+              <a:blip r:embed="rId22" cstate="print">
+                <a:extLst>
+                  <a:ext uri="{28A0092B-C50C-407E-A947-70E740481C1C}">
+                    <a14:useLocalDpi xmlns:a14="http://schemas.microsoft.com/office/drawing/2010/main" val="0"/>
+                  </a:ext>
+                </a:extLst>
+              </a:blip>
+              <a:srcRect/>
+              <a:stretch>
+                <a:fillRect/>
+              </a:stretch>
+            </p:blipFill>
+            <p:spPr bwMode="auto">
+              <a:xfrm>
+                <a:off x="8303527" y="361109"/>
+                <a:ext cx="185783" cy="182880"/>
+              </a:xfrm>
+              <a:prstGeom prst="rect">
+                <a:avLst/>
+              </a:prstGeom>
+              <a:noFill/>
+              <a:extLst>
+                <a:ext uri="{909E8E84-426E-40DD-AFC4-6F175D3DCCD1}">
+                  <a14:hiddenFill xmlns:a14="http://schemas.microsoft.com/office/drawing/2010/main">
+                    <a:solidFill>
+                      <a:srgbClr val="FFFFFF"/>
+                    </a:solidFill>
+                  </a14:hiddenFill>
+                </a:ext>
+              </a:extLst>
+            </p:spPr>
+          </p:pic>
+          <p:pic>
+            <p:nvPicPr>
+              <p:cNvPr id="22" name="Picture 2" descr="C:\Users\t-dantay\Documents\Placeholders\setting.png">
+                <a:extLst>
+                  <a:ext uri="{FF2B5EF4-FFF2-40B4-BE49-F238E27FC236}">
+                    <a16:creationId xmlns:a16="http://schemas.microsoft.com/office/drawing/2014/main" id="{D6CFB0E4-7B90-4343-B7FF-EC27787B65C1}"/>
+                  </a:ext>
+                </a:extLst>
+              </p:cNvPr>
+              <p:cNvPicPr>
+                <a:picLocks noChangeAspect="1" noChangeArrowheads="1"/>
+              </p:cNvPicPr>
+              <p:nvPr/>
+            </p:nvPicPr>
+            <p:blipFill rotWithShape="1">
+              <a:blip r:embed="rId23" cstate="print">
+                <a:extLst>
+                  <a:ext uri="{28A0092B-C50C-407E-A947-70E740481C1C}">
+                    <a14:useLocalDpi xmlns:a14="http://schemas.microsoft.com/office/drawing/2010/main" val="0"/>
+                  </a:ext>
+                </a:extLst>
+              </a:blip>
+              <a:srcRect t="13480" r="35484"/>
+              <a:stretch/>
+            </p:blipFill>
+            <p:spPr bwMode="auto">
+              <a:xfrm>
+                <a:off x="8761292" y="360579"/>
+                <a:ext cx="182880" cy="183940"/>
+              </a:xfrm>
+              <a:prstGeom prst="rect">
+                <a:avLst/>
+              </a:prstGeom>
+              <a:noFill/>
+              <a:extLst>
+                <a:ext uri="{909E8E84-426E-40DD-AFC4-6F175D3DCCD1}">
+                  <a14:hiddenFill xmlns:a14="http://schemas.microsoft.com/office/drawing/2010/main">
+                    <a:solidFill>
+                      <a:srgbClr val="FFFFFF"/>
+                    </a:solidFill>
+                  </a14:hiddenFill>
+                </a:ext>
+              </a:extLst>
+            </p:spPr>
+          </p:pic>
+          <p:pic>
+            <p:nvPicPr>
+              <p:cNvPr id="23" name="Picture 2" descr="C:\Users\t-dantay\Documents\Placeholders\star.png">
+                <a:extLst>
+                  <a:ext uri="{FF2B5EF4-FFF2-40B4-BE49-F238E27FC236}">
+                    <a16:creationId xmlns:a16="http://schemas.microsoft.com/office/drawing/2014/main" id="{34598032-3E59-46C8-922F-B3D5BFFFC1A1}"/>
+                  </a:ext>
+                </a:extLst>
+              </p:cNvPr>
+              <p:cNvPicPr>
+                <a:picLocks noChangeAspect="1" noChangeArrowheads="1"/>
+              </p:cNvPicPr>
+              <p:nvPr/>
+            </p:nvPicPr>
+            <p:blipFill>
+              <a:blip r:embed="rId24" cstate="print">
+                <a:extLst>
+                  <a:ext uri="{28A0092B-C50C-407E-A947-70E740481C1C}">
+                    <a14:useLocalDpi xmlns:a14="http://schemas.microsoft.com/office/drawing/2010/main" val="0"/>
+                  </a:ext>
+                </a:extLst>
+              </a:blip>
+              <a:srcRect/>
+              <a:stretch>
+                <a:fillRect/>
+              </a:stretch>
+            </p:blipFill>
+            <p:spPr bwMode="auto">
+              <a:xfrm>
+                <a:off x="8529364" y="361109"/>
+                <a:ext cx="191874" cy="182880"/>
+              </a:xfrm>
+              <a:prstGeom prst="rect">
+                <a:avLst/>
+              </a:prstGeom>
+              <a:noFill/>
+              <a:extLst>
+                <a:ext uri="{909E8E84-426E-40DD-AFC4-6F175D3DCCD1}">
+                  <a14:hiddenFill xmlns:a14="http://schemas.microsoft.com/office/drawing/2010/main">
+                    <a:solidFill>
+                      <a:srgbClr val="FFFFFF"/>
+                    </a:solidFill>
+                  </a14:hiddenFill>
+                </a:ext>
+              </a:extLst>
+            </p:spPr>
+          </p:pic>
+        </p:grpSp>
+        <p:grpSp>
+          <p:nvGrpSpPr>
+            <p:cNvPr id="12" name="Group 9">
+              <a:extLst>
+                <a:ext uri="{FF2B5EF4-FFF2-40B4-BE49-F238E27FC236}">
+                  <a16:creationId xmlns:a16="http://schemas.microsoft.com/office/drawing/2014/main" id="{EC836544-AE78-47FB-A93D-0D7D01A0EC1F}"/>
+                </a:ext>
+              </a:extLst>
+            </p:cNvPr>
+            <p:cNvGrpSpPr/>
+            <p:nvPr/>
+          </p:nvGrpSpPr>
+          <p:grpSpPr>
+            <a:xfrm>
+              <a:off x="923925" y="340846"/>
+              <a:ext cx="7142930" cy="228600"/>
+              <a:chOff x="923925" y="340846"/>
+              <a:chExt cx="7142930" cy="228600"/>
+            </a:xfrm>
+          </p:grpSpPr>
+          <p:sp>
+            <p:nvSpPr>
+              <p:cNvPr id="13" name="UrlBar">
+                <a:extLst>
+                  <a:ext uri="{FF2B5EF4-FFF2-40B4-BE49-F238E27FC236}">
+                    <a16:creationId xmlns:a16="http://schemas.microsoft.com/office/drawing/2014/main" id="{ADC9B5C3-D90C-47C5-AFD1-F9009EE1E273}"/>
+                  </a:ext>
+                </a:extLst>
+              </p:cNvPr>
+              <p:cNvSpPr/>
+              <p:nvPr/>
+            </p:nvSpPr>
+            <p:spPr>
+              <a:xfrm>
+                <a:off x="923925" y="340846"/>
+                <a:ext cx="7142930" cy="228600"/>
+              </a:xfrm>
+              <a:prstGeom prst="rect">
+                <a:avLst/>
+              </a:prstGeom>
+              <a:solidFill>
+                <a:sysClr val="window" lastClr="FFFFFF"/>
+              </a:solidFill>
+              <a:ln w="3175" cap="flat" cmpd="sng" algn="ctr">
+                <a:solidFill>
+                  <a:srgbClr val="000000">
+                    <a:lumMod val="50000"/>
+                    <a:lumOff val="50000"/>
+                  </a:srgbClr>
+                </a:solidFill>
+                <a:prstDash val="solid"/>
+              </a:ln>
+              <a:effectLst/>
+            </p:spPr>
+            <p:txBody>
+              <a:bodyPr rtlCol="0" anchor="ctr"/>
+              <a:lstStyle/>
+              <a:p>
+                <a:r>
+                  <a:rPr lang="en-US" sz="1200" kern="0" dirty="0">
+                    <a:solidFill>
+                      <a:prstClr val="black">
+                        <a:lumMod val="75000"/>
+                        <a:lumOff val="25000"/>
+                      </a:prstClr>
+                    </a:solidFill>
+                    <a:latin typeface="Segoe UI"/>
+                  </a:rPr>
+                  <a:t>http://www.repositoriouv.mx</a:t>
+                </a:r>
+              </a:p>
+            </p:txBody>
+          </p:sp>
+          <p:grpSp>
+            <p:nvGrpSpPr>
+              <p:cNvPr id="14" name="Group 11">
+                <a:extLst>
+                  <a:ext uri="{FF2B5EF4-FFF2-40B4-BE49-F238E27FC236}">
+                    <a16:creationId xmlns:a16="http://schemas.microsoft.com/office/drawing/2014/main" id="{5C9E0319-0399-499F-95F7-29BC6B8F88B6}"/>
+                  </a:ext>
+                </a:extLst>
+              </p:cNvPr>
+              <p:cNvGrpSpPr/>
+              <p:nvPr/>
+            </p:nvGrpSpPr>
+            <p:grpSpPr>
+              <a:xfrm>
+                <a:off x="7260350" y="363706"/>
+                <a:ext cx="744325" cy="182880"/>
+                <a:chOff x="7260350" y="363706"/>
+                <a:chExt cx="744325" cy="182880"/>
+              </a:xfrm>
+            </p:grpSpPr>
+            <p:pic>
+              <p:nvPicPr>
+                <p:cNvPr id="15" name="Search" descr="C:\Users\t-dantay\Documents\Placeholders\search.png">
+                  <a:extLst>
+                    <a:ext uri="{FF2B5EF4-FFF2-40B4-BE49-F238E27FC236}">
+                      <a16:creationId xmlns:a16="http://schemas.microsoft.com/office/drawing/2014/main" id="{FEBF1E03-F8C2-4954-A228-9DF266DDDA9F}"/>
+                    </a:ext>
+                  </a:extLst>
+                </p:cNvPr>
+                <p:cNvPicPr>
+                  <a:picLocks noChangeAspect="1" noChangeArrowheads="1"/>
+                </p:cNvPicPr>
+                <p:nvPr/>
+              </p:nvPicPr>
+              <p:blipFill>
+                <a:blip r:embed="rId25" cstate="print">
+                  <a:extLst>
+                    <a:ext uri="{28A0092B-C50C-407E-A947-70E740481C1C}">
+                      <a14:useLocalDpi xmlns:a14="http://schemas.microsoft.com/office/drawing/2010/main" val="0"/>
+                    </a:ext>
+                  </a:extLst>
+                </a:blip>
+                <a:srcRect/>
+                <a:stretch>
+                  <a:fillRect/>
+                </a:stretch>
+              </p:blipFill>
+              <p:spPr bwMode="auto">
+                <a:xfrm flipH="1">
+                  <a:off x="7260350" y="363706"/>
+                  <a:ext cx="182880" cy="182880"/>
+                </a:xfrm>
+                <a:prstGeom prst="rect">
+                  <a:avLst/>
+                </a:prstGeom>
+                <a:noFill/>
+                <a:extLst>
+                  <a:ext uri="{909E8E84-426E-40DD-AFC4-6F175D3DCCD1}">
+                    <a14:hiddenFill xmlns:a14="http://schemas.microsoft.com/office/drawing/2010/main">
+                      <a:solidFill>
+                        <a:srgbClr val="FFFFFF"/>
+                      </a:solidFill>
+                    </a14:hiddenFill>
+                  </a:ext>
+                </a:extLst>
+              </p:spPr>
+            </p:pic>
+            <p:pic>
+              <p:nvPicPr>
+                <p:cNvPr id="16" name="Refresh" descr="C:\Users\t-dantay\Documents\First24\arrowrepeat1.png">
+                  <a:extLst>
+                    <a:ext uri="{FF2B5EF4-FFF2-40B4-BE49-F238E27FC236}">
+                      <a16:creationId xmlns:a16="http://schemas.microsoft.com/office/drawing/2014/main" id="{E72163D2-D036-49AE-B68B-8B104C6C87CD}"/>
+                    </a:ext>
+                  </a:extLst>
+                </p:cNvPr>
+                <p:cNvPicPr>
+                  <a:picLocks noChangeAspect="1" noChangeArrowheads="1"/>
+                </p:cNvPicPr>
+                <p:nvPr/>
+              </p:nvPicPr>
+              <p:blipFill>
+                <a:blip r:embed="rId26" cstate="print">
+                  <a:extLst>
+                    <a:ext uri="{28A0092B-C50C-407E-A947-70E740481C1C}">
+                      <a14:useLocalDpi xmlns:a14="http://schemas.microsoft.com/office/drawing/2010/main" val="0"/>
+                    </a:ext>
+                  </a:extLst>
+                </a:blip>
+                <a:srcRect/>
+                <a:stretch>
+                  <a:fillRect/>
+                </a:stretch>
+              </p:blipFill>
+              <p:spPr bwMode="auto">
+                <a:xfrm>
+                  <a:off x="7644400" y="363706"/>
+                  <a:ext cx="182880" cy="182880"/>
+                </a:xfrm>
+                <a:prstGeom prst="rect">
+                  <a:avLst/>
+                </a:prstGeom>
+                <a:noFill/>
+                <a:extLst>
+                  <a:ext uri="{909E8E84-426E-40DD-AFC4-6F175D3DCCD1}">
+                    <a14:hiddenFill xmlns:a14="http://schemas.microsoft.com/office/drawing/2010/main">
+                      <a:solidFill>
+                        <a:srgbClr val="FFFFFF"/>
+                      </a:solidFill>
+                    </a14:hiddenFill>
+                  </a:ext>
+                </a:extLst>
+              </p:spPr>
+            </p:pic>
+            <p:pic>
+              <p:nvPicPr>
+                <p:cNvPr id="17" name="Drop Down" descr="C:\Users\t-dantay\Documents\First24\arrowsimple1.png">
+                  <a:extLst>
+                    <a:ext uri="{FF2B5EF4-FFF2-40B4-BE49-F238E27FC236}">
+                      <a16:creationId xmlns:a16="http://schemas.microsoft.com/office/drawing/2014/main" id="{8A1BA794-5D04-4AAB-8208-5FAFDE4C6A93}"/>
+                    </a:ext>
+                  </a:extLst>
+                </p:cNvPr>
+                <p:cNvPicPr>
+                  <a:picLocks noChangeAspect="1" noChangeArrowheads="1"/>
+                </p:cNvPicPr>
+                <p:nvPr/>
+              </p:nvPicPr>
+              <p:blipFill>
+                <a:blip r:embed="rId27" cstate="print">
+                  <a:extLst>
+                    <a:ext uri="{28A0092B-C50C-407E-A947-70E740481C1C}">
+                      <a14:useLocalDpi xmlns:a14="http://schemas.microsoft.com/office/drawing/2010/main" val="0"/>
+                    </a:ext>
+                  </a:extLst>
+                </a:blip>
+                <a:srcRect/>
+                <a:stretch>
+                  <a:fillRect/>
+                </a:stretch>
+              </p:blipFill>
+              <p:spPr bwMode="auto">
+                <a:xfrm rot="5400000">
+                  <a:off x="7476150" y="409426"/>
+                  <a:ext cx="91440" cy="91440"/>
+                </a:xfrm>
+                <a:prstGeom prst="rect">
+                  <a:avLst/>
+                </a:prstGeom>
+                <a:noFill/>
+                <a:extLst>
+                  <a:ext uri="{909E8E84-426E-40DD-AFC4-6F175D3DCCD1}">
+                    <a14:hiddenFill xmlns:a14="http://schemas.microsoft.com/office/drawing/2010/main">
+                      <a:solidFill>
+                        <a:srgbClr val="FFFFFF"/>
+                      </a:solidFill>
+                    </a14:hiddenFill>
+                  </a:ext>
+                </a:extLst>
+              </p:spPr>
+            </p:pic>
+            <p:grpSp>
+              <p:nvGrpSpPr>
+                <p:cNvPr id="18" name="X">
+                  <a:extLst>
+                    <a:ext uri="{FF2B5EF4-FFF2-40B4-BE49-F238E27FC236}">
+                      <a16:creationId xmlns:a16="http://schemas.microsoft.com/office/drawing/2014/main" id="{E489278D-4D3F-403B-BC1A-A2F2D56C54C3}"/>
+                    </a:ext>
+                  </a:extLst>
+                </p:cNvPr>
+                <p:cNvGrpSpPr/>
+                <p:nvPr/>
+              </p:nvGrpSpPr>
+              <p:grpSpPr>
+                <a:xfrm>
+                  <a:off x="7913235" y="409426"/>
+                  <a:ext cx="91440" cy="91440"/>
+                  <a:chOff x="4687215" y="1739180"/>
+                  <a:chExt cx="91440" cy="91440"/>
+                </a:xfrm>
+              </p:grpSpPr>
+              <p:cxnSp>
+                <p:nvCxnSpPr>
+                  <p:cNvPr id="19" name="Straight Connector 16">
+                    <a:extLst>
+                      <a:ext uri="{FF2B5EF4-FFF2-40B4-BE49-F238E27FC236}">
+                        <a16:creationId xmlns:a16="http://schemas.microsoft.com/office/drawing/2014/main" id="{E79B5E07-E436-4B6A-B3EC-97C87A23C749}"/>
+                      </a:ext>
+                    </a:extLst>
+                  </p:cNvPr>
+                  <p:cNvCxnSpPr/>
+                  <p:nvPr/>
+                </p:nvCxnSpPr>
+                <p:spPr>
+                  <a:xfrm flipV="1">
+                    <a:off x="4687215" y="1739180"/>
+                    <a:ext cx="91440" cy="91440"/>
+                  </a:xfrm>
+                  <a:prstGeom prst="line">
+                    <a:avLst/>
+                  </a:prstGeom>
+                  <a:ln w="28575">
+                    <a:solidFill>
+                      <a:srgbClr val="FFFFFF">
+                        <a:lumMod val="50000"/>
+                      </a:srgbClr>
+                    </a:solidFill>
+                  </a:ln>
+                </p:spPr>
+                <p:style>
+                  <a:lnRef idx="1">
+                    <a:srgbClr val="FFFFFF"/>
+                  </a:lnRef>
+                  <a:fillRef idx="0">
+                    <a:srgbClr val="FFFFFF"/>
+                  </a:fillRef>
+                  <a:effectRef idx="0">
+                    <a:srgbClr val="FFFFFF"/>
+                  </a:effectRef>
+                  <a:fontRef idx="minor">
+                    <a:srgbClr val="000000"/>
+                  </a:fontRef>
+                </p:style>
+              </p:cxnSp>
+              <p:cxnSp>
+                <p:nvCxnSpPr>
+                  <p:cNvPr id="20" name="Straight Connector 17">
+                    <a:extLst>
+                      <a:ext uri="{FF2B5EF4-FFF2-40B4-BE49-F238E27FC236}">
+                        <a16:creationId xmlns:a16="http://schemas.microsoft.com/office/drawing/2014/main" id="{563CA86A-B5F5-4C0A-BEDD-398DA4940200}"/>
+                      </a:ext>
+                    </a:extLst>
+                  </p:cNvPr>
+                  <p:cNvCxnSpPr/>
+                  <p:nvPr/>
+                </p:nvCxnSpPr>
+                <p:spPr>
+                  <a:xfrm>
+                    <a:off x="4687215" y="1739180"/>
+                    <a:ext cx="91440" cy="91440"/>
+                  </a:xfrm>
+                  <a:prstGeom prst="line">
+                    <a:avLst/>
+                  </a:prstGeom>
+                  <a:ln w="28575">
+                    <a:solidFill>
+                      <a:srgbClr val="FFFFFF">
+                        <a:lumMod val="50000"/>
+                      </a:srgbClr>
+                    </a:solidFill>
+                  </a:ln>
+                </p:spPr>
+                <p:style>
+                  <a:lnRef idx="1">
+                    <a:srgbClr val="FFFFFF"/>
+                  </a:lnRef>
+                  <a:fillRef idx="0">
+                    <a:srgbClr val="FFFFFF"/>
+                  </a:fillRef>
+                  <a:effectRef idx="0">
+                    <a:srgbClr val="FFFFFF"/>
+                  </a:effectRef>
+                  <a:fontRef idx="minor">
+                    <a:srgbClr val="000000"/>
+                  </a:fontRef>
+                </p:style>
+              </p:cxnSp>
+            </p:grpSp>
+          </p:grpSp>
+        </p:grpSp>
+      </p:grpSp>
+      <p:sp>
+        <p:nvSpPr>
+          <p:cNvPr id="33" name="Content">
+            <a:extLst>
+              <a:ext uri="{FF2B5EF4-FFF2-40B4-BE49-F238E27FC236}">
+                <a16:creationId xmlns:a16="http://schemas.microsoft.com/office/drawing/2014/main" id="{4A77312A-23B7-4842-B850-7AC7FBF7BA9D}"/>
+              </a:ext>
+            </a:extLst>
+          </p:cNvPr>
+          <p:cNvSpPr txBox="1"/>
+          <p:nvPr>
+            <p:custDataLst>
+              <p:custData r:id="rId2"/>
+            </p:custDataLst>
+          </p:nvPr>
+        </p:nvSpPr>
+        <p:spPr>
+          <a:xfrm>
+            <a:off x="9927920" y="889990"/>
+            <a:ext cx="2092239" cy="784830"/>
+          </a:xfrm>
+          <a:prstGeom prst="rect">
+            <a:avLst/>
+          </a:prstGeom>
+          <a:noFill/>
+        </p:spPr>
+        <p:txBody>
+          <a:bodyPr wrap="none" lIns="91440" tIns="18288" rIns="91440" bIns="27432" rtlCol="0" anchor="ctr" anchorCtr="0">
+            <a:spAutoFit/>
+          </a:bodyPr>
+          <a:lstStyle/>
+          <a:p>
+            <a:r>
+              <a:rPr lang="en-US" sz="2400" dirty="0">
+                <a:solidFill>
+                  <a:srgbClr val="000000"/>
+                </a:solidFill>
+                <a:latin typeface="Raleway" panose="020B0503030101060003" pitchFamily="34" charset="0"/>
+                <a:ea typeface="Segoe UI" pitchFamily="34" charset="0"/>
+                <a:cs typeface="Segoe UI" pitchFamily="34" charset="0"/>
+              </a:rPr>
+              <a:t>Juan Carlos </a:t>
+            </a:r>
+          </a:p>
+          <a:p>
+            <a:r>
+              <a:rPr lang="en-US" sz="2400" dirty="0">
+                <a:solidFill>
+                  <a:srgbClr val="000000"/>
+                </a:solidFill>
+                <a:latin typeface="Raleway" panose="020B0503030101060003" pitchFamily="34" charset="0"/>
+                <a:ea typeface="Segoe UI" pitchFamily="34" charset="0"/>
+                <a:cs typeface="Segoe UI" pitchFamily="34" charset="0"/>
+              </a:rPr>
+              <a:t>Pérez Arriaga</a:t>
+            </a:r>
+          </a:p>
+        </p:txBody>
+      </p:sp>
+      <p:sp>
+        <p:nvSpPr>
+          <p:cNvPr id="44" name="Tile">
+            <a:extLst>
+              <a:ext uri="{FF2B5EF4-FFF2-40B4-BE49-F238E27FC236}">
+                <a16:creationId xmlns:a16="http://schemas.microsoft.com/office/drawing/2014/main" id="{0FEE1A62-912F-435C-A66D-F1D5354E6D8F}"/>
+              </a:ext>
+            </a:extLst>
+          </p:cNvPr>
+          <p:cNvSpPr/>
+          <p:nvPr>
+            <p:custDataLst>
+              <p:custData r:id="rId3"/>
+            </p:custDataLst>
+          </p:nvPr>
+        </p:nvSpPr>
+        <p:spPr>
+          <a:xfrm>
+            <a:off x="108796" y="685159"/>
+            <a:ext cx="2771203" cy="6066801"/>
+          </a:xfrm>
+          <a:prstGeom prst="rect">
+            <a:avLst/>
+          </a:prstGeom>
+          <a:solidFill>
+            <a:schemeClr val="bg1">
+              <a:lumMod val="95000"/>
+            </a:schemeClr>
+          </a:solidFill>
+          <a:ln>
+            <a:noFill/>
+          </a:ln>
+        </p:spPr>
+        <p:style>
+          <a:lnRef idx="2">
+            <a:srgbClr val="4F81BD">
+              <a:shade val="50000"/>
+            </a:srgbClr>
+          </a:lnRef>
+          <a:fillRef idx="1">
+            <a:srgbClr val="4F81BD"/>
+          </a:fillRef>
+          <a:effectRef idx="0">
+            <a:srgbClr val="4F81BD"/>
+          </a:effectRef>
+          <a:fontRef idx="minor">
+            <a:srgbClr val="000000"/>
+          </a:fontRef>
+        </p:style>
+        <p:txBody>
+          <a:bodyPr rtlCol="0" anchor="ctr"/>
+          <a:lstStyle/>
+          <a:p>
+            <a:pPr algn="ctr"/>
+            <a:endParaRPr lang="en-US" dirty="0"/>
+          </a:p>
+        </p:txBody>
+      </p:sp>
+      <p:sp>
+        <p:nvSpPr>
+          <p:cNvPr id="34" name="Content">
+            <a:extLst>
+              <a:ext uri="{FF2B5EF4-FFF2-40B4-BE49-F238E27FC236}">
+                <a16:creationId xmlns:a16="http://schemas.microsoft.com/office/drawing/2014/main" id="{67F08243-17E6-4464-978D-AE81A590CD79}"/>
+              </a:ext>
+            </a:extLst>
+          </p:cNvPr>
+          <p:cNvSpPr txBox="1"/>
+          <p:nvPr>
+            <p:custDataLst>
+              <p:custData r:id="rId4"/>
+            </p:custDataLst>
+          </p:nvPr>
+        </p:nvSpPr>
+        <p:spPr>
+          <a:xfrm>
+            <a:off x="218185" y="642375"/>
+            <a:ext cx="1648208" cy="1277273"/>
+          </a:xfrm>
+          <a:prstGeom prst="rect">
+            <a:avLst/>
+          </a:prstGeom>
+          <a:noFill/>
+        </p:spPr>
+        <p:txBody>
+          <a:bodyPr wrap="none" lIns="91440" tIns="18288" rIns="91440" bIns="27432" rtlCol="0" anchor="ctr" anchorCtr="0">
+            <a:spAutoFit/>
+          </a:bodyPr>
+          <a:lstStyle/>
+          <a:p>
+            <a:r>
+              <a:rPr lang="en-US" sz="8000" b="1" dirty="0">
+                <a:solidFill>
+                  <a:srgbClr val="92D050"/>
+                </a:solidFill>
+                <a:effectLst>
+                  <a:outerShdw blurRad="38100" dist="38100" dir="2700000" algn="tl">
+                    <a:srgbClr val="000000">
+                      <a:alpha val="43137"/>
+                    </a:srgbClr>
+                  </a:outerShdw>
+                </a:effectLst>
+                <a:latin typeface="Raleway" panose="020B0503030101060003" pitchFamily="34" charset="0"/>
+                <a:ea typeface="Segoe UI" pitchFamily="34" charset="0"/>
+                <a:cs typeface="Segoe UI" pitchFamily="34" charset="0"/>
+              </a:rPr>
+              <a:t>U</a:t>
+            </a:r>
+            <a:r>
+              <a:rPr lang="en-US" sz="8000" b="1" dirty="0">
+                <a:solidFill>
+                  <a:schemeClr val="accent1">
+                    <a:lumMod val="75000"/>
+                  </a:schemeClr>
+                </a:solidFill>
+                <a:effectLst>
+                  <a:outerShdw blurRad="38100" dist="38100" dir="2700000" algn="tl">
+                    <a:srgbClr val="000000">
+                      <a:alpha val="43137"/>
+                    </a:srgbClr>
+                  </a:outerShdw>
+                </a:effectLst>
+                <a:latin typeface="Raleway" panose="020B0503030101060003" pitchFamily="34" charset="0"/>
+                <a:ea typeface="Segoe UI" pitchFamily="34" charset="0"/>
+                <a:cs typeface="Segoe UI" pitchFamily="34" charset="0"/>
+              </a:rPr>
+              <a:t>V</a:t>
+            </a:r>
+          </a:p>
+        </p:txBody>
+      </p:sp>
+      <p:pic>
+        <p:nvPicPr>
+          <p:cNvPr id="36" name="Imagen 35" descr="Imagen que contiene gráficos vectoriales&#10;&#10;Descripción generada con confianza muy alta">
+            <a:extLst>
+              <a:ext uri="{FF2B5EF4-FFF2-40B4-BE49-F238E27FC236}">
+                <a16:creationId xmlns:a16="http://schemas.microsoft.com/office/drawing/2014/main" id="{21D687BF-879D-492D-9FAF-09F5777B0B0A}"/>
+              </a:ext>
+            </a:extLst>
+          </p:cNvPr>
+          <p:cNvPicPr>
+            <a:picLocks noChangeAspect="1"/>
+          </p:cNvPicPr>
+          <p:nvPr/>
+        </p:nvPicPr>
+        <p:blipFill>
+          <a:blip r:embed="rId28">
+            <a:extLst>
+              <a:ext uri="{28A0092B-C50C-407E-A947-70E740481C1C}">
+                <a14:useLocalDpi xmlns:a14="http://schemas.microsoft.com/office/drawing/2010/main" val="0"/>
+              </a:ext>
+            </a:extLst>
+          </a:blip>
+          <a:stretch>
+            <a:fillRect/>
+          </a:stretch>
+        </p:blipFill>
+        <p:spPr>
+          <a:xfrm>
+            <a:off x="1866393" y="889990"/>
+            <a:ext cx="924668" cy="924668"/>
+          </a:xfrm>
+          <a:prstGeom prst="rect">
+            <a:avLst/>
+          </a:prstGeom>
+        </p:spPr>
+      </p:pic>
+      <p:pic>
+        <p:nvPicPr>
           <p:cNvPr id="1026" name="Picture 2" descr="Image result for usuario png">
-            <a:hlinkClick r:id="rId28"/>
+            <a:hlinkClick r:id="rId29"/>
             <a:extLst>
               <a:ext uri="{FF2B5EF4-FFF2-40B4-BE49-F238E27FC236}">
                 <a16:creationId xmlns:a16="http://schemas.microsoft.com/office/drawing/2014/main" id="{7BC667D3-3554-40C6-8055-A936802EDFDC}"/>
@@ -7302,7 +10277,7 @@
           <p:nvPr/>
         </p:nvPicPr>
         <p:blipFill>
-          <a:blip r:embed="rId29">
+          <a:blip r:embed="rId30">
             <a:extLst>
               <a:ext uri="{28A0092B-C50C-407E-A947-70E740481C1C}">
                 <a14:useLocalDpi xmlns:a14="http://schemas.microsoft.com/office/drawing/2010/main" val="0"/>
@@ -7405,7 +10380,7 @@
           <p:nvPr/>
         </p:nvPicPr>
         <p:blipFill>
-          <a:blip r:embed="rId30">
+          <a:blip r:embed="rId31">
             <a:extLst>
               <a:ext uri="{28A0092B-C50C-407E-A947-70E740481C1C}">
                 <a14:useLocalDpi xmlns:a14="http://schemas.microsoft.com/office/drawing/2010/main" val="0"/>
@@ -7506,7 +10481,7 @@
           <p:nvPr/>
         </p:nvPicPr>
         <p:blipFill>
-          <a:blip r:embed="rId31">
+          <a:blip r:embed="rId32">
             <a:extLst>
               <a:ext uri="{28A0092B-C50C-407E-A947-70E740481C1C}">
                 <a14:useLocalDpi xmlns:a14="http://schemas.microsoft.com/office/drawing/2010/main" val="0"/>
@@ -7584,6 +10559,7 @@
       <p:pic>
         <p:nvPicPr>
           <p:cNvPr id="50" name="Imagen 49">
+            <a:hlinkClick r:id="rId33" action="ppaction://hlinksldjump"/>
             <a:extLst>
               <a:ext uri="{FF2B5EF4-FFF2-40B4-BE49-F238E27FC236}">
                 <a16:creationId xmlns:a16="http://schemas.microsoft.com/office/drawing/2014/main" id="{82D96681-5B5D-4070-9EA9-61964FE90828}"/>
@@ -7596,7 +10572,7 @@
           <p:nvPr/>
         </p:nvPicPr>
         <p:blipFill>
-          <a:blip r:embed="rId32">
+          <a:blip r:embed="rId34">
             <a:duotone>
               <a:schemeClr val="accent2">
                 <a:shade val="45000"/>
@@ -7607,7 +10583,7 @@
             <a:extLst>
               <a:ext uri="{BEBA8EAE-BF5A-486C-A8C5-ECC9F3942E4B}">
                 <a14:imgProps xmlns:a14="http://schemas.microsoft.com/office/drawing/2010/main">
-                  <a14:imgLayer r:embed="rId33">
+                  <a14:imgLayer r:embed="rId35">
                     <a14:imgEffect>
                       <a14:colorTemperature colorTemp="11500"/>
                     </a14:imgEffect>
@@ -7636,6 +10612,7 @@
       <p:sp>
         <p:nvSpPr>
           <p:cNvPr id="51" name="Content">
+            <a:hlinkClick r:id="rId33" action="ppaction://hlinksldjump"/>
             <a:extLst>
               <a:ext uri="{FF2B5EF4-FFF2-40B4-BE49-F238E27FC236}">
                 <a16:creationId xmlns:a16="http://schemas.microsoft.com/office/drawing/2014/main" id="{AC4943C1-3710-4AC1-891A-5F6C2CE72E76}"/>
@@ -8027,7 +11004,7 @@
             <p:nvPr/>
           </p:nvPicPr>
           <p:blipFill>
-            <a:blip r:embed="rId34">
+            <a:blip r:embed="rId36">
               <a:extLst>
                 <a:ext uri="{28A0092B-C50C-407E-A947-70E740481C1C}">
                   <a14:useLocalDpi xmlns:a14="http://schemas.microsoft.com/office/drawing/2010/main" val="0"/>
@@ -8060,7 +11037,7 @@
             <p:cNvSpPr txBox="1"/>
             <p:nvPr>
               <p:custDataLst>
-                <p:custData r:id="rId17"/>
+                <p:custData r:id="rId18"/>
               </p:custDataLst>
             </p:nvPr>
           </p:nvSpPr>
@@ -8117,7 +11094,7 @@
             <p:cNvSpPr txBox="1"/>
             <p:nvPr>
               <p:custDataLst>
-                <p:custData r:id="rId18"/>
+                <p:custData r:id="rId19"/>
               </p:custDataLst>
             </p:nvPr>
           </p:nvSpPr>
@@ -8276,7 +11253,7 @@
             <p:nvPr/>
           </p:nvPicPr>
           <p:blipFill>
-            <a:blip r:embed="rId35">
+            <a:blip r:embed="rId37">
               <a:extLst>
                 <a:ext uri="{28A0092B-C50C-407E-A947-70E740481C1C}">
                   <a14:useLocalDpi xmlns:a14="http://schemas.microsoft.com/office/drawing/2010/main" val="0"/>
@@ -8309,7 +11286,7 @@
             <p:cNvSpPr txBox="1"/>
             <p:nvPr>
               <p:custDataLst>
-                <p:custData r:id="rId15"/>
+                <p:custData r:id="rId16"/>
               </p:custDataLst>
             </p:nvPr>
           </p:nvSpPr>
@@ -8366,7 +11343,7 @@
             <p:cNvSpPr txBox="1"/>
             <p:nvPr>
               <p:custDataLst>
-                <p:custData r:id="rId16"/>
+                <p:custData r:id="rId17"/>
               </p:custDataLst>
             </p:nvPr>
           </p:nvSpPr>
@@ -8527,7 +11504,7 @@
             <p:nvPr/>
           </p:nvPicPr>
           <p:blipFill>
-            <a:blip r:embed="rId34">
+            <a:blip r:embed="rId36">
               <a:extLst>
                 <a:ext uri="{28A0092B-C50C-407E-A947-70E740481C1C}">
                   <a14:useLocalDpi xmlns:a14="http://schemas.microsoft.com/office/drawing/2010/main" val="0"/>
@@ -8560,7 +11537,7 @@
             <p:cNvSpPr txBox="1"/>
             <p:nvPr>
               <p:custDataLst>
-                <p:custData r:id="rId13"/>
+                <p:custData r:id="rId14"/>
               </p:custDataLst>
             </p:nvPr>
           </p:nvSpPr>
@@ -8617,7 +11594,7 @@
             <p:cNvSpPr txBox="1"/>
             <p:nvPr>
               <p:custDataLst>
-                <p:custData r:id="rId14"/>
+                <p:custData r:id="rId15"/>
               </p:custDataLst>
             </p:nvPr>
           </p:nvSpPr>
@@ -8776,7 +11753,7 @@
             <p:nvPr/>
           </p:nvPicPr>
           <p:blipFill>
-            <a:blip r:embed="rId36">
+            <a:blip r:embed="rId38">
               <a:extLst>
                 <a:ext uri="{28A0092B-C50C-407E-A947-70E740481C1C}">
                   <a14:useLocalDpi xmlns:a14="http://schemas.microsoft.com/office/drawing/2010/main" val="0"/>
@@ -8809,7 +11786,7 @@
             <p:cNvSpPr txBox="1"/>
             <p:nvPr>
               <p:custDataLst>
-                <p:custData r:id="rId11"/>
+                <p:custData r:id="rId12"/>
               </p:custDataLst>
             </p:nvPr>
           </p:nvSpPr>
@@ -8863,7 +11840,7 @@
             <p:cNvSpPr txBox="1"/>
             <p:nvPr>
               <p:custDataLst>
-                <p:custData r:id="rId12"/>
+                <p:custData r:id="rId13"/>
               </p:custDataLst>
             </p:nvPr>
           </p:nvSpPr>
@@ -9022,7 +11999,7 @@
             <p:nvPr/>
           </p:nvPicPr>
           <p:blipFill>
-            <a:blip r:embed="rId34">
+            <a:blip r:embed="rId36">
               <a:extLst>
                 <a:ext uri="{28A0092B-C50C-407E-A947-70E740481C1C}">
                   <a14:useLocalDpi xmlns:a14="http://schemas.microsoft.com/office/drawing/2010/main" val="0"/>
@@ -9303,7 +12280,7 @@
             <p:nvPr/>
           </p:nvPicPr>
           <p:blipFill>
-            <a:blip r:embed="rId31">
+            <a:blip r:embed="rId32">
               <a:extLst>
                 <a:ext uri="{28A0092B-C50C-407E-A947-70E740481C1C}">
                   <a14:useLocalDpi xmlns:a14="http://schemas.microsoft.com/office/drawing/2010/main" val="0"/>
@@ -9339,7 +12316,7 @@
             <p:nvPr/>
           </p:nvPicPr>
           <p:blipFill>
-            <a:blip r:embed="rId37">
+            <a:blip r:embed="rId39">
               <a:extLst>
                 <a:ext uri="{28A0092B-C50C-407E-A947-70E740481C1C}">
                   <a14:useLocalDpi xmlns:a14="http://schemas.microsoft.com/office/drawing/2010/main" val="0"/>
@@ -9375,7 +12352,7 @@
             <p:nvPr/>
           </p:nvPicPr>
           <p:blipFill>
-            <a:blip r:embed="rId38">
+            <a:blip r:embed="rId40">
               <a:extLst>
                 <a:ext uri="{28A0092B-C50C-407E-A947-70E740481C1C}">
                   <a14:useLocalDpi xmlns:a14="http://schemas.microsoft.com/office/drawing/2010/main" val="0"/>
@@ -9400,6 +12377,7 @@
       <p:pic>
         <p:nvPicPr>
           <p:cNvPr id="109" name="Imagen 108">
+            <a:hlinkClick r:id="rId41" action="ppaction://hlinksldjump"/>
             <a:extLst>
               <a:ext uri="{FF2B5EF4-FFF2-40B4-BE49-F238E27FC236}">
                 <a16:creationId xmlns:a16="http://schemas.microsoft.com/office/drawing/2014/main" id="{8EAF6471-4E54-4A80-8A7E-CC376F7D036F}"/>
@@ -9412,7 +12390,98 @@
           <p:nvPr/>
         </p:nvPicPr>
         <p:blipFill>
-          <a:blip r:embed="rId39">
+          <a:blip r:embed="rId42">
+            <a:extLst>
+              <a:ext uri="{28A0092B-C50C-407E-A947-70E740481C1C}">
+                <a14:useLocalDpi xmlns:a14="http://schemas.microsoft.com/office/drawing/2010/main" val="0"/>
+              </a:ext>
+            </a:extLst>
+          </a:blip>
+          <a:stretch>
+            <a:fillRect/>
+          </a:stretch>
+        </p:blipFill>
+        <p:spPr>
+          <a:xfrm>
+            <a:off x="338867" y="3988886"/>
+            <a:ext cx="356972" cy="356972"/>
+          </a:xfrm>
+          <a:prstGeom prst="rect">
+            <a:avLst/>
+          </a:prstGeom>
+        </p:spPr>
+      </p:pic>
+      <p:sp>
+        <p:nvSpPr>
+          <p:cNvPr id="110" name="Content">
+            <a:hlinkClick r:id="rId41" action="ppaction://hlinksldjump"/>
+            <a:extLst>
+              <a:ext uri="{FF2B5EF4-FFF2-40B4-BE49-F238E27FC236}">
+                <a16:creationId xmlns:a16="http://schemas.microsoft.com/office/drawing/2014/main" id="{8872DF6A-9587-4E91-B416-943E3D922E67}"/>
+              </a:ext>
+            </a:extLst>
+          </p:cNvPr>
+          <p:cNvSpPr txBox="1"/>
+          <p:nvPr>
+            <p:custDataLst>
+              <p:custData r:id="rId10"/>
+            </p:custDataLst>
+          </p:nvPr>
+        </p:nvSpPr>
+        <p:spPr>
+          <a:xfrm>
+            <a:off x="824827" y="4040214"/>
+            <a:ext cx="797013" cy="353943"/>
+          </a:xfrm>
+          <a:prstGeom prst="rect">
+            <a:avLst/>
+          </a:prstGeom>
+          <a:noFill/>
+        </p:spPr>
+        <p:txBody>
+          <a:bodyPr wrap="none" lIns="91440" tIns="18288" rIns="91440" bIns="27432" rtlCol="0" anchor="ctr" anchorCtr="0">
+            <a:spAutoFit/>
+          </a:bodyPr>
+          <a:lstStyle/>
+          <a:p>
+            <a:r>
+              <a:rPr lang="en-US" sz="2000" dirty="0" err="1">
+                <a:solidFill>
+                  <a:srgbClr val="000000"/>
+                </a:solidFill>
+                <a:latin typeface="Raleway" panose="020B0503030101060003" pitchFamily="34" charset="0"/>
+                <a:ea typeface="Segoe UI" pitchFamily="34" charset="0"/>
+                <a:cs typeface="Segoe UI" pitchFamily="34" charset="0"/>
+              </a:rPr>
+              <a:t>Perfíl</a:t>
+            </a:r>
+            <a:endParaRPr lang="en-US" sz="2000" dirty="0">
+              <a:solidFill>
+                <a:srgbClr val="000000"/>
+              </a:solidFill>
+              <a:latin typeface="Raleway" panose="020B0503030101060003" pitchFamily="34" charset="0"/>
+              <a:ea typeface="Segoe UI" pitchFamily="34" charset="0"/>
+              <a:cs typeface="Segoe UI" pitchFamily="34" charset="0"/>
+            </a:endParaRPr>
+          </a:p>
+        </p:txBody>
+      </p:sp>
+      <p:pic>
+        <p:nvPicPr>
+          <p:cNvPr id="98" name="Imagen 97">
+            <a:extLst>
+              <a:ext uri="{FF2B5EF4-FFF2-40B4-BE49-F238E27FC236}">
+                <a16:creationId xmlns:a16="http://schemas.microsoft.com/office/drawing/2014/main" id="{7882B9C7-858E-4C40-B167-358E978B3A47}"/>
+              </a:ext>
+            </a:extLst>
+          </p:cNvPr>
+          <p:cNvPicPr>
+            <a:picLocks noChangeAspect="1"/>
+          </p:cNvPicPr>
+          <p:nvPr/>
+        </p:nvPicPr>
+        <p:blipFill>
+          <a:blip r:embed="rId43">
             <a:extLst>
               <a:ext uri="{28A0092B-C50C-407E-A947-70E740481C1C}">
                 <a14:useLocalDpi xmlns:a14="http://schemas.microsoft.com/office/drawing/2010/main" val="0"/>
@@ -9435,24 +12504,24 @@
       </p:pic>
       <p:sp>
         <p:nvSpPr>
-          <p:cNvPr id="110" name="Content">
+          <p:cNvPr id="99" name="Content">
             <a:extLst>
               <a:ext uri="{FF2B5EF4-FFF2-40B4-BE49-F238E27FC236}">
-                <a16:creationId xmlns:a16="http://schemas.microsoft.com/office/drawing/2014/main" id="{8872DF6A-9587-4E91-B416-943E3D922E67}"/>
+                <a16:creationId xmlns:a16="http://schemas.microsoft.com/office/drawing/2014/main" id="{4C59270A-40AF-454A-8F4F-853745605ABB}"/>
               </a:ext>
             </a:extLst>
           </p:cNvPr>
           <p:cNvSpPr txBox="1"/>
           <p:nvPr>
             <p:custDataLst>
-              <p:custData r:id="rId10"/>
+              <p:custData r:id="rId11"/>
             </p:custDataLst>
           </p:nvPr>
         </p:nvSpPr>
         <p:spPr>
           <a:xfrm>
             <a:off x="824827" y="3460189"/>
-            <a:ext cx="797013" cy="353943"/>
+            <a:ext cx="974947" cy="353943"/>
           </a:xfrm>
           <a:prstGeom prst="rect">
             <a:avLst/>
@@ -9466,7 +12535,7 @@
           <a:lstStyle/>
           <a:p>
             <a:r>
-              <a:rPr lang="en-US" sz="2000" dirty="0" err="1">
+              <a:rPr lang="en-US" sz="2000" dirty="0">
                 <a:solidFill>
                   <a:srgbClr val="000000"/>
                 </a:solidFill>
@@ -9474,16 +12543,8 @@
                 <a:ea typeface="Segoe UI" pitchFamily="34" charset="0"/>
                 <a:cs typeface="Segoe UI" pitchFamily="34" charset="0"/>
               </a:rPr>
-              <a:t>Perfíl</a:t>
+              <a:t>Nuevo</a:t>
             </a:r>
-            <a:endParaRPr lang="en-US" sz="2000" dirty="0">
-              <a:solidFill>
-                <a:srgbClr val="000000"/>
-              </a:solidFill>
-              <a:latin typeface="Raleway" panose="020B0503030101060003" pitchFamily="34" charset="0"/>
-              <a:ea typeface="Segoe UI" pitchFamily="34" charset="0"/>
-              <a:cs typeface="Segoe UI" pitchFamily="34" charset="0"/>
-            </a:endParaRPr>
           </a:p>
         </p:txBody>
       </p:sp>
@@ -9500,7 +12561,7 @@
 </p:sld>
 </file>
 
-<file path=ppt/slides/slide3.xml><?xml version="1.0" encoding="utf-8"?>
+<file path=ppt/slides/slide4.xml><?xml version="1.0" encoding="utf-8"?>
 <p:sld xmlns:a="http://schemas.openxmlformats.org/drawingml/2006/main" xmlns:r="http://schemas.openxmlformats.org/officeDocument/2006/relationships" xmlns:p="http://schemas.openxmlformats.org/presentationml/2006/main">
   <p:cSld>
     <p:spTree>
@@ -11784,7 +14845,7 @@
 
 <file path=customXml/item10.xml><?xml version="1.0" encoding="utf-8"?>
 <Control xmlns="http://schemas.microsoft.com/VisualStudio/2011/storyboarding/control">
-  <Id Name="System.Storyboarding.Backgrounds.WebBrowser" Revision="1" Stencil="System.Storyboarding.Backgrounds" StencilVersion="0.1"/>
+  <Id Name="System.Storyboarding.WindowsApps.WindowsAppsTileMedium" Revision="1" Stencil="System.Storyboarding.WindowsApps" StencilVersion="0.1"/>
 </Control>
 </file>
 
@@ -11796,13 +14857,13 @@
 
 <file path=customXml/item12.xml><?xml version="1.0" encoding="utf-8"?>
 <Control xmlns="http://schemas.microsoft.com/VisualStudio/2011/storyboarding/control">
-  <Id Name="System.Storyboarding.Common.TextInput" Revision="1" Stencil="System.Storyboarding.Common" StencilVersion="0.1"/>
+  <Id Name="System.Storyboarding.WindowsApps.WindowsAppsTileMedium" Revision="1" Stencil="System.Storyboarding.WindowsApps" StencilVersion="0.1"/>
 </Control>
 </file>
 
 <file path=customXml/item13.xml><?xml version="1.0" encoding="utf-8"?>
 <Control xmlns="http://schemas.microsoft.com/VisualStudio/2011/storyboarding/control">
-  <Id Name="System.Storyboarding.Common.TextInput" Revision="1" Stencil="System.Storyboarding.Common" StencilVersion="0.1"/>
+  <Id Name="System.Storyboarding.Common.Text" Revision="1" Stencil="System.Storyboarding.Common" StencilVersion="0.1"/>
 </Control>
 </file>
 
@@ -11814,31 +14875,31 @@
 
 <file path=customXml/item15.xml><?xml version="1.0" encoding="utf-8"?>
 <Control xmlns="http://schemas.microsoft.com/VisualStudio/2011/storyboarding/control">
-  <Id Name="System.Storyboarding.Common.TextInput" Revision="1" Stencil="System.Storyboarding.Common" StencilVersion="0.1"/>
+  <Id Name="System.Storyboarding.Common.Text" Revision="1" Stencil="System.Storyboarding.Common" StencilVersion="0.1"/>
 </Control>
 </file>
 
 <file path=customXml/item16.xml><?xml version="1.0" encoding="utf-8"?>
+<Control xmlns="http://schemas.microsoft.com/VisualStudio/2011/storyboarding/control">
+  <Id Name="System.Storyboarding.Common.Text" Revision="1" Stencil="System.Storyboarding.Common" StencilVersion="0.1"/>
+</Control>
+</file>
+
+<file path=customXml/item17.xml><?xml version="1.0" encoding="utf-8"?>
 <Control xmlns="http://schemas.microsoft.com/VisualStudio/2011/storyboarding/control">
   <Id Name="System.Storyboarding.Backgrounds.WebBrowser" Revision="1" Stencil="System.Storyboarding.Backgrounds" StencilVersion="0.1"/>
 </Control>
 </file>
 
-<file path=customXml/item17.xml><?xml version="1.0" encoding="utf-8"?>
+<file path=customXml/item18.xml><?xml version="1.0" encoding="utf-8"?>
+<Control xmlns="http://schemas.microsoft.com/VisualStudio/2011/storyboarding/control">
+  <Id Name="System.Storyboarding.Common.TextInput" Revision="1" Stencil="System.Storyboarding.Common" StencilVersion="0.1"/>
+</Control>
+</file>
+
+<file path=customXml/item19.xml><?xml version="1.0" encoding="utf-8"?>
 <Control xmlns="http://schemas.microsoft.com/VisualStudio/2011/storyboarding/control">
   <Id Name="System.Storyboarding.Common.Text" Revision="1" Stencil="System.Storyboarding.Common" StencilVersion="0.1"/>
-</Control>
-</file>
-
-<file path=customXml/item18.xml><?xml version="1.0" encoding="utf-8"?>
-<Control xmlns="http://schemas.microsoft.com/VisualStudio/2011/storyboarding/control">
-  <Id Name="System.Storyboarding.Common.Text" Revision="1" Stencil="System.Storyboarding.Common" StencilVersion="0.1"/>
-</Control>
-</file>
-
-<file path=customXml/item19.xml><?xml version="1.0" encoding="utf-8"?>
-<Control xmlns="http://schemas.microsoft.com/VisualStudio/2011/storyboarding/control">
-  <Id Name="System.Storyboarding.Common.TextInput" Revision="1" Stencil="System.Storyboarding.Common" StencilVersion="0.1"/>
 </Control>
 </file>
 
@@ -11850,13 +14911,13 @@
 
 <file path=customXml/item20.xml><?xml version="1.0" encoding="utf-8"?>
 <Control xmlns="http://schemas.microsoft.com/VisualStudio/2011/storyboarding/control">
-  <Id Name="System.Storyboarding.Common.TextInput" Revision="1" Stencil="System.Storyboarding.Common" StencilVersion="0.1"/>
+  <Id Name="System.Storyboarding.Common.Text" Revision="1" Stencil="System.Storyboarding.Common" StencilVersion="0.1"/>
 </Control>
 </file>
 
 <file path=customXml/item21.xml><?xml version="1.0" encoding="utf-8"?>
 <Control xmlns="http://schemas.microsoft.com/VisualStudio/2011/storyboarding/control">
-  <Id Name="System.Storyboarding.Common.Button" Revision="1" Stencil="System.Storyboarding.Common" StencilVersion="0.1"/>
+  <Id Name="System.Storyboarding.Common.TextInput" Revision="1" Stencil="System.Storyboarding.Common" StencilVersion="0.1"/>
 </Control>
 </file>
 
@@ -11868,13 +14929,13 @@
 
 <file path=customXml/item23.xml><?xml version="1.0" encoding="utf-8"?>
 <Control xmlns="http://schemas.microsoft.com/VisualStudio/2011/storyboarding/control">
-  <Id Name="System.Storyboarding.WindowsApps.WindowsAppsTileMedium" Revision="1" Stencil="System.Storyboarding.WindowsApps" StencilVersion="0.1"/>
+  <Id Name="System.Storyboarding.Common.Text" Revision="1" Stencil="System.Storyboarding.Common" StencilVersion="0.1"/>
 </Control>
 </file>
 
 <file path=customXml/item24.xml><?xml version="1.0" encoding="utf-8"?>
 <Control xmlns="http://schemas.microsoft.com/VisualStudio/2011/storyboarding/control">
-  <Id Name="System.Storyboarding.WindowsApps.WindowsAppsTileMedium" Revision="1" Stencil="System.Storyboarding.WindowsApps" StencilVersion="0.1"/>
+  <Id Name="System.Storyboarding.Common.Text" Revision="1" Stencil="System.Storyboarding.Common" StencilVersion="0.1"/>
 </Control>
 </file>
 
@@ -11898,31 +14959,31 @@
 
 <file path=customXml/item28.xml><?xml version="1.0" encoding="utf-8"?>
 <Control xmlns="http://schemas.microsoft.com/VisualStudio/2011/storyboarding/control">
-  <Id Name="System.Storyboarding.Common.ScrollbarVertical" Revision="1" Stencil="System.Storyboarding.Common" StencilVersion="0.1"/>
+  <Id Name="System.Storyboarding.Common.Text" Revision="1" Stencil="System.Storyboarding.Common" StencilVersion="0.1"/>
 </Control>
 </file>
 
 <file path=customXml/item29.xml><?xml version="1.0" encoding="utf-8"?>
 <Control xmlns="http://schemas.microsoft.com/VisualStudio/2011/storyboarding/control">
-  <Id Name="System.Storyboarding.WindowsApps.WindowsAppsTileMedium" Revision="1" Stencil="System.Storyboarding.WindowsApps" StencilVersion="0.1"/>
+  <Id Name="System.Storyboarding.Common.Text" Revision="1" Stencil="System.Storyboarding.Common" StencilVersion="0.1"/>
 </Control>
 </file>
 
 <file path=customXml/item3.xml><?xml version="1.0" encoding="utf-8"?>
+<Control xmlns="http://schemas.microsoft.com/VisualStudio/2011/storyboarding/control">
+  <Id Name="System.Storyboarding.Common.Text" Revision="1" Stencil="System.Storyboarding.Common" StencilVersion="0.1"/>
+</Control>
+</file>
+
+<file path=customXml/item30.xml><?xml version="1.0" encoding="utf-8"?>
 <Control xmlns="http://schemas.microsoft.com/VisualStudio/2011/storyboarding/control">
   <Id Name="System.Storyboarding.Common.Button" Revision="1" Stencil="System.Storyboarding.Common" StencilVersion="0.1"/>
 </Control>
 </file>
 
-<file path=customXml/item30.xml><?xml version="1.0" encoding="utf-8"?>
-<Control xmlns="http://schemas.microsoft.com/VisualStudio/2011/storyboarding/control">
-  <Id Name="System.Storyboarding.Common.Text" Revision="1" Stencil="System.Storyboarding.Common" StencilVersion="0.1"/>
-</Control>
-</file>
-
 <file path=customXml/item31.xml><?xml version="1.0" encoding="utf-8"?>
 <Control xmlns="http://schemas.microsoft.com/VisualStudio/2011/storyboarding/control">
-  <Id Name="System.Storyboarding.Common.Text" Revision="1" Stencil="System.Storyboarding.Common" StencilVersion="0.1"/>
+  <Id Name="System.Storyboarding.Common.TextInput" Revision="1" Stencil="System.Storyboarding.Common" StencilVersion="0.1"/>
 </Control>
 </file>
 
@@ -11952,7 +15013,7 @@
 
 <file path=customXml/item36.xml><?xml version="1.0" encoding="utf-8"?>
 <Control xmlns="http://schemas.microsoft.com/VisualStudio/2011/storyboarding/control">
-  <Id Name="System.Storyboarding.Common.Text" Revision="1" Stencil="System.Storyboarding.Common" StencilVersion="0.1"/>
+  <Id Name="System.Storyboarding.Common.TextInput" Revision="1" Stencil="System.Storyboarding.Common" StencilVersion="0.1"/>
 </Control>
 </file>
 
@@ -11970,31 +15031,31 @@
 
 <file path=customXml/item39.xml><?xml version="1.0" encoding="utf-8"?>
 <Control xmlns="http://schemas.microsoft.com/VisualStudio/2011/storyboarding/control">
-  <Id Name="System.Storyboarding.Common.Text" Revision="1" Stencil="System.Storyboarding.Common" StencilVersion="0.1"/>
+  <Id Name="System.Storyboarding.Common.Button" Revision="1" Stencil="System.Storyboarding.Common" StencilVersion="0.1"/>
 </Control>
 </file>
 
 <file path=customXml/item4.xml><?xml version="1.0" encoding="utf-8"?>
+<Control xmlns="http://schemas.microsoft.com/VisualStudio/2011/storyboarding/control">
+  <Id Name="System.Storyboarding.Common.Button" Revision="1" Stencil="System.Storyboarding.Common" StencilVersion="0.1"/>
+</Control>
+</file>
+
+<file path=customXml/item40.xml><?xml version="1.0" encoding="utf-8"?>
 <Control xmlns="http://schemas.microsoft.com/VisualStudio/2011/storyboarding/control">
   <Id Name="System.Storyboarding.Common.TextInput" Revision="1" Stencil="System.Storyboarding.Common" StencilVersion="0.1"/>
 </Control>
 </file>
 
-<file path=customXml/item40.xml><?xml version="1.0" encoding="utf-8"?>
-<Control xmlns="http://schemas.microsoft.com/VisualStudio/2011/storyboarding/control">
-  <Id Name="System.Storyboarding.Common.Text" Revision="1" Stencil="System.Storyboarding.Common" StencilVersion="0.1"/>
-</Control>
-</file>
-
 <file path=customXml/item41.xml><?xml version="1.0" encoding="utf-8"?>
 <Control xmlns="http://schemas.microsoft.com/VisualStudio/2011/storyboarding/control">
-  <Id Name="System.Storyboarding.Common.Text" Revision="1" Stencil="System.Storyboarding.Common" StencilVersion="0.1"/>
+  <Id Name="System.Storyboarding.WindowsApps.WindowsAppsTileMedium" Revision="1" Stencil="System.Storyboarding.WindowsApps" StencilVersion="0.1"/>
 </Control>
 </file>
 
 <file path=customXml/item42.xml><?xml version="1.0" encoding="utf-8"?>
 <Control xmlns="http://schemas.microsoft.com/VisualStudio/2011/storyboarding/control">
-  <Id Name="System.Storyboarding.Common.Text" Revision="1" Stencil="System.Storyboarding.Common" StencilVersion="0.1"/>
+  <Id Name="System.Storyboarding.Common.ScrollbarVertical" Revision="1" Stencil="System.Storyboarding.Common" StencilVersion="0.1"/>
 </Control>
 </file>
 
@@ -12006,6 +15067,36 @@
 
 <file path=customXml/item44.xml><?xml version="1.0" encoding="utf-8"?>
 <Control xmlns="http://schemas.microsoft.com/VisualStudio/2011/storyboarding/control">
+  <Id Name="System.Storyboarding.Common.TextInput" Revision="1" Stencil="System.Storyboarding.Common" StencilVersion="0.1"/>
+</Control>
+</file>
+
+<file path=customXml/item45.xml><?xml version="1.0" encoding="utf-8"?>
+<Control xmlns="http://schemas.microsoft.com/VisualStudio/2011/storyboarding/control">
+  <Id Name="System.Storyboarding.Common.Text" Revision="1" Stencil="System.Storyboarding.Common" StencilVersion="0.1"/>
+</Control>
+</file>
+
+<file path=customXml/item46.xml><?xml version="1.0" encoding="utf-8"?>
+<Control xmlns="http://schemas.microsoft.com/VisualStudio/2011/storyboarding/control">
+  <Id Name="System.Storyboarding.Backgrounds.WebBrowser" Revision="1" Stencil="System.Storyboarding.Backgrounds" StencilVersion="0.1"/>
+</Control>
+</file>
+
+<file path=customXml/item47.xml><?xml version="1.0" encoding="utf-8"?>
+<Control xmlns="http://schemas.microsoft.com/VisualStudio/2011/storyboarding/control">
+  <Id Name="System.Storyboarding.Common.Text" Revision="1" Stencil="System.Storyboarding.Common" StencilVersion="0.1"/>
+</Control>
+</file>
+
+<file path=customXml/item48.xml><?xml version="1.0" encoding="utf-8"?>
+<Control xmlns="http://schemas.microsoft.com/VisualStudio/2011/storyboarding/control">
+  <Id Name="System.Storyboarding.WindowsApps.WindowsAppsTileMedium" Revision="1" Stencil="System.Storyboarding.WindowsApps" StencilVersion="0.1"/>
+</Control>
+</file>
+
+<file path=customXml/item49.xml><?xml version="1.0" encoding="utf-8"?>
+<Control xmlns="http://schemas.microsoft.com/VisualStudio/2011/storyboarding/control">
   <Id Name="System.Storyboarding.Common.Text" Revision="1" Stencil="System.Storyboarding.Common" StencilVersion="0.1"/>
 </Control>
 </file>
@@ -12016,9 +15107,129 @@
 </Control>
 </file>
 
+<file path=customXml/item50.xml><?xml version="1.0" encoding="utf-8"?>
+<Control xmlns="http://schemas.microsoft.com/VisualStudio/2011/storyboarding/control">
+  <Id Name="System.Storyboarding.WindowsApps.WindowsAppsTileMedium" Revision="1" Stencil="System.Storyboarding.WindowsApps" StencilVersion="0.1"/>
+</Control>
+</file>
+
+<file path=customXml/item51.xml><?xml version="1.0" encoding="utf-8"?>
+<Control xmlns="http://schemas.microsoft.com/VisualStudio/2011/storyboarding/control">
+  <Id Name="System.Storyboarding.Common.Text" Revision="1" Stencil="System.Storyboarding.Common" StencilVersion="0.1"/>
+</Control>
+</file>
+
+<file path=customXml/item52.xml><?xml version="1.0" encoding="utf-8"?>
+<Control xmlns="http://schemas.microsoft.com/VisualStudio/2011/storyboarding/control">
+  <Id Name="System.Storyboarding.Common.Text" Revision="1" Stencil="System.Storyboarding.Common" StencilVersion="0.1"/>
+</Control>
+</file>
+
+<file path=customXml/item53.xml><?xml version="1.0" encoding="utf-8"?>
+<Control xmlns="http://schemas.microsoft.com/VisualStudio/2011/storyboarding/control">
+  <Id Name="System.Storyboarding.Common.Text" Revision="1" Stencil="System.Storyboarding.Common" StencilVersion="0.1"/>
+</Control>
+</file>
+
+<file path=customXml/item54.xml><?xml version="1.0" encoding="utf-8"?>
+<Control xmlns="http://schemas.microsoft.com/VisualStudio/2011/storyboarding/control">
+  <Id Name="System.Storyboarding.Common.ScrollbarVertical" Revision="1" Stencil="System.Storyboarding.Common" StencilVersion="0.1"/>
+</Control>
+</file>
+
+<file path=customXml/item55.xml><?xml version="1.0" encoding="utf-8"?>
+<Control xmlns="http://schemas.microsoft.com/VisualStudio/2011/storyboarding/control">
+  <Id Name="System.Storyboarding.Common.Text" Revision="1" Stencil="System.Storyboarding.Common" StencilVersion="0.1"/>
+</Control>
+</file>
+
+<file path=customXml/item56.xml><?xml version="1.0" encoding="utf-8"?>
+<Control xmlns="http://schemas.microsoft.com/VisualStudio/2011/storyboarding/control">
+  <Id Name="System.Storyboarding.Common.Text" Revision="1" Stencil="System.Storyboarding.Common" StencilVersion="0.1"/>
+</Control>
+</file>
+
+<file path=customXml/item57.xml><?xml version="1.0" encoding="utf-8"?>
+<Control xmlns="http://schemas.microsoft.com/VisualStudio/2011/storyboarding/control">
+  <Id Name="System.Storyboarding.Common.Text" Revision="1" Stencil="System.Storyboarding.Common" StencilVersion="0.1"/>
+</Control>
+</file>
+
+<file path=customXml/item58.xml><?xml version="1.0" encoding="utf-8"?>
+<Control xmlns="http://schemas.microsoft.com/VisualStudio/2011/storyboarding/control">
+  <Id Name="System.Storyboarding.Common.Text" Revision="1" Stencil="System.Storyboarding.Common" StencilVersion="0.1"/>
+</Control>
+</file>
+
+<file path=customXml/item59.xml><?xml version="1.0" encoding="utf-8"?>
+<Control xmlns="http://schemas.microsoft.com/VisualStudio/2011/storyboarding/control">
+  <Id Name="System.Storyboarding.Common.Text" Revision="1" Stencil="System.Storyboarding.Common" StencilVersion="0.1"/>
+</Control>
+</file>
+
 <file path=customXml/item6.xml><?xml version="1.0" encoding="utf-8"?>
 <Control xmlns="http://schemas.microsoft.com/VisualStudio/2011/storyboarding/control">
-  <Id Name="System.Storyboarding.Common.Button" Revision="1" Stencil="System.Storyboarding.Common" StencilVersion="0.1"/>
+  <Id Name="System.Storyboarding.Common.Text" Revision="1" Stencil="System.Storyboarding.Common" StencilVersion="0.1"/>
+</Control>
+</file>
+
+<file path=customXml/item60.xml><?xml version="1.0" encoding="utf-8"?>
+<Control xmlns="http://schemas.microsoft.com/VisualStudio/2011/storyboarding/control">
+  <Id Name="System.Storyboarding.Common.Text" Revision="1" Stencil="System.Storyboarding.Common" StencilVersion="0.1"/>
+</Control>
+</file>
+
+<file path=customXml/item61.xml><?xml version="1.0" encoding="utf-8"?>
+<Control xmlns="http://schemas.microsoft.com/VisualStudio/2011/storyboarding/control">
+  <Id Name="System.Storyboarding.Common.Text" Revision="1" Stencil="System.Storyboarding.Common" StencilVersion="0.1"/>
+</Control>
+</file>
+
+<file path=customXml/item62.xml><?xml version="1.0" encoding="utf-8"?>
+<Control xmlns="http://schemas.microsoft.com/VisualStudio/2011/storyboarding/control">
+  <Id Name="System.Storyboarding.Common.Text" Revision="1" Stencil="System.Storyboarding.Common" StencilVersion="0.1"/>
+</Control>
+</file>
+
+<file path=customXml/item63.xml><?xml version="1.0" encoding="utf-8"?>
+<Control xmlns="http://schemas.microsoft.com/VisualStudio/2011/storyboarding/control">
+  <Id Name="System.Storyboarding.Common.Text" Revision="1" Stencil="System.Storyboarding.Common" StencilVersion="0.1"/>
+</Control>
+</file>
+
+<file path=customXml/item64.xml><?xml version="1.0" encoding="utf-8"?>
+<Control xmlns="http://schemas.microsoft.com/VisualStudio/2011/storyboarding/control">
+  <Id Name="System.Storyboarding.Common.Text" Revision="1" Stencil="System.Storyboarding.Common" StencilVersion="0.1"/>
+</Control>
+</file>
+
+<file path=customXml/item65.xml><?xml version="1.0" encoding="utf-8"?>
+<Control xmlns="http://schemas.microsoft.com/VisualStudio/2011/storyboarding/control">
+  <Id Name="System.Storyboarding.Common.Text" Revision="1" Stencil="System.Storyboarding.Common" StencilVersion="0.1"/>
+</Control>
+</file>
+
+<file path=customXml/item66.xml><?xml version="1.0" encoding="utf-8"?>
+<Control xmlns="http://schemas.microsoft.com/VisualStudio/2011/storyboarding/control">
+  <Id Name="System.Storyboarding.Common.Text" Revision="1" Stencil="System.Storyboarding.Common" StencilVersion="0.1"/>
+</Control>
+</file>
+
+<file path=customXml/item67.xml><?xml version="1.0" encoding="utf-8"?>
+<Control xmlns="http://schemas.microsoft.com/VisualStudio/2011/storyboarding/control">
+  <Id Name="System.Storyboarding.Common.TextInput" Revision="1" Stencil="System.Storyboarding.Common" StencilVersion="0.1"/>
+</Control>
+</file>
+
+<file path=customXml/item68.xml><?xml version="1.0" encoding="utf-8"?>
+<Control xmlns="http://schemas.microsoft.com/VisualStudio/2011/storyboarding/control">
+  <Id Name="System.Storyboarding.Common.TextInput" Revision="1" Stencil="System.Storyboarding.Common" StencilVersion="0.1"/>
+</Control>
+</file>
+
+<file path=customXml/item69.xml><?xml version="1.0" encoding="utf-8"?>
+<Control xmlns="http://schemas.microsoft.com/VisualStudio/2011/storyboarding/control">
+  <Id Name="System.Storyboarding.Common.TextInput" Revision="1" Stencil="System.Storyboarding.Common" StencilVersion="0.1"/>
 </Control>
 </file>
 
@@ -12028,6 +15239,30 @@
 </Control>
 </file>
 
+<file path=customXml/item70.xml><?xml version="1.0" encoding="utf-8"?>
+<Control xmlns="http://schemas.microsoft.com/VisualStudio/2011/storyboarding/control">
+  <Id Name="System.Storyboarding.Common.TextInput" Revision="1" Stencil="System.Storyboarding.Common" StencilVersion="0.1"/>
+</Control>
+</file>
+
+<file path=customXml/item71.xml><?xml version="1.0" encoding="utf-8"?>
+<Control xmlns="http://schemas.microsoft.com/VisualStudio/2011/storyboarding/control">
+  <Id Name="System.Storyboarding.Common.Text" Revision="1" Stencil="System.Storyboarding.Common" StencilVersion="0.1"/>
+</Control>
+</file>
+
+<file path=customXml/item72.xml><?xml version="1.0" encoding="utf-8"?>
+<Control xmlns="http://schemas.microsoft.com/VisualStudio/2011/storyboarding/control">
+  <Id Name="System.Storyboarding.Common.Button" Revision="1" Stencil="System.Storyboarding.Common" StencilVersion="0.1"/>
+</Control>
+</file>
+
+<file path=customXml/item73.xml><?xml version="1.0" encoding="utf-8"?>
+<Control xmlns="http://schemas.microsoft.com/VisualStudio/2011/storyboarding/control">
+  <Id Name="System.Storyboarding.Common.Button" Revision="1" Stencil="System.Storyboarding.Common" StencilVersion="0.1"/>
+</Control>
+</file>
+
 <file path=customXml/item8.xml><?xml version="1.0" encoding="utf-8"?>
 <Control xmlns="http://schemas.microsoft.com/VisualStudio/2011/storyboarding/control">
   <Id Name="System.Storyboarding.Common.Text" Revision="1" Stencil="System.Storyboarding.Common" StencilVersion="0.1"/>
@@ -12036,12 +15271,12 @@
 
 <file path=customXml/item9.xml><?xml version="1.0" encoding="utf-8"?>
 <Control xmlns="http://schemas.microsoft.com/VisualStudio/2011/storyboarding/control">
-  <Id Name="System.Storyboarding.Common.Text" Revision="1" Stencil="System.Storyboarding.Common" StencilVersion="0.1"/>
+  <Id Name="System.Storyboarding.Backgrounds.WebBrowser" Revision="1" Stencil="System.Storyboarding.Backgrounds" StencilVersion="0.1"/>
 </Control>
 </file>
 
 <file path=customXml/itemProps1.xml><?xml version="1.0" encoding="utf-8"?>
-<ds:datastoreItem xmlns:ds="http://schemas.openxmlformats.org/officeDocument/2006/customXml" ds:itemID="{58D81B6F-BE26-4A52-827E-6D0420314A21}">
+<ds:datastoreItem xmlns:ds="http://schemas.openxmlformats.org/officeDocument/2006/customXml" ds:itemID="{1C298D25-7E6D-413C-B679-6E00563C62F4}">
   <ds:schemaRefs>
     <ds:schemaRef ds:uri="http://schemas.microsoft.com/VisualStudio/2011/storyboarding/control"/>
   </ds:schemaRefs>
@@ -12049,7 +15284,7 @@
 </file>
 
 <file path=customXml/itemProps10.xml><?xml version="1.0" encoding="utf-8"?>
-<ds:datastoreItem xmlns:ds="http://schemas.openxmlformats.org/officeDocument/2006/customXml" ds:itemID="{CCF0DA38-1986-4DAB-BF65-15C3D4E8C187}">
+<ds:datastoreItem xmlns:ds="http://schemas.openxmlformats.org/officeDocument/2006/customXml" ds:itemID="{D980DD72-5243-4234-9BB8-207FBC271851}">
   <ds:schemaRefs>
     <ds:schemaRef ds:uri="http://schemas.microsoft.com/VisualStudio/2011/storyboarding/control"/>
   </ds:schemaRefs>
@@ -12065,6 +15300,174 @@
 </file>
 
 <file path=customXml/itemProps12.xml><?xml version="1.0" encoding="utf-8"?>
+<ds:datastoreItem xmlns:ds="http://schemas.openxmlformats.org/officeDocument/2006/customXml" ds:itemID="{0DB6FDB1-69E5-45C1-AF3F-BDD1DEB2EB9B}">
+  <ds:schemaRefs>
+    <ds:schemaRef ds:uri="http://schemas.microsoft.com/VisualStudio/2011/storyboarding/control"/>
+  </ds:schemaRefs>
+</ds:datastoreItem>
+</file>
+
+<file path=customXml/itemProps13.xml><?xml version="1.0" encoding="utf-8"?>
+<ds:datastoreItem xmlns:ds="http://schemas.openxmlformats.org/officeDocument/2006/customXml" ds:itemID="{3A2BFA52-4A3E-462F-B1E6-D85E5E995C70}">
+  <ds:schemaRefs>
+    <ds:schemaRef ds:uri="http://schemas.microsoft.com/VisualStudio/2011/storyboarding/control"/>
+  </ds:schemaRefs>
+</ds:datastoreItem>
+</file>
+
+<file path=customXml/itemProps14.xml><?xml version="1.0" encoding="utf-8"?>
+<ds:datastoreItem xmlns:ds="http://schemas.openxmlformats.org/officeDocument/2006/customXml" ds:itemID="{322101A8-15C7-4FBB-9D63-262FD51265ED}">
+  <ds:schemaRefs>
+    <ds:schemaRef ds:uri="http://schemas.microsoft.com/VisualStudio/2011/storyboarding/control"/>
+  </ds:schemaRefs>
+</ds:datastoreItem>
+</file>
+
+<file path=customXml/itemProps15.xml><?xml version="1.0" encoding="utf-8"?>
+<ds:datastoreItem xmlns:ds="http://schemas.openxmlformats.org/officeDocument/2006/customXml" ds:itemID="{07C3B091-09CA-4C61-B5E3-22E0717CE0A5}">
+  <ds:schemaRefs>
+    <ds:schemaRef ds:uri="http://schemas.microsoft.com/VisualStudio/2011/storyboarding/control"/>
+  </ds:schemaRefs>
+</ds:datastoreItem>
+</file>
+
+<file path=customXml/itemProps16.xml><?xml version="1.0" encoding="utf-8"?>
+<ds:datastoreItem xmlns:ds="http://schemas.openxmlformats.org/officeDocument/2006/customXml" ds:itemID="{583D48B3-1CF2-404B-B957-BBA53C23BA91}">
+  <ds:schemaRefs>
+    <ds:schemaRef ds:uri="http://schemas.microsoft.com/VisualStudio/2011/storyboarding/control"/>
+  </ds:schemaRefs>
+</ds:datastoreItem>
+</file>
+
+<file path=customXml/itemProps17.xml><?xml version="1.0" encoding="utf-8"?>
+<ds:datastoreItem xmlns:ds="http://schemas.openxmlformats.org/officeDocument/2006/customXml" ds:itemID="{CCF0DA38-1986-4DAB-BF65-15C3D4E8C187}">
+  <ds:schemaRefs>
+    <ds:schemaRef ds:uri="http://schemas.microsoft.com/VisualStudio/2011/storyboarding/control"/>
+  </ds:schemaRefs>
+</ds:datastoreItem>
+</file>
+
+<file path=customXml/itemProps18.xml><?xml version="1.0" encoding="utf-8"?>
+<ds:datastoreItem xmlns:ds="http://schemas.openxmlformats.org/officeDocument/2006/customXml" ds:itemID="{2F74691C-D5AA-40DA-97AB-FE01A539C04A}">
+  <ds:schemaRefs>
+    <ds:schemaRef ds:uri="http://schemas.microsoft.com/VisualStudio/2011/storyboarding/control"/>
+  </ds:schemaRefs>
+</ds:datastoreItem>
+</file>
+
+<file path=customXml/itemProps19.xml><?xml version="1.0" encoding="utf-8"?>
+<ds:datastoreItem xmlns:ds="http://schemas.openxmlformats.org/officeDocument/2006/customXml" ds:itemID="{86D2BAB8-3F3D-4719-A5D8-DE2FF41E16E8}">
+  <ds:schemaRefs>
+    <ds:schemaRef ds:uri="http://schemas.microsoft.com/VisualStudio/2011/storyboarding/control"/>
+  </ds:schemaRefs>
+</ds:datastoreItem>
+</file>
+
+<file path=customXml/itemProps2.xml><?xml version="1.0" encoding="utf-8"?>
+<ds:datastoreItem xmlns:ds="http://schemas.openxmlformats.org/officeDocument/2006/customXml" ds:itemID="{A694FD44-683D-4E92-9098-79FE270A6520}">
+  <ds:schemaRefs>
+    <ds:schemaRef ds:uri="http://schemas.microsoft.com/VisualStudio/2011/storyboarding/control"/>
+  </ds:schemaRefs>
+</ds:datastoreItem>
+</file>
+
+<file path=customXml/itemProps20.xml><?xml version="1.0" encoding="utf-8"?>
+<ds:datastoreItem xmlns:ds="http://schemas.openxmlformats.org/officeDocument/2006/customXml" ds:itemID="{A7B77CF9-0838-4CB4-B143-D45DF598F832}">
+  <ds:schemaRefs>
+    <ds:schemaRef ds:uri="http://schemas.microsoft.com/VisualStudio/2011/storyboarding/control"/>
+  </ds:schemaRefs>
+</ds:datastoreItem>
+</file>
+
+<file path=customXml/itemProps21.xml><?xml version="1.0" encoding="utf-8"?>
+<ds:datastoreItem xmlns:ds="http://schemas.openxmlformats.org/officeDocument/2006/customXml" ds:itemID="{1460E81C-73A8-4FED-A025-A889D34F9ED6}">
+  <ds:schemaRefs>
+    <ds:schemaRef ds:uri="http://schemas.microsoft.com/VisualStudio/2011/storyboarding/control"/>
+  </ds:schemaRefs>
+</ds:datastoreItem>
+</file>
+
+<file path=customXml/itemProps22.xml><?xml version="1.0" encoding="utf-8"?>
+<ds:datastoreItem xmlns:ds="http://schemas.openxmlformats.org/officeDocument/2006/customXml" ds:itemID="{3283B7E8-A188-4F5D-BAE9-55D82BC136E8}">
+  <ds:schemaRefs>
+    <ds:schemaRef ds:uri="http://schemas.microsoft.com/VisualStudio/2011/storyboarding/control"/>
+  </ds:schemaRefs>
+</ds:datastoreItem>
+</file>
+
+<file path=customXml/itemProps23.xml><?xml version="1.0" encoding="utf-8"?>
+<ds:datastoreItem xmlns:ds="http://schemas.openxmlformats.org/officeDocument/2006/customXml" ds:itemID="{C4C078BD-B7C6-4232-A0A1-09EC03ACAE08}">
+  <ds:schemaRefs>
+    <ds:schemaRef ds:uri="http://schemas.microsoft.com/VisualStudio/2011/storyboarding/control"/>
+  </ds:schemaRefs>
+</ds:datastoreItem>
+</file>
+
+<file path=customXml/itemProps24.xml><?xml version="1.0" encoding="utf-8"?>
+<ds:datastoreItem xmlns:ds="http://schemas.openxmlformats.org/officeDocument/2006/customXml" ds:itemID="{9DF914A3-A623-470A-920C-AB2740CDE79E}">
+  <ds:schemaRefs>
+    <ds:schemaRef ds:uri="http://schemas.microsoft.com/VisualStudio/2011/storyboarding/control"/>
+  </ds:schemaRefs>
+</ds:datastoreItem>
+</file>
+
+<file path=customXml/itemProps25.xml><?xml version="1.0" encoding="utf-8"?>
+<ds:datastoreItem xmlns:ds="http://schemas.openxmlformats.org/officeDocument/2006/customXml" ds:itemID="{961AABDC-3706-4EAF-A783-B70448E2BA8C}">
+  <ds:schemaRefs>
+    <ds:schemaRef ds:uri="http://schemas.microsoft.com/VisualStudio/2011/storyboarding/control"/>
+  </ds:schemaRefs>
+</ds:datastoreItem>
+</file>
+
+<file path=customXml/itemProps26.xml><?xml version="1.0" encoding="utf-8"?>
+<ds:datastoreItem xmlns:ds="http://schemas.openxmlformats.org/officeDocument/2006/customXml" ds:itemID="{8F3F5182-C1B3-4F2D-B536-FC558F7AF95D}">
+  <ds:schemaRefs>
+    <ds:schemaRef ds:uri="http://schemas.microsoft.com/VisualStudio/2011/storyboarding/control"/>
+  </ds:schemaRefs>
+</ds:datastoreItem>
+</file>
+
+<file path=customXml/itemProps27.xml><?xml version="1.0" encoding="utf-8"?>
+<ds:datastoreItem xmlns:ds="http://schemas.openxmlformats.org/officeDocument/2006/customXml" ds:itemID="{5516EA6B-196E-4D6E-8253-18BAC0EF962D}">
+  <ds:schemaRefs>
+    <ds:schemaRef ds:uri="http://schemas.microsoft.com/VisualStudio/2011/storyboarding/control"/>
+  </ds:schemaRefs>
+</ds:datastoreItem>
+</file>
+
+<file path=customXml/itemProps28.xml><?xml version="1.0" encoding="utf-8"?>
+<ds:datastoreItem xmlns:ds="http://schemas.openxmlformats.org/officeDocument/2006/customXml" ds:itemID="{E8316EDB-CA88-4711-BEC6-B4CD89CC0CC0}">
+  <ds:schemaRefs>
+    <ds:schemaRef ds:uri="http://schemas.microsoft.com/VisualStudio/2011/storyboarding/control"/>
+  </ds:schemaRefs>
+</ds:datastoreItem>
+</file>
+
+<file path=customXml/itemProps29.xml><?xml version="1.0" encoding="utf-8"?>
+<ds:datastoreItem xmlns:ds="http://schemas.openxmlformats.org/officeDocument/2006/customXml" ds:itemID="{4571053C-228C-42E6-A1F5-1D4F28F70937}">
+  <ds:schemaRefs>
+    <ds:schemaRef ds:uri="http://schemas.microsoft.com/VisualStudio/2011/storyboarding/control"/>
+  </ds:schemaRefs>
+</ds:datastoreItem>
+</file>
+
+<file path=customXml/itemProps3.xml><?xml version="1.0" encoding="utf-8"?>
+<ds:datastoreItem xmlns:ds="http://schemas.openxmlformats.org/officeDocument/2006/customXml" ds:itemID="{40911195-855E-4B53-92C7-777DB6D09241}">
+  <ds:schemaRefs>
+    <ds:schemaRef ds:uri="http://schemas.microsoft.com/VisualStudio/2011/storyboarding/control"/>
+  </ds:schemaRefs>
+</ds:datastoreItem>
+</file>
+
+<file path=customXml/itemProps30.xml><?xml version="1.0" encoding="utf-8"?>
+<ds:datastoreItem xmlns:ds="http://schemas.openxmlformats.org/officeDocument/2006/customXml" ds:itemID="{860ED1DF-12F7-41CD-AC3D-3D47A69BAF47}">
+  <ds:schemaRefs>
+    <ds:schemaRef ds:uri="http://schemas.microsoft.com/VisualStudio/2011/storyboarding/control"/>
+  </ds:schemaRefs>
+</ds:datastoreItem>
+</file>
+
+<file path=customXml/itemProps31.xml><?xml version="1.0" encoding="utf-8"?>
 <ds:datastoreItem xmlns:ds="http://schemas.openxmlformats.org/officeDocument/2006/customXml" ds:itemID="{5542CC83-642C-4FEB-9C73-96B267D28C40}">
   <ds:schemaRefs>
     <ds:schemaRef ds:uri="http://schemas.microsoft.com/VisualStudio/2011/storyboarding/control"/>
@@ -12072,7 +15475,111 @@
 </ds:datastoreItem>
 </file>
 
-<file path=customXml/itemProps13.xml><?xml version="1.0" encoding="utf-8"?>
+<file path=customXml/itemProps32.xml><?xml version="1.0" encoding="utf-8"?>
+<ds:datastoreItem xmlns:ds="http://schemas.openxmlformats.org/officeDocument/2006/customXml" ds:itemID="{8AB21784-DCD5-4DDE-ADA2-E306BC4E6017}">
+  <ds:schemaRefs>
+    <ds:schemaRef ds:uri="http://schemas.microsoft.com/VisualStudio/2011/storyboarding/control"/>
+  </ds:schemaRefs>
+</ds:datastoreItem>
+</file>
+
+<file path=customXml/itemProps33.xml><?xml version="1.0" encoding="utf-8"?>
+<ds:datastoreItem xmlns:ds="http://schemas.openxmlformats.org/officeDocument/2006/customXml" ds:itemID="{D167DA7F-5DA9-420E-8292-FCD808F255A6}">
+  <ds:schemaRefs>
+    <ds:schemaRef ds:uri="http://schemas.microsoft.com/VisualStudio/2011/storyboarding/control"/>
+  </ds:schemaRefs>
+</ds:datastoreItem>
+</file>
+
+<file path=customXml/itemProps34.xml><?xml version="1.0" encoding="utf-8"?>
+<ds:datastoreItem xmlns:ds="http://schemas.openxmlformats.org/officeDocument/2006/customXml" ds:itemID="{945085E0-0893-4EEB-8346-E4BF9E1D8BA0}">
+  <ds:schemaRefs>
+    <ds:schemaRef ds:uri="http://schemas.microsoft.com/VisualStudio/2011/storyboarding/control"/>
+  </ds:schemaRefs>
+</ds:datastoreItem>
+</file>
+
+<file path=customXml/itemProps35.xml><?xml version="1.0" encoding="utf-8"?>
+<ds:datastoreItem xmlns:ds="http://schemas.openxmlformats.org/officeDocument/2006/customXml" ds:itemID="{44D58D84-D136-4CE4-B745-4C744F62BBCD}">
+  <ds:schemaRefs>
+    <ds:schemaRef ds:uri="http://schemas.microsoft.com/VisualStudio/2011/storyboarding/control"/>
+  </ds:schemaRefs>
+</ds:datastoreItem>
+</file>
+
+<file path=customXml/itemProps36.xml><?xml version="1.0" encoding="utf-8"?>
+<ds:datastoreItem xmlns:ds="http://schemas.openxmlformats.org/officeDocument/2006/customXml" ds:itemID="{C4F08E0A-31F4-4462-9CDE-78A47A65F8C8}">
+  <ds:schemaRefs>
+    <ds:schemaRef ds:uri="http://schemas.microsoft.com/VisualStudio/2011/storyboarding/control"/>
+  </ds:schemaRefs>
+</ds:datastoreItem>
+</file>
+
+<file path=customXml/itemProps37.xml><?xml version="1.0" encoding="utf-8"?>
+<ds:datastoreItem xmlns:ds="http://schemas.openxmlformats.org/officeDocument/2006/customXml" ds:itemID="{1CAC6399-6732-4330-B963-02ABF8500240}">
+  <ds:schemaRefs>
+    <ds:schemaRef ds:uri="http://schemas.microsoft.com/VisualStudio/2011/storyboarding/control"/>
+  </ds:schemaRefs>
+</ds:datastoreItem>
+</file>
+
+<file path=customXml/itemProps38.xml><?xml version="1.0" encoding="utf-8"?>
+<ds:datastoreItem xmlns:ds="http://schemas.openxmlformats.org/officeDocument/2006/customXml" ds:itemID="{58D81B6F-BE26-4A52-827E-6D0420314A21}">
+  <ds:schemaRefs>
+    <ds:schemaRef ds:uri="http://schemas.microsoft.com/VisualStudio/2011/storyboarding/control"/>
+  </ds:schemaRefs>
+</ds:datastoreItem>
+</file>
+
+<file path=customXml/itemProps39.xml><?xml version="1.0" encoding="utf-8"?>
+<ds:datastoreItem xmlns:ds="http://schemas.openxmlformats.org/officeDocument/2006/customXml" ds:itemID="{33BFA383-1590-4810-A264-4D5D3DDB135B}">
+  <ds:schemaRefs>
+    <ds:schemaRef ds:uri="http://schemas.microsoft.com/VisualStudio/2011/storyboarding/control"/>
+  </ds:schemaRefs>
+</ds:datastoreItem>
+</file>
+
+<file path=customXml/itemProps4.xml><?xml version="1.0" encoding="utf-8"?>
+<ds:datastoreItem xmlns:ds="http://schemas.openxmlformats.org/officeDocument/2006/customXml" ds:itemID="{AB2C5266-A809-4630-A80F-57ECBE121C80}">
+  <ds:schemaRefs>
+    <ds:schemaRef ds:uri="http://schemas.microsoft.com/VisualStudio/2011/storyboarding/control"/>
+  </ds:schemaRefs>
+</ds:datastoreItem>
+</file>
+
+<file path=customXml/itemProps40.xml><?xml version="1.0" encoding="utf-8"?>
+<ds:datastoreItem xmlns:ds="http://schemas.openxmlformats.org/officeDocument/2006/customXml" ds:itemID="{CA8E069B-E336-47A0-9BDB-FE096B1C405E}">
+  <ds:schemaRefs>
+    <ds:schemaRef ds:uri="http://schemas.microsoft.com/VisualStudio/2011/storyboarding/control"/>
+  </ds:schemaRefs>
+</ds:datastoreItem>
+</file>
+
+<file path=customXml/itemProps41.xml><?xml version="1.0" encoding="utf-8"?>
+<ds:datastoreItem xmlns:ds="http://schemas.openxmlformats.org/officeDocument/2006/customXml" ds:itemID="{EE2829B6-7882-4524-AA19-FB0AF59B96DA}">
+  <ds:schemaRefs>
+    <ds:schemaRef ds:uri="http://schemas.microsoft.com/VisualStudio/2011/storyboarding/control"/>
+  </ds:schemaRefs>
+</ds:datastoreItem>
+</file>
+
+<file path=customXml/itemProps42.xml><?xml version="1.0" encoding="utf-8"?>
+<ds:datastoreItem xmlns:ds="http://schemas.openxmlformats.org/officeDocument/2006/customXml" ds:itemID="{04A84746-C966-41AB-B7BB-7D0080E4DD05}">
+  <ds:schemaRefs>
+    <ds:schemaRef ds:uri="http://schemas.microsoft.com/VisualStudio/2011/storyboarding/control"/>
+  </ds:schemaRefs>
+</ds:datastoreItem>
+</file>
+
+<file path=customXml/itemProps43.xml><?xml version="1.0" encoding="utf-8"?>
+<ds:datastoreItem xmlns:ds="http://schemas.openxmlformats.org/officeDocument/2006/customXml" ds:itemID="{8016485D-1097-4E97-9016-A7B23DE48229}">
+  <ds:schemaRefs>
+    <ds:schemaRef ds:uri="http://schemas.microsoft.com/VisualStudio/2011/storyboarding/control"/>
+  </ds:schemaRefs>
+</ds:datastoreItem>
+</file>
+
+<file path=customXml/itemProps44.xml><?xml version="1.0" encoding="utf-8"?>
 <ds:datastoreItem xmlns:ds="http://schemas.openxmlformats.org/officeDocument/2006/customXml" ds:itemID="{D6B004F4-612C-4678-9C91-A32C1118C303}">
   <ds:schemaRefs>
     <ds:schemaRef ds:uri="http://schemas.microsoft.com/VisualStudio/2011/storyboarding/control"/>
@@ -12080,183 +15587,47 @@
 </ds:datastoreItem>
 </file>
 
-<file path=customXml/itemProps14.xml><?xml version="1.0" encoding="utf-8"?>
-<ds:datastoreItem xmlns:ds="http://schemas.openxmlformats.org/officeDocument/2006/customXml" ds:itemID="{C4C078BD-B7C6-4232-A0A1-09EC03ACAE08}">
+<file path=customXml/itemProps45.xml><?xml version="1.0" encoding="utf-8"?>
+<ds:datastoreItem xmlns:ds="http://schemas.openxmlformats.org/officeDocument/2006/customXml" ds:itemID="{71017646-8211-4411-8CC5-F15B4E09B292}">
   <ds:schemaRefs>
     <ds:schemaRef ds:uri="http://schemas.microsoft.com/VisualStudio/2011/storyboarding/control"/>
   </ds:schemaRefs>
 </ds:datastoreItem>
 </file>
 
-<file path=customXml/itemProps15.xml><?xml version="1.0" encoding="utf-8"?>
-<ds:datastoreItem xmlns:ds="http://schemas.openxmlformats.org/officeDocument/2006/customXml" ds:itemID="{CA8E069B-E336-47A0-9BDB-FE096B1C405E}">
+<file path=customXml/itemProps46.xml><?xml version="1.0" encoding="utf-8"?>
+<ds:datastoreItem xmlns:ds="http://schemas.openxmlformats.org/officeDocument/2006/customXml" ds:itemID="{01B0BBFE-9EDD-44BD-9B83-BC4C513A961D}">
   <ds:schemaRefs>
     <ds:schemaRef ds:uri="http://schemas.microsoft.com/VisualStudio/2011/storyboarding/control"/>
   </ds:schemaRefs>
 </ds:datastoreItem>
 </file>
 
-<file path=customXml/itemProps16.xml><?xml version="1.0" encoding="utf-8"?>
-<ds:datastoreItem xmlns:ds="http://schemas.openxmlformats.org/officeDocument/2006/customXml" ds:itemID="{779D6FE4-456B-49B9-830E-6559B351BF40}">
+<file path=customXml/itemProps47.xml><?xml version="1.0" encoding="utf-8"?>
+<ds:datastoreItem xmlns:ds="http://schemas.openxmlformats.org/officeDocument/2006/customXml" ds:itemID="{6F8F7BF1-32E3-48F7-A0BA-7E78CEBCFD80}">
   <ds:schemaRefs>
     <ds:schemaRef ds:uri="http://schemas.microsoft.com/VisualStudio/2011/storyboarding/control"/>
   </ds:schemaRefs>
 </ds:datastoreItem>
 </file>
 
-<file path=customXml/itemProps17.xml><?xml version="1.0" encoding="utf-8"?>
-<ds:datastoreItem xmlns:ds="http://schemas.openxmlformats.org/officeDocument/2006/customXml" ds:itemID="{8AB21784-DCD5-4DDE-ADA2-E306BC4E6017}">
+<file path=customXml/itemProps48.xml><?xml version="1.0" encoding="utf-8"?>
+<ds:datastoreItem xmlns:ds="http://schemas.openxmlformats.org/officeDocument/2006/customXml" ds:itemID="{8D03B46B-3796-42D3-9608-8A0ACF5E55C1}">
   <ds:schemaRefs>
     <ds:schemaRef ds:uri="http://schemas.microsoft.com/VisualStudio/2011/storyboarding/control"/>
   </ds:schemaRefs>
 </ds:datastoreItem>
 </file>
 
-<file path=customXml/itemProps18.xml><?xml version="1.0" encoding="utf-8"?>
-<ds:datastoreItem xmlns:ds="http://schemas.openxmlformats.org/officeDocument/2006/customXml" ds:itemID="{1C298D25-7E6D-413C-B679-6E00563C62F4}">
+<file path=customXml/itemProps49.xml><?xml version="1.0" encoding="utf-8"?>
+<ds:datastoreItem xmlns:ds="http://schemas.openxmlformats.org/officeDocument/2006/customXml" ds:itemID="{B37FA282-2A25-47C6-9B68-851148330B3A}">
   <ds:schemaRefs>
     <ds:schemaRef ds:uri="http://schemas.microsoft.com/VisualStudio/2011/storyboarding/control"/>
   </ds:schemaRefs>
 </ds:datastoreItem>
 </file>
 
-<file path=customXml/itemProps19.xml><?xml version="1.0" encoding="utf-8"?>
-<ds:datastoreItem xmlns:ds="http://schemas.openxmlformats.org/officeDocument/2006/customXml" ds:itemID="{2F74691C-D5AA-40DA-97AB-FE01A539C04A}">
-  <ds:schemaRefs>
-    <ds:schemaRef ds:uri="http://schemas.microsoft.com/VisualStudio/2011/storyboarding/control"/>
-  </ds:schemaRefs>
-</ds:datastoreItem>
-</file>
-
-<file path=customXml/itemProps2.xml><?xml version="1.0" encoding="utf-8"?>
-<ds:datastoreItem xmlns:ds="http://schemas.openxmlformats.org/officeDocument/2006/customXml" ds:itemID="{883AAEB0-9407-4694-A320-3C16B05BC67F}">
-  <ds:schemaRefs>
-    <ds:schemaRef ds:uri="http://schemas.microsoft.com/VisualStudio/2011/storyboarding/control"/>
-  </ds:schemaRefs>
-</ds:datastoreItem>
-</file>
-
-<file path=customXml/itemProps20.xml><?xml version="1.0" encoding="utf-8"?>
-<ds:datastoreItem xmlns:ds="http://schemas.openxmlformats.org/officeDocument/2006/customXml" ds:itemID="{C4F08E0A-31F4-4462-9CDE-78A47A65F8C8}">
-  <ds:schemaRefs>
-    <ds:schemaRef ds:uri="http://schemas.microsoft.com/VisualStudio/2011/storyboarding/control"/>
-  </ds:schemaRefs>
-</ds:datastoreItem>
-</file>
-
-<file path=customXml/itemProps21.xml><?xml version="1.0" encoding="utf-8"?>
-<ds:datastoreItem xmlns:ds="http://schemas.openxmlformats.org/officeDocument/2006/customXml" ds:itemID="{AB2C5266-A809-4630-A80F-57ECBE121C80}">
-  <ds:schemaRefs>
-    <ds:schemaRef ds:uri="http://schemas.microsoft.com/VisualStudio/2011/storyboarding/control"/>
-  </ds:schemaRefs>
-</ds:datastoreItem>
-</file>
-
-<file path=customXml/itemProps22.xml><?xml version="1.0" encoding="utf-8"?>
-<ds:datastoreItem xmlns:ds="http://schemas.openxmlformats.org/officeDocument/2006/customXml" ds:itemID="{9DF914A3-A623-470A-920C-AB2740CDE79E}">
-  <ds:schemaRefs>
-    <ds:schemaRef ds:uri="http://schemas.microsoft.com/VisualStudio/2011/storyboarding/control"/>
-  </ds:schemaRefs>
-</ds:datastoreItem>
-</file>
-
-<file path=customXml/itemProps23.xml><?xml version="1.0" encoding="utf-8"?>
-<ds:datastoreItem xmlns:ds="http://schemas.openxmlformats.org/officeDocument/2006/customXml" ds:itemID="{EE2829B6-7882-4524-AA19-FB0AF59B96DA}">
-  <ds:schemaRefs>
-    <ds:schemaRef ds:uri="http://schemas.microsoft.com/VisualStudio/2011/storyboarding/control"/>
-  </ds:schemaRefs>
-</ds:datastoreItem>
-</file>
-
-<file path=customXml/itemProps24.xml><?xml version="1.0" encoding="utf-8"?>
-<ds:datastoreItem xmlns:ds="http://schemas.openxmlformats.org/officeDocument/2006/customXml" ds:itemID="{0DB6FDB1-69E5-45C1-AF3F-BDD1DEB2EB9B}">
-  <ds:schemaRefs>
-    <ds:schemaRef ds:uri="http://schemas.microsoft.com/VisualStudio/2011/storyboarding/control"/>
-  </ds:schemaRefs>
-</ds:datastoreItem>
-</file>
-
-<file path=customXml/itemProps25.xml><?xml version="1.0" encoding="utf-8"?>
-<ds:datastoreItem xmlns:ds="http://schemas.openxmlformats.org/officeDocument/2006/customXml" ds:itemID="{D167DA7F-5DA9-420E-8292-FCD808F255A6}">
-  <ds:schemaRefs>
-    <ds:schemaRef ds:uri="http://schemas.microsoft.com/VisualStudio/2011/storyboarding/control"/>
-  </ds:schemaRefs>
-</ds:datastoreItem>
-</file>
-
-<file path=customXml/itemProps26.xml><?xml version="1.0" encoding="utf-8"?>
-<ds:datastoreItem xmlns:ds="http://schemas.openxmlformats.org/officeDocument/2006/customXml" ds:itemID="{A694FD44-683D-4E92-9098-79FE270A6520}">
-  <ds:schemaRefs>
-    <ds:schemaRef ds:uri="http://schemas.microsoft.com/VisualStudio/2011/storyboarding/control"/>
-  </ds:schemaRefs>
-</ds:datastoreItem>
-</file>
-
-<file path=customXml/itemProps27.xml><?xml version="1.0" encoding="utf-8"?>
-<ds:datastoreItem xmlns:ds="http://schemas.openxmlformats.org/officeDocument/2006/customXml" ds:itemID="{961AABDC-3706-4EAF-A783-B70448E2BA8C}">
-  <ds:schemaRefs>
-    <ds:schemaRef ds:uri="http://schemas.microsoft.com/VisualStudio/2011/storyboarding/control"/>
-  </ds:schemaRefs>
-</ds:datastoreItem>
-</file>
-
-<file path=customXml/itemProps28.xml><?xml version="1.0" encoding="utf-8"?>
-<ds:datastoreItem xmlns:ds="http://schemas.openxmlformats.org/officeDocument/2006/customXml" ds:itemID="{04A84746-C966-41AB-B7BB-7D0080E4DD05}">
-  <ds:schemaRefs>
-    <ds:schemaRef ds:uri="http://schemas.microsoft.com/VisualStudio/2011/storyboarding/control"/>
-  </ds:schemaRefs>
-</ds:datastoreItem>
-</file>
-
-<file path=customXml/itemProps29.xml><?xml version="1.0" encoding="utf-8"?>
-<ds:datastoreItem xmlns:ds="http://schemas.openxmlformats.org/officeDocument/2006/customXml" ds:itemID="{D980DD72-5243-4234-9BB8-207FBC271851}">
-  <ds:schemaRefs>
-    <ds:schemaRef ds:uri="http://schemas.microsoft.com/VisualStudio/2011/storyboarding/control"/>
-  </ds:schemaRefs>
-</ds:datastoreItem>
-</file>
-
-<file path=customXml/itemProps3.xml><?xml version="1.0" encoding="utf-8"?>
-<ds:datastoreItem xmlns:ds="http://schemas.openxmlformats.org/officeDocument/2006/customXml" ds:itemID="{860ED1DF-12F7-41CD-AC3D-3D47A69BAF47}">
-  <ds:schemaRefs>
-    <ds:schemaRef ds:uri="http://schemas.microsoft.com/VisualStudio/2011/storyboarding/control"/>
-  </ds:schemaRefs>
-</ds:datastoreItem>
-</file>
-
-<file path=customXml/itemProps30.xml><?xml version="1.0" encoding="utf-8"?>
-<ds:datastoreItem xmlns:ds="http://schemas.openxmlformats.org/officeDocument/2006/customXml" ds:itemID="{8F3F5182-C1B3-4F2D-B536-FC558F7AF95D}">
-  <ds:schemaRefs>
-    <ds:schemaRef ds:uri="http://schemas.microsoft.com/VisualStudio/2011/storyboarding/control"/>
-  </ds:schemaRefs>
-</ds:datastoreItem>
-</file>
-
-<file path=customXml/itemProps31.xml><?xml version="1.0" encoding="utf-8"?>
-<ds:datastoreItem xmlns:ds="http://schemas.openxmlformats.org/officeDocument/2006/customXml" ds:itemID="{86D2BAB8-3F3D-4719-A5D8-DE2FF41E16E8}">
-  <ds:schemaRefs>
-    <ds:schemaRef ds:uri="http://schemas.microsoft.com/VisualStudio/2011/storyboarding/control"/>
-  </ds:schemaRefs>
-</ds:datastoreItem>
-</file>
-
-<file path=customXml/itemProps32.xml><?xml version="1.0" encoding="utf-8"?>
-<ds:datastoreItem xmlns:ds="http://schemas.openxmlformats.org/officeDocument/2006/customXml" ds:itemID="{3A2BFA52-4A3E-462F-B1E6-D85E5E995C70}">
-  <ds:schemaRefs>
-    <ds:schemaRef ds:uri="http://schemas.microsoft.com/VisualStudio/2011/storyboarding/control"/>
-  </ds:schemaRefs>
-</ds:datastoreItem>
-</file>
-
-<file path=customXml/itemProps33.xml><?xml version="1.0" encoding="utf-8"?>
-<ds:datastoreItem xmlns:ds="http://schemas.openxmlformats.org/officeDocument/2006/customXml" ds:itemID="{945085E0-0893-4EEB-8346-E4BF9E1D8BA0}">
-  <ds:schemaRefs>
-    <ds:schemaRef ds:uri="http://schemas.microsoft.com/VisualStudio/2011/storyboarding/control"/>
-  </ds:schemaRefs>
-</ds:datastoreItem>
-</file>
-
-<file path=customXml/itemProps34.xml><?xml version="1.0" encoding="utf-8"?>
+<file path=customXml/itemProps5.xml><?xml version="1.0" encoding="utf-8"?>
 <ds:datastoreItem xmlns:ds="http://schemas.openxmlformats.org/officeDocument/2006/customXml" ds:itemID="{2195D455-7A95-4EAE-A9E7-A402096C1047}">
   <ds:schemaRefs>
     <ds:schemaRef ds:uri="http://schemas.microsoft.com/VisualStudio/2011/storyboarding/control"/>
@@ -12264,71 +15635,87 @@
 </ds:datastoreItem>
 </file>
 
-<file path=customXml/itemProps35.xml><?xml version="1.0" encoding="utf-8"?>
-<ds:datastoreItem xmlns:ds="http://schemas.openxmlformats.org/officeDocument/2006/customXml" ds:itemID="{5516EA6B-196E-4D6E-8253-18BAC0EF962D}">
+<file path=customXml/itemProps50.xml><?xml version="1.0" encoding="utf-8"?>
+<ds:datastoreItem xmlns:ds="http://schemas.openxmlformats.org/officeDocument/2006/customXml" ds:itemID="{909CB29C-C94D-479C-9BD5-DF80DD09C1A5}">
   <ds:schemaRefs>
     <ds:schemaRef ds:uri="http://schemas.microsoft.com/VisualStudio/2011/storyboarding/control"/>
   </ds:schemaRefs>
 </ds:datastoreItem>
 </file>
 
-<file path=customXml/itemProps36.xml><?xml version="1.0" encoding="utf-8"?>
-<ds:datastoreItem xmlns:ds="http://schemas.openxmlformats.org/officeDocument/2006/customXml" ds:itemID="{8016485D-1097-4E97-9016-A7B23DE48229}">
+<file path=customXml/itemProps51.xml><?xml version="1.0" encoding="utf-8"?>
+<ds:datastoreItem xmlns:ds="http://schemas.openxmlformats.org/officeDocument/2006/customXml" ds:itemID="{F1392C8C-8F78-4996-9293-38C7266D3F25}">
   <ds:schemaRefs>
     <ds:schemaRef ds:uri="http://schemas.microsoft.com/VisualStudio/2011/storyboarding/control"/>
   </ds:schemaRefs>
 </ds:datastoreItem>
 </file>
 
-<file path=customXml/itemProps37.xml><?xml version="1.0" encoding="utf-8"?>
-<ds:datastoreItem xmlns:ds="http://schemas.openxmlformats.org/officeDocument/2006/customXml" ds:itemID="{322101A8-15C7-4FBB-9D63-262FD51265ED}">
+<file path=customXml/itemProps52.xml><?xml version="1.0" encoding="utf-8"?>
+<ds:datastoreItem xmlns:ds="http://schemas.openxmlformats.org/officeDocument/2006/customXml" ds:itemID="{31CFC942-E3ED-4044-B2F2-27ACC98EEC56}">
   <ds:schemaRefs>
     <ds:schemaRef ds:uri="http://schemas.microsoft.com/VisualStudio/2011/storyboarding/control"/>
   </ds:schemaRefs>
 </ds:datastoreItem>
 </file>
 
-<file path=customXml/itemProps38.xml><?xml version="1.0" encoding="utf-8"?>
-<ds:datastoreItem xmlns:ds="http://schemas.openxmlformats.org/officeDocument/2006/customXml" ds:itemID="{44D58D84-D136-4CE4-B745-4C744F62BBCD}">
+<file path=customXml/itemProps53.xml><?xml version="1.0" encoding="utf-8"?>
+<ds:datastoreItem xmlns:ds="http://schemas.openxmlformats.org/officeDocument/2006/customXml" ds:itemID="{E8BE9F28-5D93-456E-9F48-D01FC7CAB3D1}">
   <ds:schemaRefs>
     <ds:schemaRef ds:uri="http://schemas.microsoft.com/VisualStudio/2011/storyboarding/control"/>
   </ds:schemaRefs>
 </ds:datastoreItem>
 </file>
 
-<file path=customXml/itemProps39.xml><?xml version="1.0" encoding="utf-8"?>
-<ds:datastoreItem xmlns:ds="http://schemas.openxmlformats.org/officeDocument/2006/customXml" ds:itemID="{40911195-855E-4B53-92C7-777DB6D09241}">
+<file path=customXml/itemProps54.xml><?xml version="1.0" encoding="utf-8"?>
+<ds:datastoreItem xmlns:ds="http://schemas.openxmlformats.org/officeDocument/2006/customXml" ds:itemID="{BC36EBC9-D612-4E2A-906D-76E47BD533FB}">
   <ds:schemaRefs>
     <ds:schemaRef ds:uri="http://schemas.microsoft.com/VisualStudio/2011/storyboarding/control"/>
   </ds:schemaRefs>
 </ds:datastoreItem>
 </file>
 
-<file path=customXml/itemProps4.xml><?xml version="1.0" encoding="utf-8"?>
-<ds:datastoreItem xmlns:ds="http://schemas.openxmlformats.org/officeDocument/2006/customXml" ds:itemID="{1460E81C-73A8-4FED-A025-A889D34F9ED6}">
+<file path=customXml/itemProps55.xml><?xml version="1.0" encoding="utf-8"?>
+<ds:datastoreItem xmlns:ds="http://schemas.openxmlformats.org/officeDocument/2006/customXml" ds:itemID="{9FF0AB84-2314-4D73-9ABD-6CA74066B7EE}">
   <ds:schemaRefs>
     <ds:schemaRef ds:uri="http://schemas.microsoft.com/VisualStudio/2011/storyboarding/control"/>
   </ds:schemaRefs>
 </ds:datastoreItem>
 </file>
 
-<file path=customXml/itemProps40.xml><?xml version="1.0" encoding="utf-8"?>
-<ds:datastoreItem xmlns:ds="http://schemas.openxmlformats.org/officeDocument/2006/customXml" ds:itemID="{07C3B091-09CA-4C61-B5E3-22E0717CE0A5}">
+<file path=customXml/itemProps56.xml><?xml version="1.0" encoding="utf-8"?>
+<ds:datastoreItem xmlns:ds="http://schemas.openxmlformats.org/officeDocument/2006/customXml" ds:itemID="{841CD4AF-E83E-469A-964C-B17C92F10E8E}">
   <ds:schemaRefs>
     <ds:schemaRef ds:uri="http://schemas.microsoft.com/VisualStudio/2011/storyboarding/control"/>
   </ds:schemaRefs>
 </ds:datastoreItem>
 </file>
 
-<file path=customXml/itemProps41.xml><?xml version="1.0" encoding="utf-8"?>
-<ds:datastoreItem xmlns:ds="http://schemas.openxmlformats.org/officeDocument/2006/customXml" ds:itemID="{1CAC6399-6732-4330-B963-02ABF8500240}">
+<file path=customXml/itemProps57.xml><?xml version="1.0" encoding="utf-8"?>
+<ds:datastoreItem xmlns:ds="http://schemas.openxmlformats.org/officeDocument/2006/customXml" ds:itemID="{DF7457C2-8445-4FA9-8E4C-0A4F370B6BA0}">
   <ds:schemaRefs>
     <ds:schemaRef ds:uri="http://schemas.microsoft.com/VisualStudio/2011/storyboarding/control"/>
   </ds:schemaRefs>
 </ds:datastoreItem>
 </file>
 
-<file path=customXml/itemProps42.xml><?xml version="1.0" encoding="utf-8"?>
+<file path=customXml/itemProps58.xml><?xml version="1.0" encoding="utf-8"?>
+<ds:datastoreItem xmlns:ds="http://schemas.openxmlformats.org/officeDocument/2006/customXml" ds:itemID="{F50D43AC-2604-43DB-89D1-883AF1A96D9E}">
+  <ds:schemaRefs>
+    <ds:schemaRef ds:uri="http://schemas.microsoft.com/VisualStudio/2011/storyboarding/control"/>
+  </ds:schemaRefs>
+</ds:datastoreItem>
+</file>
+
+<file path=customXml/itemProps59.xml><?xml version="1.0" encoding="utf-8"?>
+<ds:datastoreItem xmlns:ds="http://schemas.openxmlformats.org/officeDocument/2006/customXml" ds:itemID="{4AFC922A-AF70-48BF-B505-87C1A1C0C534}">
+  <ds:schemaRefs>
+    <ds:schemaRef ds:uri="http://schemas.microsoft.com/VisualStudio/2011/storyboarding/control"/>
+  </ds:schemaRefs>
+</ds:datastoreItem>
+</file>
+
+<file path=customXml/itemProps6.xml><?xml version="1.0" encoding="utf-8"?>
 <ds:datastoreItem xmlns:ds="http://schemas.openxmlformats.org/officeDocument/2006/customXml" ds:itemID="{518752C0-478A-40E9-B165-E6A02CF5CDCE}">
   <ds:schemaRefs>
     <ds:schemaRef ds:uri="http://schemas.microsoft.com/VisualStudio/2011/storyboarding/control"/>
@@ -12336,32 +15723,80 @@
 </ds:datastoreItem>
 </file>
 
-<file path=customXml/itemProps43.xml><?xml version="1.0" encoding="utf-8"?>
-<ds:datastoreItem xmlns:ds="http://schemas.openxmlformats.org/officeDocument/2006/customXml" ds:itemID="{E8316EDB-CA88-4711-BEC6-B4CD89CC0CC0}">
+<file path=customXml/itemProps60.xml><?xml version="1.0" encoding="utf-8"?>
+<ds:datastoreItem xmlns:ds="http://schemas.openxmlformats.org/officeDocument/2006/customXml" ds:itemID="{0366E824-7EF4-42AC-8B52-EB5A5245210D}">
   <ds:schemaRefs>
     <ds:schemaRef ds:uri="http://schemas.microsoft.com/VisualStudio/2011/storyboarding/control"/>
   </ds:schemaRefs>
 </ds:datastoreItem>
 </file>
 
-<file path=customXml/itemProps44.xml><?xml version="1.0" encoding="utf-8"?>
-<ds:datastoreItem xmlns:ds="http://schemas.openxmlformats.org/officeDocument/2006/customXml" ds:itemID="{A7B77CF9-0838-4CB4-B143-D45DF598F832}">
+<file path=customXml/itemProps61.xml><?xml version="1.0" encoding="utf-8"?>
+<ds:datastoreItem xmlns:ds="http://schemas.openxmlformats.org/officeDocument/2006/customXml" ds:itemID="{314813DF-888E-40A9-98D9-E695A4B0AB26}">
   <ds:schemaRefs>
     <ds:schemaRef ds:uri="http://schemas.microsoft.com/VisualStudio/2011/storyboarding/control"/>
   </ds:schemaRefs>
 </ds:datastoreItem>
 </file>
 
-<file path=customXml/itemProps5.xml><?xml version="1.0" encoding="utf-8"?>
-<ds:datastoreItem xmlns:ds="http://schemas.openxmlformats.org/officeDocument/2006/customXml" ds:itemID="{583D48B3-1CF2-404B-B957-BBA53C23BA91}">
+<file path=customXml/itemProps62.xml><?xml version="1.0" encoding="utf-8"?>
+<ds:datastoreItem xmlns:ds="http://schemas.openxmlformats.org/officeDocument/2006/customXml" ds:itemID="{F232F576-9371-4522-A95C-91F481359F2F}">
   <ds:schemaRefs>
     <ds:schemaRef ds:uri="http://schemas.microsoft.com/VisualStudio/2011/storyboarding/control"/>
   </ds:schemaRefs>
 </ds:datastoreItem>
 </file>
 
-<file path=customXml/itemProps6.xml><?xml version="1.0" encoding="utf-8"?>
-<ds:datastoreItem xmlns:ds="http://schemas.openxmlformats.org/officeDocument/2006/customXml" ds:itemID="{33BFA383-1590-4810-A264-4D5D3DDB135B}">
+<file path=customXml/itemProps63.xml><?xml version="1.0" encoding="utf-8"?>
+<ds:datastoreItem xmlns:ds="http://schemas.openxmlformats.org/officeDocument/2006/customXml" ds:itemID="{403D1D04-DEC9-4939-8CD2-110150181F96}">
+  <ds:schemaRefs>
+    <ds:schemaRef ds:uri="http://schemas.microsoft.com/VisualStudio/2011/storyboarding/control"/>
+  </ds:schemaRefs>
+</ds:datastoreItem>
+</file>
+
+<file path=customXml/itemProps64.xml><?xml version="1.0" encoding="utf-8"?>
+<ds:datastoreItem xmlns:ds="http://schemas.openxmlformats.org/officeDocument/2006/customXml" ds:itemID="{DB7C69F6-3835-4DBB-A271-3F12B6668C77}">
+  <ds:schemaRefs>
+    <ds:schemaRef ds:uri="http://schemas.microsoft.com/VisualStudio/2011/storyboarding/control"/>
+  </ds:schemaRefs>
+</ds:datastoreItem>
+</file>
+
+<file path=customXml/itemProps65.xml><?xml version="1.0" encoding="utf-8"?>
+<ds:datastoreItem xmlns:ds="http://schemas.openxmlformats.org/officeDocument/2006/customXml" ds:itemID="{3CA2419A-9F14-4C85-A58F-75A1F119CFF3}">
+  <ds:schemaRefs>
+    <ds:schemaRef ds:uri="http://schemas.microsoft.com/VisualStudio/2011/storyboarding/control"/>
+  </ds:schemaRefs>
+</ds:datastoreItem>
+</file>
+
+<file path=customXml/itemProps66.xml><?xml version="1.0" encoding="utf-8"?>
+<ds:datastoreItem xmlns:ds="http://schemas.openxmlformats.org/officeDocument/2006/customXml" ds:itemID="{253EE405-832B-48D6-8500-D0F6A51BDB15}">
+  <ds:schemaRefs>
+    <ds:schemaRef ds:uri="http://schemas.microsoft.com/VisualStudio/2011/storyboarding/control"/>
+  </ds:schemaRefs>
+</ds:datastoreItem>
+</file>
+
+<file path=customXml/itemProps67.xml><?xml version="1.0" encoding="utf-8"?>
+<ds:datastoreItem xmlns:ds="http://schemas.openxmlformats.org/officeDocument/2006/customXml" ds:itemID="{93F9C43D-5C90-427C-B551-0016A0BC7F6D}">
+  <ds:schemaRefs>
+    <ds:schemaRef ds:uri="http://schemas.microsoft.com/VisualStudio/2011/storyboarding/control"/>
+  </ds:schemaRefs>
+</ds:datastoreItem>
+</file>
+
+<file path=customXml/itemProps68.xml><?xml version="1.0" encoding="utf-8"?>
+<ds:datastoreItem xmlns:ds="http://schemas.openxmlformats.org/officeDocument/2006/customXml" ds:itemID="{2373A68B-B86F-473C-A00A-DA311A7118B3}">
+  <ds:schemaRefs>
+    <ds:schemaRef ds:uri="http://schemas.microsoft.com/VisualStudio/2011/storyboarding/control"/>
+  </ds:schemaRefs>
+</ds:datastoreItem>
+</file>
+
+<file path=customXml/itemProps69.xml><?xml version="1.0" encoding="utf-8"?>
+<ds:datastoreItem xmlns:ds="http://schemas.openxmlformats.org/officeDocument/2006/customXml" ds:itemID="{BC2B38A2-BD79-41B3-82F7-A0B6256A90A7}">
   <ds:schemaRefs>
     <ds:schemaRef ds:uri="http://schemas.microsoft.com/VisualStudio/2011/storyboarding/control"/>
   </ds:schemaRefs>
@@ -12376,16 +15811,48 @@
 </ds:datastoreItem>
 </file>
 
-<file path=customXml/itemProps8.xml><?xml version="1.0" encoding="utf-8"?>
-<ds:datastoreItem xmlns:ds="http://schemas.openxmlformats.org/officeDocument/2006/customXml" ds:itemID="{4571053C-228C-42E6-A1F5-1D4F28F70937}">
+<file path=customXml/itemProps70.xml><?xml version="1.0" encoding="utf-8"?>
+<ds:datastoreItem xmlns:ds="http://schemas.openxmlformats.org/officeDocument/2006/customXml" ds:itemID="{7E83D04C-59A6-4511-A5A7-7D2C5EFFB063}">
   <ds:schemaRefs>
     <ds:schemaRef ds:uri="http://schemas.microsoft.com/VisualStudio/2011/storyboarding/control"/>
   </ds:schemaRefs>
 </ds:datastoreItem>
 </file>
 
+<file path=customXml/itemProps71.xml><?xml version="1.0" encoding="utf-8"?>
+<ds:datastoreItem xmlns:ds="http://schemas.openxmlformats.org/officeDocument/2006/customXml" ds:itemID="{165FC4D0-2252-4A9C-B420-7BAE0D94A93B}">
+  <ds:schemaRefs>
+    <ds:schemaRef ds:uri="http://schemas.microsoft.com/VisualStudio/2011/storyboarding/control"/>
+  </ds:schemaRefs>
+</ds:datastoreItem>
+</file>
+
+<file path=customXml/itemProps72.xml><?xml version="1.0" encoding="utf-8"?>
+<ds:datastoreItem xmlns:ds="http://schemas.openxmlformats.org/officeDocument/2006/customXml" ds:itemID="{4830D8E8-EF8D-4827-A0B7-C4F0E345C881}">
+  <ds:schemaRefs>
+    <ds:schemaRef ds:uri="http://schemas.microsoft.com/VisualStudio/2011/storyboarding/control"/>
+  </ds:schemaRefs>
+</ds:datastoreItem>
+</file>
+
+<file path=customXml/itemProps73.xml><?xml version="1.0" encoding="utf-8"?>
+<ds:datastoreItem xmlns:ds="http://schemas.openxmlformats.org/officeDocument/2006/customXml" ds:itemID="{303CECB1-017C-45E1-B570-8C44C98C315A}">
+  <ds:schemaRefs>
+    <ds:schemaRef ds:uri="http://schemas.microsoft.com/VisualStudio/2011/storyboarding/control"/>
+  </ds:schemaRefs>
+</ds:datastoreItem>
+</file>
+
+<file path=customXml/itemProps8.xml><?xml version="1.0" encoding="utf-8"?>
+<ds:datastoreItem xmlns:ds="http://schemas.openxmlformats.org/officeDocument/2006/customXml" ds:itemID="{883AAEB0-9407-4694-A320-3C16B05BC67F}">
+  <ds:schemaRefs>
+    <ds:schemaRef ds:uri="http://schemas.microsoft.com/VisualStudio/2011/storyboarding/control"/>
+  </ds:schemaRefs>
+</ds:datastoreItem>
+</file>
+
 <file path=customXml/itemProps9.xml><?xml version="1.0" encoding="utf-8"?>
-<ds:datastoreItem xmlns:ds="http://schemas.openxmlformats.org/officeDocument/2006/customXml" ds:itemID="{3283B7E8-A188-4F5D-BAE9-55D82BC136E8}">
+<ds:datastoreItem xmlns:ds="http://schemas.openxmlformats.org/officeDocument/2006/customXml" ds:itemID="{779D6FE4-456B-49B9-830E-6559B351BF40}">
   <ds:schemaRefs>
     <ds:schemaRef ds:uri="http://schemas.microsoft.com/VisualStudio/2011/storyboarding/control"/>
   </ds:schemaRefs>

</xml_diff>